<commit_message>
Fix: Correção tela branca JobDetails e registro de contratação
</commit_message>
<xml_diff>
--- a/Novva R&S - Pitch Deck.pptx
+++ b/Novva R&S - Pitch Deck.pptx
@@ -5,14 +5,18 @@
     <p:sldMasterId id="2147483648" r:id="rId1"/>
   </p:sldMasterIdLst>
   <p:notesMasterIdLst>
-    <p:notesMasterId r:id="rId7"/>
+    <p:notesMasterId r:id="rId11"/>
   </p:notesMasterIdLst>
   <p:sldIdLst>
     <p:sldId id="267" r:id="rId2"/>
     <p:sldId id="258" r:id="rId3"/>
     <p:sldId id="266" r:id="rId4"/>
     <p:sldId id="268" r:id="rId5"/>
-    <p:sldId id="269" r:id="rId6"/>
+    <p:sldId id="270" r:id="rId6"/>
+    <p:sldId id="269" r:id="rId7"/>
+    <p:sldId id="271" r:id="rId8"/>
+    <p:sldId id="272" r:id="rId9"/>
+    <p:sldId id="273" r:id="rId10"/>
   </p:sldIdLst>
   <p:sldSz cx="12192000" cy="6858000"/>
   <p:notesSz cx="6858000" cy="9144000"/>
@@ -3117,6 +3121,34 @@
 </dgm:styleDef>
 </file>
 
+<file path=ppt/ink/ink1.xml><?xml version="1.0" encoding="utf-8"?>
+<inkml:ink xmlns:inkml="http://www.w3.org/2003/InkML">
+  <inkml:definitions>
+    <inkml:context xml:id="ctx0">
+      <inkml:inkSource xml:id="inkSrc0">
+        <inkml:traceFormat>
+          <inkml:channel name="X" type="integer" min="-2.14748E9" max="2.14748E9" units="cm"/>
+          <inkml:channel name="Y" type="integer" min="-2.14748E9" max="2.14748E9" units="cm"/>
+          <inkml:channel name="F" type="integer" max="32767" units="dev"/>
+        </inkml:traceFormat>
+        <inkml:channelProperties>
+          <inkml:channelProperty channel="X" name="resolution" value="1000" units="1/cm"/>
+          <inkml:channelProperty channel="Y" name="resolution" value="1000" units="1/cm"/>
+          <inkml:channelProperty channel="F" name="resolution" value="0" units="1/dev"/>
+        </inkml:channelProperties>
+      </inkml:inkSource>
+      <inkml:timestamp xml:id="ts0" timeString="2026-01-14T20:07:21.670"/>
+    </inkml:context>
+    <inkml:brush xml:id="br0">
+      <inkml:brushProperty name="width" value="0.07938" units="cm"/>
+      <inkml:brushProperty name="height" value="0.07938" units="cm"/>
+      <inkml:brushProperty name="color" value="#E71224"/>
+    </inkml:brush>
+  </inkml:definitions>
+  <inkml:trace contextRef="#ctx0" brushRef="#br0">1768 32 24575,'-52'-10'0,"8"0"0,-55 2 0,0 4 0,-105 11 0,185-4 0,2 0 0,-1 1 0,-29 11 0,-10 3 0,13-4 0,1 1 0,-47 24 0,45-18 0,-71 21 0,77-29 0,0 2 0,-40 21 0,58-24 0,-2-1 0,0-1 0,0-1 0,0-1 0,-1-1 0,0-1 0,-1-1 0,-41 3 0,52-8 0,0 1 0,0 1 0,1 0 0,-1 1 0,1 1 0,-1 0 0,1 0 0,0 2 0,0-1 0,1 2 0,0-1 0,-14 11 0,9-5 0,0 1 0,1 0 0,1 2 0,0-1 0,0 2 0,-12 18 0,20-24 0,0-1 0,1 1 0,0 0 0,1 0 0,0 0 0,1 1 0,0 0 0,1 0 0,0 0 0,1 0 0,0 1 0,-1 21 0,4-27 0,0 0 0,0 0 0,0-1 0,1 1 0,0 0 0,0 0 0,1-1 0,0 0 0,0 1 0,0-1 0,0 0 0,1 0 0,0-1 0,0 1 0,0-1 0,0 0 0,1 0 0,0 0 0,9 5 0,12 7 0,1-1 0,51 21 0,-20-11 0,-15-5 0,1-2 0,1-2 0,1-2 0,0-2 0,76 10 0,245 3 0,-327-24 0,537 21 0,613 15 0,-791-11 0,-291-24 0,52 2 0,251-25 0,-364 11 0,-1-1 0,0-2 0,81-37 0,-79 30 0,1 2 0,82-20 0,-120 36 0,1-1 0,-1 0 0,0 0 0,0-1 0,0-1 0,-1 0 0,0 0 0,0-1 0,17-12 0,-24 15 0,0 0 0,0 0 0,0 0 0,-1 0 0,1-1 0,-1 1 0,0-1 0,0 0 0,0 1 0,0-1 0,0 0 0,-1 0 0,0 0 0,0 0 0,0-1 0,0 1 0,-1 0 0,0 0 0,0-1 0,0 1 0,0 0 0,0 0 0,-1 0 0,0-1 0,0 1 0,0 0 0,0 0 0,-1 0 0,-2-5 0,-3-4 0,0 0 0,-1 1 0,-1 1 0,1-1 0,-2 1 0,1 1 0,-2 0 0,1 0 0,-1 1 0,-1 0 0,-17-10 0,-19-9 0,-81-33 0,108 51 0,-53-20 0,-2 4 0,-140-31 0,-164-6 0,237 43 0,-681-93 0,663 101 0,-196 11 0,154 4 0,156-8-1365,31-1-5461</inkml:trace>
+</inkml:ink>
+</file>
+
 <file path=ppt/notesMasters/notesMaster1.xml><?xml version="1.0" encoding="utf-8"?>
 <p:notesMaster xmlns:a="http://schemas.openxmlformats.org/drawingml/2006/main" xmlns:r="http://schemas.openxmlformats.org/officeDocument/2006/relationships" xmlns:p="http://schemas.openxmlformats.org/presentationml/2006/main">
   <p:cSld>
@@ -9118,61 +9150,6 @@
       </p:sp>
       <p:sp>
         <p:nvSpPr>
-          <p:cNvPr id="3" name="CaixaDeTexto 2">
-            <a:extLst>
-              <a:ext uri="{FF2B5EF4-FFF2-40B4-BE49-F238E27FC236}">
-                <a16:creationId xmlns:a16="http://schemas.microsoft.com/office/drawing/2014/main" id="{AC3FE24D-F305-C35C-1D5D-96DEFC0B33CC}"/>
-              </a:ext>
-            </a:extLst>
-          </p:cNvPr>
-          <p:cNvSpPr txBox="1"/>
-          <p:nvPr/>
-        </p:nvSpPr>
-        <p:spPr>
-          <a:xfrm>
-            <a:off x="547819" y="1515868"/>
-            <a:ext cx="11096359" cy="646331"/>
-          </a:xfrm>
-          <a:prstGeom prst="rect">
-            <a:avLst/>
-          </a:prstGeom>
-          <a:noFill/>
-        </p:spPr>
-        <p:txBody>
-          <a:bodyPr wrap="square">
-            <a:spAutoFit/>
-          </a:bodyPr>
-          <a:lstStyle/>
-          <a:p>
-            <a:pPr>
-              <a:buNone/>
-            </a:pPr>
-            <a:r>
-              <a:rPr lang="pt-BR" b="1" dirty="0" err="1">
-                <a:solidFill>
-                  <a:schemeClr val="bg1"/>
-                </a:solidFill>
-              </a:rPr>
-              <a:t>Novva</a:t>
-            </a:r>
-            <a:r>
-              <a:rPr lang="pt-BR" b="1" dirty="0">
-                <a:solidFill>
-                  <a:schemeClr val="bg1"/>
-                </a:solidFill>
-              </a:rPr>
-              <a:t> R&amp;S se posiciona não como um repositório de currículos, mas um motor de inteligência que mitiga o risco da subjetividade humana e do custo desnecessário da reposição.</a:t>
-            </a:r>
-            <a:endParaRPr lang="pt-BR" dirty="0">
-              <a:solidFill>
-                <a:schemeClr val="bg1"/>
-              </a:solidFill>
-            </a:endParaRPr>
-          </a:p>
-        </p:txBody>
-      </p:sp>
-      <p:sp>
-        <p:nvSpPr>
           <p:cNvPr id="2" name="CaixaDeTexto 1">
             <a:extLst>
               <a:ext uri="{FF2B5EF4-FFF2-40B4-BE49-F238E27FC236}">
@@ -9210,6 +9187,469 @@
                 <a:latin typeface="Arial Nova" panose="020B0504020202020204" pitchFamily="34" charset="0"/>
               </a:rPr>
               <a:t>O Mercado que demanda</a:t>
+            </a:r>
+          </a:p>
+        </p:txBody>
+      </p:sp>
+      <p:sp>
+        <p:nvSpPr>
+          <p:cNvPr id="6" name="CaixaDeTexto 5">
+            <a:extLst>
+              <a:ext uri="{FF2B5EF4-FFF2-40B4-BE49-F238E27FC236}">
+                <a16:creationId xmlns:a16="http://schemas.microsoft.com/office/drawing/2014/main" id="{B65DAC77-0594-10BF-141F-59E76C6B5174}"/>
+              </a:ext>
+            </a:extLst>
+          </p:cNvPr>
+          <p:cNvSpPr txBox="1"/>
+          <p:nvPr/>
+        </p:nvSpPr>
+        <p:spPr>
+          <a:xfrm>
+            <a:off x="575289" y="2303960"/>
+            <a:ext cx="4771151" cy="4185761"/>
+          </a:xfrm>
+          <a:prstGeom prst="rect">
+            <a:avLst/>
+          </a:prstGeom>
+          <a:solidFill>
+            <a:srgbClr val="003300"/>
+          </a:solidFill>
+        </p:spPr>
+        <p:txBody>
+          <a:bodyPr wrap="square">
+            <a:spAutoFit/>
+          </a:bodyPr>
+          <a:lstStyle/>
+          <a:p>
+            <a:r>
+              <a:rPr lang="pt-BR" b="1" dirty="0">
+                <a:solidFill>
+                  <a:schemeClr val="accent6">
+                    <a:lumMod val="40000"/>
+                    <a:lumOff val="60000"/>
+                  </a:schemeClr>
+                </a:solidFill>
+              </a:rPr>
+              <a:t>Perfil:</a:t>
+            </a:r>
+            <a:r>
+              <a:rPr lang="pt-BR" dirty="0">
+                <a:solidFill>
+                  <a:schemeClr val="accent6">
+                    <a:lumMod val="40000"/>
+                    <a:lumOff val="60000"/>
+                  </a:schemeClr>
+                </a:solidFill>
+              </a:rPr>
+              <a:t> </a:t>
+            </a:r>
+            <a:r>
+              <a:rPr lang="pt-BR" sz="1400" dirty="0">
+                <a:solidFill>
+                  <a:schemeClr val="accent6">
+                    <a:lumMod val="40000"/>
+                    <a:lumOff val="60000"/>
+                  </a:schemeClr>
+                </a:solidFill>
+              </a:rPr>
+              <a:t>Empresas de 10 a 200 funcionários, setores de Serviços, Tecnologia e Varejo Especializado. De 1 a 5 contratações mensais. RH é muitas vezes um "departamento de uma pessoa só" ou a função é acumulada pelo dono/sócio.</a:t>
+            </a:r>
+          </a:p>
+          <a:p>
+            <a:endParaRPr lang="pt-BR" dirty="0">
+              <a:solidFill>
+                <a:schemeClr val="accent6">
+                  <a:lumMod val="40000"/>
+                  <a:lumOff val="60000"/>
+                </a:schemeClr>
+              </a:solidFill>
+            </a:endParaRPr>
+          </a:p>
+          <a:p>
+            <a:r>
+              <a:rPr lang="pt-BR" b="1" dirty="0">
+                <a:solidFill>
+                  <a:schemeClr val="accent6">
+                    <a:lumMod val="40000"/>
+                    <a:lumOff val="60000"/>
+                  </a:schemeClr>
+                </a:solidFill>
+              </a:rPr>
+              <a:t>Dores:</a:t>
+            </a:r>
+            <a:r>
+              <a:rPr lang="pt-BR" dirty="0">
+                <a:solidFill>
+                  <a:schemeClr val="accent6">
+                    <a:lumMod val="40000"/>
+                    <a:lumOff val="60000"/>
+                  </a:schemeClr>
+                </a:solidFill>
+              </a:rPr>
+              <a:t> </a:t>
+            </a:r>
+            <a:r>
+              <a:rPr lang="pt-BR" sz="1400" dirty="0">
+                <a:solidFill>
+                  <a:schemeClr val="accent6">
+                    <a:lumMod val="40000"/>
+                    <a:lumOff val="60000"/>
+                  </a:schemeClr>
+                </a:solidFill>
+              </a:rPr>
+              <a:t>Desorganização (processos em Excel/E-mail), perda de candidatos por demora no retorno, dificuldade em comparar candidatos objetivamente. Sem orçamento para softwares "Enterprise" (acima de R$ 2.000/mês).</a:t>
+            </a:r>
+          </a:p>
+          <a:p>
+            <a:endParaRPr lang="pt-BR" sz="1400" dirty="0">
+              <a:solidFill>
+                <a:schemeClr val="accent6">
+                  <a:lumMod val="40000"/>
+                  <a:lumOff val="60000"/>
+                </a:schemeClr>
+              </a:solidFill>
+            </a:endParaRPr>
+          </a:p>
+          <a:p>
+            <a:r>
+              <a:rPr lang="pt-BR" b="1" dirty="0">
+                <a:solidFill>
+                  <a:schemeClr val="accent6">
+                    <a:lumMod val="40000"/>
+                    <a:lumOff val="60000"/>
+                  </a:schemeClr>
+                </a:solidFill>
+              </a:rPr>
+              <a:t>Potencial para </a:t>
+            </a:r>
+            <a:r>
+              <a:rPr lang="pt-BR" b="1" dirty="0" err="1">
+                <a:solidFill>
+                  <a:schemeClr val="accent6">
+                    <a:lumMod val="40000"/>
+                    <a:lumOff val="60000"/>
+                  </a:schemeClr>
+                </a:solidFill>
+              </a:rPr>
+              <a:t>Novva</a:t>
+            </a:r>
+            <a:r>
+              <a:rPr lang="pt-BR" b="1" dirty="0">
+                <a:solidFill>
+                  <a:schemeClr val="accent6">
+                    <a:lumMod val="40000"/>
+                    <a:lumOff val="60000"/>
+                  </a:schemeClr>
+                </a:solidFill>
+              </a:rPr>
+              <a:t>: </a:t>
+            </a:r>
+            <a:r>
+              <a:rPr lang="pt-BR" sz="1400" dirty="0">
+                <a:solidFill>
+                  <a:schemeClr val="accent6">
+                    <a:lumMod val="40000"/>
+                    <a:lumOff val="60000"/>
+                  </a:schemeClr>
+                </a:solidFill>
+              </a:rPr>
+              <a:t>Altíssimo. O "Scorecard" simplifica a decisão baseada em números, não apenas em "feeling". </a:t>
+            </a:r>
+            <a:r>
+              <a:rPr lang="pt-BR" dirty="0">
+                <a:solidFill>
+                  <a:schemeClr val="accent6">
+                    <a:lumMod val="40000"/>
+                    <a:lumOff val="60000"/>
+                  </a:schemeClr>
+                </a:solidFill>
+              </a:rPr>
+              <a:t>  </a:t>
+            </a:r>
+          </a:p>
+          <a:p>
+            <a:endParaRPr lang="pt-BR" dirty="0">
+              <a:solidFill>
+                <a:schemeClr val="accent6">
+                  <a:lumMod val="40000"/>
+                  <a:lumOff val="60000"/>
+                </a:schemeClr>
+              </a:solidFill>
+            </a:endParaRPr>
+          </a:p>
+          <a:p>
+            <a:r>
+              <a:rPr lang="pt-BR" b="1" dirty="0">
+                <a:solidFill>
+                  <a:schemeClr val="accent6">
+                    <a:lumMod val="40000"/>
+                    <a:lumOff val="60000"/>
+                  </a:schemeClr>
+                </a:solidFill>
+              </a:rPr>
+              <a:t>Estratégia de Preço</a:t>
+            </a:r>
+            <a:r>
+              <a:rPr lang="pt-BR" sz="1400" dirty="0">
+                <a:solidFill>
+                  <a:schemeClr val="accent6">
+                    <a:lumMod val="40000"/>
+                    <a:lumOff val="60000"/>
+                  </a:schemeClr>
+                </a:solidFill>
+              </a:rPr>
+              <a:t>: Modelo SaaS self-service, variando entre R$ 100 a R$ 400 mensais, com barreiras de entrada nulas.</a:t>
+            </a:r>
+            <a:endParaRPr lang="pt-BR" dirty="0">
+              <a:solidFill>
+                <a:schemeClr val="accent6">
+                  <a:lumMod val="40000"/>
+                  <a:lumOff val="60000"/>
+                </a:schemeClr>
+              </a:solidFill>
+            </a:endParaRPr>
+          </a:p>
+        </p:txBody>
+      </p:sp>
+      <p:sp>
+        <p:nvSpPr>
+          <p:cNvPr id="9" name="CaixaDeTexto 8">
+            <a:extLst>
+              <a:ext uri="{FF2B5EF4-FFF2-40B4-BE49-F238E27FC236}">
+                <a16:creationId xmlns:a16="http://schemas.microsoft.com/office/drawing/2014/main" id="{34FBBE5B-75C4-49E0-2B43-6F6F98685B9F}"/>
+              </a:ext>
+            </a:extLst>
+          </p:cNvPr>
+          <p:cNvSpPr txBox="1"/>
+          <p:nvPr/>
+        </p:nvSpPr>
+        <p:spPr>
+          <a:xfrm>
+            <a:off x="6503437" y="2303960"/>
+            <a:ext cx="4627983" cy="4216539"/>
+          </a:xfrm>
+          <a:prstGeom prst="rect">
+            <a:avLst/>
+          </a:prstGeom>
+          <a:solidFill>
+            <a:srgbClr val="003300"/>
+          </a:solidFill>
+        </p:spPr>
+        <p:txBody>
+          <a:bodyPr wrap="square">
+            <a:spAutoFit/>
+          </a:bodyPr>
+          <a:lstStyle>
+            <a:defPPr>
+              <a:defRPr lang="pt-BR"/>
+            </a:defPPr>
+            <a:lvl1pPr>
+              <a:defRPr sz="1600">
+                <a:solidFill>
+                  <a:schemeClr val="accent6">
+                    <a:lumMod val="40000"/>
+                    <a:lumOff val="60000"/>
+                  </a:schemeClr>
+                </a:solidFill>
+              </a:defRPr>
+            </a:lvl1pPr>
+          </a:lstStyle>
+          <a:p>
+            <a:r>
+              <a:rPr lang="pt-BR" sz="1800" b="1" dirty="0"/>
+              <a:t>Perfil</a:t>
+            </a:r>
+            <a:r>
+              <a:rPr lang="pt-BR" sz="1800" dirty="0"/>
+              <a:t>:</a:t>
+            </a:r>
+            <a:r>
+              <a:rPr lang="pt-BR" sz="1400" dirty="0"/>
+              <a:t> Recrutadores independentes ou pequenas agências que gerenciam processos para terceiros.</a:t>
+            </a:r>
+          </a:p>
+          <a:p>
+            <a:endParaRPr lang="pt-BR" sz="1400" dirty="0"/>
+          </a:p>
+          <a:p>
+            <a:r>
+              <a:rPr lang="pt-BR" sz="1800" b="1" dirty="0"/>
+              <a:t>Dores</a:t>
+            </a:r>
+            <a:r>
+              <a:rPr lang="pt-BR" sz="1800" dirty="0"/>
+              <a:t>:</a:t>
+            </a:r>
+            <a:r>
+              <a:rPr lang="pt-BR" sz="1400" dirty="0"/>
+              <a:t> Necessidade de segregar dados de múltiplos clientes (compliance), necessidade de justificar a </a:t>
+            </a:r>
+            <a:r>
+              <a:rPr lang="pt-BR" sz="1400" dirty="0" err="1"/>
+              <a:t>shortlist</a:t>
+            </a:r>
+            <a:r>
+              <a:rPr lang="pt-BR" sz="1400" dirty="0"/>
+              <a:t> para o cliente final. O ATS tradicional foca no fluxo, mas não ajuda a "vender" o candidato para o cliente.</a:t>
+            </a:r>
+          </a:p>
+          <a:p>
+            <a:endParaRPr lang="pt-BR" sz="1400" dirty="0"/>
+          </a:p>
+          <a:p>
+            <a:r>
+              <a:rPr lang="pt-BR" sz="1800" b="1" dirty="0"/>
+              <a:t>Potencial para </a:t>
+            </a:r>
+            <a:r>
+              <a:rPr lang="pt-BR" sz="1800" b="1" dirty="0" err="1"/>
+              <a:t>Novva</a:t>
+            </a:r>
+            <a:r>
+              <a:rPr lang="pt-BR" sz="1800" dirty="0"/>
+              <a:t>: </a:t>
+            </a:r>
+            <a:r>
+              <a:rPr lang="pt-BR" sz="1400" dirty="0"/>
+              <a:t>Elevado (Nicho Estratégico). A arquitetura de dados da </a:t>
+            </a:r>
+            <a:r>
+              <a:rPr lang="pt-BR" sz="1400" dirty="0" err="1"/>
+              <a:t>Novva</a:t>
+            </a:r>
+            <a:r>
+              <a:rPr lang="pt-BR" sz="1400" dirty="0"/>
+              <a:t> permite que o consultor apresente um "Relatório de Comparação" visual (Radar Chart do candidato vs. Benchmark). Isso agrega valor tangível ao serviço da consultoria. A funcionalidade </a:t>
+            </a:r>
+            <a:r>
+              <a:rPr lang="pt-BR" sz="1400" dirty="0" err="1"/>
+              <a:t>multi-tenant</a:t>
+            </a:r>
+            <a:r>
+              <a:rPr lang="pt-BR" sz="1400" dirty="0"/>
+              <a:t> permite gerir múltiplos clientes dentro da mesma conta mestre.</a:t>
+            </a:r>
+          </a:p>
+          <a:p>
+            <a:endParaRPr lang="pt-BR" sz="1400" dirty="0"/>
+          </a:p>
+          <a:p>
+            <a:r>
+              <a:rPr lang="pt-BR" sz="1800" b="1" dirty="0"/>
+              <a:t>Estratégia:</a:t>
+            </a:r>
+            <a:r>
+              <a:rPr lang="pt-BR" sz="1800" dirty="0"/>
+              <a:t> </a:t>
+            </a:r>
+            <a:r>
+              <a:rPr lang="pt-BR" sz="1400" dirty="0"/>
+              <a:t>Funcionar como um parceiro tecnológico, onde </a:t>
+            </a:r>
+            <a:r>
+              <a:rPr lang="pt-BR" sz="1400" dirty="0" err="1"/>
+              <a:t>Novva</a:t>
+            </a:r>
+            <a:r>
+              <a:rPr lang="pt-BR" sz="1400" dirty="0"/>
+              <a:t> é a ferramenta de entrega de valor da consultoria.</a:t>
+            </a:r>
+          </a:p>
+        </p:txBody>
+      </p:sp>
+      <p:sp>
+        <p:nvSpPr>
+          <p:cNvPr id="12" name="CaixaDeTexto 11">
+            <a:extLst>
+              <a:ext uri="{FF2B5EF4-FFF2-40B4-BE49-F238E27FC236}">
+                <a16:creationId xmlns:a16="http://schemas.microsoft.com/office/drawing/2014/main" id="{2C2E6BA0-83EE-5AD5-E839-BE6B46B49063}"/>
+              </a:ext>
+            </a:extLst>
+          </p:cNvPr>
+          <p:cNvSpPr txBox="1"/>
+          <p:nvPr/>
+        </p:nvSpPr>
+        <p:spPr>
+          <a:xfrm>
+            <a:off x="575289" y="1882832"/>
+            <a:ext cx="4262775" cy="338554"/>
+          </a:xfrm>
+          <a:prstGeom prst="rect">
+            <a:avLst/>
+          </a:prstGeom>
+          <a:noFill/>
+        </p:spPr>
+        <p:txBody>
+          <a:bodyPr wrap="square">
+            <a:spAutoFit/>
+          </a:bodyPr>
+          <a:lstStyle/>
+          <a:p>
+            <a:r>
+              <a:rPr lang="pt-BR" sz="1600" b="1" dirty="0">
+                <a:solidFill>
+                  <a:srgbClr val="00B050"/>
+                </a:solidFill>
+              </a:rPr>
+              <a:t>Segmento A: </a:t>
+            </a:r>
+            <a:r>
+              <a:rPr lang="pt-BR" sz="1600" dirty="0">
+                <a:solidFill>
+                  <a:srgbClr val="00B050"/>
+                </a:solidFill>
+              </a:rPr>
+              <a:t>Pequenas e Médias Empresas</a:t>
+            </a:r>
+          </a:p>
+        </p:txBody>
+      </p:sp>
+      <p:sp>
+        <p:nvSpPr>
+          <p:cNvPr id="15" name="CaixaDeTexto 14">
+            <a:extLst>
+              <a:ext uri="{FF2B5EF4-FFF2-40B4-BE49-F238E27FC236}">
+                <a16:creationId xmlns:a16="http://schemas.microsoft.com/office/drawing/2014/main" id="{C61184E7-D350-980B-397C-3E463DA413EB}"/>
+              </a:ext>
+            </a:extLst>
+          </p:cNvPr>
+          <p:cNvSpPr txBox="1"/>
+          <p:nvPr/>
+        </p:nvSpPr>
+        <p:spPr>
+          <a:xfrm>
+            <a:off x="6435281" y="1615147"/>
+            <a:ext cx="5022442" cy="584775"/>
+          </a:xfrm>
+          <a:prstGeom prst="rect">
+            <a:avLst/>
+          </a:prstGeom>
+          <a:noFill/>
+        </p:spPr>
+        <p:txBody>
+          <a:bodyPr wrap="square">
+            <a:spAutoFit/>
+          </a:bodyPr>
+          <a:lstStyle>
+            <a:defPPr>
+              <a:defRPr lang="pt-BR"/>
+            </a:defPPr>
+            <a:lvl1pPr>
+              <a:defRPr sz="1600" b="1">
+                <a:solidFill>
+                  <a:srgbClr val="00B050"/>
+                </a:solidFill>
+              </a:defRPr>
+            </a:lvl1pPr>
+          </a:lstStyle>
+          <a:p>
+            <a:r>
+              <a:rPr lang="pt-BR" dirty="0"/>
+              <a:t>Segmento B: </a:t>
+            </a:r>
+            <a:r>
+              <a:rPr lang="pt-BR" b="0" dirty="0"/>
+              <a:t>Consultorias de Recrutamento Boutique e Headhunters</a:t>
             </a:r>
           </a:p>
         </p:txBody>
@@ -9235,7 +9675,7 @@
         <p:cNvPr id="1" name="">
           <a:extLst>
             <a:ext uri="{FF2B5EF4-FFF2-40B4-BE49-F238E27FC236}">
-              <a16:creationId xmlns:a16="http://schemas.microsoft.com/office/drawing/2014/main" id="{CFE8F626-5D22-2BD0-4B67-4DED251AB45C}"/>
+              <a16:creationId xmlns:a16="http://schemas.microsoft.com/office/drawing/2014/main" id="{BE059BB6-161D-E740-BE36-11E166596E17}"/>
             </a:ext>
           </a:extLst>
         </p:cNvPr>
@@ -9255,7 +9695,7 @@
           <p:cNvPr id="7" name="Retângulo 6">
             <a:extLst>
               <a:ext uri="{FF2B5EF4-FFF2-40B4-BE49-F238E27FC236}">
-                <a16:creationId xmlns:a16="http://schemas.microsoft.com/office/drawing/2014/main" id="{3601D76E-0B3E-986F-ED9A-CA8F5CF4D617}"/>
+                <a16:creationId xmlns:a16="http://schemas.microsoft.com/office/drawing/2014/main" id="{4BECFB23-80B9-FB2E-8EBC-E67362BB54E7}"/>
               </a:ext>
             </a:extLst>
           </p:cNvPr>
@@ -9307,7 +9747,7 @@
           <p:cNvPr id="13" name="Espaço Reservado para Número de Slide 12">
             <a:extLst>
               <a:ext uri="{FF2B5EF4-FFF2-40B4-BE49-F238E27FC236}">
-                <a16:creationId xmlns:a16="http://schemas.microsoft.com/office/drawing/2014/main" id="{957745CD-75A5-55BB-7F79-41095C2CD23E}"/>
+                <a16:creationId xmlns:a16="http://schemas.microsoft.com/office/drawing/2014/main" id="{3DE3C3FD-1DA0-992D-55C6-F85A7BE1DB81}"/>
               </a:ext>
             </a:extLst>
           </p:cNvPr>
@@ -9336,7 +9776,7 @@
           <p:cNvPr id="11" name="CaixaDeTexto 10">
             <a:extLst>
               <a:ext uri="{FF2B5EF4-FFF2-40B4-BE49-F238E27FC236}">
-                <a16:creationId xmlns:a16="http://schemas.microsoft.com/office/drawing/2014/main" id="{77564AA8-3885-A4AB-85E3-73E7841DE630}"/>
+                <a16:creationId xmlns:a16="http://schemas.microsoft.com/office/drawing/2014/main" id="{D63783F3-EAB7-1B74-3E3D-E5B6C2A92D6C}"/>
               </a:ext>
             </a:extLst>
           </p:cNvPr>
@@ -9376,10 +9816,10 @@
       </p:sp>
       <p:sp>
         <p:nvSpPr>
-          <p:cNvPr id="3" name="CaixaDeTexto 2">
-            <a:extLst>
-              <a:ext uri="{FF2B5EF4-FFF2-40B4-BE49-F238E27FC236}">
-                <a16:creationId xmlns:a16="http://schemas.microsoft.com/office/drawing/2014/main" id="{936FD9C6-F488-5EA1-15C5-FEA13CF345A9}"/>
+          <p:cNvPr id="2" name="CaixaDeTexto 1">
+            <a:extLst>
+              <a:ext uri="{FF2B5EF4-FFF2-40B4-BE49-F238E27FC236}">
+                <a16:creationId xmlns:a16="http://schemas.microsoft.com/office/drawing/2014/main" id="{F6446C4A-0E78-A9D8-675B-4E9126B93E25}"/>
               </a:ext>
             </a:extLst>
           </p:cNvPr>
@@ -9388,8 +9828,8 @@
         </p:nvSpPr>
         <p:spPr>
           <a:xfrm>
-            <a:off x="547819" y="1914849"/>
-            <a:ext cx="11096359" cy="646331"/>
+            <a:off x="1299871" y="746427"/>
+            <a:ext cx="3451714" cy="461665"/>
           </a:xfrm>
           <a:prstGeom prst="rect">
             <a:avLst/>
@@ -9397,14 +9837,801 @@
           <a:noFill/>
         </p:spPr>
         <p:txBody>
-          <a:bodyPr wrap="square">
+          <a:bodyPr wrap="none" rtlCol="0">
             <a:spAutoFit/>
           </a:bodyPr>
           <a:lstStyle/>
           <a:p>
-            <a:pPr>
-              <a:buNone/>
-            </a:pPr>
+            <a:r>
+              <a:rPr lang="pt-BR" sz="2400" dirty="0">
+                <a:solidFill>
+                  <a:schemeClr val="tx1">
+                    <a:lumMod val="65000"/>
+                    <a:lumOff val="35000"/>
+                  </a:schemeClr>
+                </a:solidFill>
+                <a:latin typeface="Arial Nova" panose="020B0504020202020204" pitchFamily="34" charset="0"/>
+              </a:rPr>
+              <a:t>Vantagens Competitivas</a:t>
+            </a:r>
+          </a:p>
+        </p:txBody>
+      </p:sp>
+      <p:graphicFrame>
+        <p:nvGraphicFramePr>
+          <p:cNvPr id="4" name="Tabela 3">
+            <a:extLst>
+              <a:ext uri="{FF2B5EF4-FFF2-40B4-BE49-F238E27FC236}">
+                <a16:creationId xmlns:a16="http://schemas.microsoft.com/office/drawing/2014/main" id="{AF5C3FF5-7F61-A488-422E-A7788347E9AF}"/>
+              </a:ext>
+            </a:extLst>
+          </p:cNvPr>
+          <p:cNvGraphicFramePr>
+            <a:graphicFrameLocks noGrp="1"/>
+          </p:cNvGraphicFramePr>
+          <p:nvPr>
+            <p:extLst>
+              <p:ext uri="{D42A27DB-BD31-4B8C-83A1-F6EECF244321}">
+                <p14:modId xmlns:p14="http://schemas.microsoft.com/office/powerpoint/2010/main" val="1208971384"/>
+              </p:ext>
+            </p:extLst>
+          </p:nvPr>
+        </p:nvGraphicFramePr>
+        <p:xfrm>
+          <a:off x="398362" y="1515868"/>
+          <a:ext cx="11395273" cy="4272280"/>
+        </p:xfrm>
+        <a:graphic>
+          <a:graphicData uri="http://schemas.openxmlformats.org/drawingml/2006/table">
+            <a:tbl>
+              <a:tblPr firstRow="1" firstCol="1" bandRow="1">
+                <a:tableStyleId>{5C22544A-7EE6-4342-B048-85BDC9FD1C3A}</a:tableStyleId>
+              </a:tblPr>
+              <a:tblGrid>
+                <a:gridCol w="1239219">
+                  <a:extLst>
+                    <a:ext uri="{9D8B030D-6E8A-4147-A177-3AD203B41FA5}">
+                      <a16:colId xmlns:a16="http://schemas.microsoft.com/office/drawing/2014/main" val="3719165834"/>
+                    </a:ext>
+                  </a:extLst>
+                </a:gridCol>
+                <a:gridCol w="2141058">
+                  <a:extLst>
+                    <a:ext uri="{9D8B030D-6E8A-4147-A177-3AD203B41FA5}">
+                      <a16:colId xmlns:a16="http://schemas.microsoft.com/office/drawing/2014/main" val="3647685539"/>
+                    </a:ext>
+                  </a:extLst>
+                </a:gridCol>
+                <a:gridCol w="3984172">
+                  <a:extLst>
+                    <a:ext uri="{9D8B030D-6E8A-4147-A177-3AD203B41FA5}">
+                      <a16:colId xmlns:a16="http://schemas.microsoft.com/office/drawing/2014/main" val="232797854"/>
+                    </a:ext>
+                  </a:extLst>
+                </a:gridCol>
+                <a:gridCol w="4030824">
+                  <a:extLst>
+                    <a:ext uri="{9D8B030D-6E8A-4147-A177-3AD203B41FA5}">
+                      <a16:colId xmlns:a16="http://schemas.microsoft.com/office/drawing/2014/main" val="1147695284"/>
+                    </a:ext>
+                  </a:extLst>
+                </a:gridCol>
+              </a:tblGrid>
+              <a:tr h="370840">
+                <a:tc>
+                  <a:txBody>
+                    <a:bodyPr/>
+                    <a:lstStyle/>
+                    <a:p>
+                      <a:pPr algn="ctr"/>
+                      <a:endParaRPr lang="pt-BR" sz="1600" dirty="0"/>
+                    </a:p>
+                  </a:txBody>
+                  <a:tcPr/>
+                </a:tc>
+                <a:tc>
+                  <a:txBody>
+                    <a:bodyPr/>
+                    <a:lstStyle/>
+                    <a:p>
+                      <a:pPr algn="ctr"/>
+                      <a:r>
+                        <a:rPr lang="pt-BR" sz="1600" dirty="0"/>
+                        <a:t>Força</a:t>
+                      </a:r>
+                    </a:p>
+                  </a:txBody>
+                  <a:tcPr/>
+                </a:tc>
+                <a:tc>
+                  <a:txBody>
+                    <a:bodyPr/>
+                    <a:lstStyle/>
+                    <a:p>
+                      <a:pPr algn="ctr"/>
+                      <a:r>
+                        <a:rPr lang="pt-BR" sz="1600" dirty="0"/>
+                        <a:t>Fraqueza</a:t>
+                      </a:r>
+                    </a:p>
+                  </a:txBody>
+                  <a:tcPr/>
+                </a:tc>
+                <a:tc>
+                  <a:txBody>
+                    <a:bodyPr/>
+                    <a:lstStyle/>
+                    <a:p>
+                      <a:pPr algn="ctr"/>
+                      <a:r>
+                        <a:rPr lang="pt-BR" sz="1600" dirty="0">
+                          <a:solidFill>
+                            <a:schemeClr val="accent6">
+                              <a:lumMod val="40000"/>
+                              <a:lumOff val="60000"/>
+                            </a:schemeClr>
+                          </a:solidFill>
+                        </a:rPr>
+                        <a:t>Aposta da </a:t>
+                      </a:r>
+                      <a:r>
+                        <a:rPr lang="pt-BR" sz="1600" dirty="0" err="1">
+                          <a:solidFill>
+                            <a:schemeClr val="accent6">
+                              <a:lumMod val="40000"/>
+                              <a:lumOff val="60000"/>
+                            </a:schemeClr>
+                          </a:solidFill>
+                        </a:rPr>
+                        <a:t>Novva</a:t>
+                      </a:r>
+                      <a:endParaRPr lang="pt-BR" sz="1600" dirty="0">
+                        <a:solidFill>
+                          <a:schemeClr val="accent6">
+                            <a:lumMod val="40000"/>
+                            <a:lumOff val="60000"/>
+                          </a:schemeClr>
+                        </a:solidFill>
+                      </a:endParaRPr>
+                    </a:p>
+                  </a:txBody>
+                  <a:tcPr>
+                    <a:solidFill>
+                      <a:srgbClr val="00B050"/>
+                    </a:solidFill>
+                  </a:tcPr>
+                </a:tc>
+                <a:extLst>
+                  <a:ext uri="{0D108BD9-81ED-4DB2-BD59-A6C34878D82A}">
+                    <a16:rowId xmlns:a16="http://schemas.microsoft.com/office/drawing/2014/main" val="994797561"/>
+                  </a:ext>
+                </a:extLst>
+              </a:tr>
+              <a:tr h="370840">
+                <a:tc>
+                  <a:txBody>
+                    <a:bodyPr/>
+                    <a:lstStyle/>
+                    <a:p>
+                      <a:r>
+                        <a:rPr lang="pt-BR" sz="1600" dirty="0" err="1"/>
+                        <a:t>Gupy</a:t>
+                      </a:r>
+                      <a:endParaRPr lang="pt-BR" sz="1600" dirty="0"/>
+                    </a:p>
+                  </a:txBody>
+                  <a:tcPr/>
+                </a:tc>
+                <a:tc>
+                  <a:txBody>
+                    <a:bodyPr/>
+                    <a:lstStyle/>
+                    <a:p>
+                      <a:r>
+                        <a:rPr lang="pt-BR" sz="1400" b="0" i="0" kern="1200" dirty="0">
+                          <a:solidFill>
+                            <a:schemeClr val="dk1"/>
+                          </a:solidFill>
+                          <a:effectLst/>
+                          <a:latin typeface="+mn-lt"/>
+                          <a:ea typeface="+mn-ea"/>
+                          <a:cs typeface="+mn-cs"/>
+                        </a:rPr>
+                        <a:t>Domina o </a:t>
+                      </a:r>
+                      <a:r>
+                        <a:rPr lang="pt-BR" sz="1400" b="0" i="1" kern="1200" dirty="0" err="1">
+                          <a:solidFill>
+                            <a:schemeClr val="dk1"/>
+                          </a:solidFill>
+                          <a:effectLst/>
+                          <a:latin typeface="+mn-lt"/>
+                          <a:ea typeface="+mn-ea"/>
+                          <a:cs typeface="+mn-cs"/>
+                        </a:rPr>
+                        <a:t>mindshare</a:t>
+                      </a:r>
+                      <a:r>
+                        <a:rPr lang="pt-BR" sz="1400" b="0" i="0" kern="1200" dirty="0">
+                          <a:solidFill>
+                            <a:schemeClr val="dk1"/>
+                          </a:solidFill>
+                          <a:effectLst/>
+                          <a:latin typeface="+mn-lt"/>
+                          <a:ea typeface="+mn-ea"/>
+                          <a:cs typeface="+mn-cs"/>
+                        </a:rPr>
+                        <a:t>, possui a maior base de talentos do Brasil</a:t>
+                      </a:r>
+                      <a:endParaRPr lang="pt-BR" sz="1400" dirty="0"/>
+                    </a:p>
+                  </a:txBody>
+                  <a:tcPr/>
+                </a:tc>
+                <a:tc>
+                  <a:txBody>
+                    <a:bodyPr/>
+                    <a:lstStyle/>
+                    <a:p>
+                      <a:r>
+                        <a:rPr lang="pt-BR" sz="1400" b="0" i="0" kern="1200" dirty="0">
+                          <a:solidFill>
+                            <a:schemeClr val="dk1"/>
+                          </a:solidFill>
+                          <a:effectLst/>
+                          <a:latin typeface="+mn-lt"/>
+                          <a:ea typeface="+mn-ea"/>
+                          <a:cs typeface="+mn-cs"/>
+                        </a:rPr>
+                        <a:t>Sua IA de triagem é polêmica. Candidatos sentem que são rejeitados injustamente, gerando ruído negativo para a marca empregadora. É caro e complexo para uma PME de 50 funcionários</a:t>
+                      </a:r>
+                      <a:endParaRPr lang="pt-BR" sz="1400" dirty="0"/>
+                    </a:p>
+                  </a:txBody>
+                  <a:tcPr/>
+                </a:tc>
+                <a:tc>
+                  <a:txBody>
+                    <a:bodyPr/>
+                    <a:lstStyle/>
+                    <a:p>
+                      <a:r>
+                        <a:rPr lang="pt-BR" sz="1400" b="0" i="0" kern="1200" dirty="0">
+                          <a:solidFill>
+                            <a:schemeClr val="dk1"/>
+                          </a:solidFill>
+                          <a:effectLst/>
+                          <a:latin typeface="+mn-lt"/>
+                          <a:ea typeface="+mn-ea"/>
+                          <a:cs typeface="+mn-cs"/>
+                        </a:rPr>
+                        <a:t>Posicionar-se como a </a:t>
+                      </a:r>
+                      <a:r>
+                        <a:rPr lang="pt-BR" sz="1400" b="1" i="0" kern="1200" dirty="0">
+                          <a:solidFill>
+                            <a:schemeClr val="dk1"/>
+                          </a:solidFill>
+                          <a:effectLst/>
+                          <a:latin typeface="+mn-lt"/>
+                          <a:ea typeface="+mn-ea"/>
+                          <a:cs typeface="+mn-cs"/>
+                        </a:rPr>
+                        <a:t>"</a:t>
+                      </a:r>
+                      <a:r>
+                        <a:rPr lang="pt-BR" sz="1400" b="1" i="0" kern="1200" dirty="0" err="1">
+                          <a:solidFill>
+                            <a:schemeClr val="dk1"/>
+                          </a:solidFill>
+                          <a:effectLst/>
+                          <a:latin typeface="+mn-lt"/>
+                          <a:ea typeface="+mn-ea"/>
+                          <a:cs typeface="+mn-cs"/>
+                        </a:rPr>
+                        <a:t>Anti-Gupy</a:t>
+                      </a:r>
+                      <a:r>
+                        <a:rPr lang="pt-BR" sz="1400" b="1" i="0" kern="1200" dirty="0">
+                          <a:solidFill>
+                            <a:schemeClr val="dk1"/>
+                          </a:solidFill>
+                          <a:effectLst/>
+                          <a:latin typeface="+mn-lt"/>
+                          <a:ea typeface="+mn-ea"/>
+                          <a:cs typeface="+mn-cs"/>
+                        </a:rPr>
+                        <a:t>"</a:t>
+                      </a:r>
+                      <a:r>
+                        <a:rPr lang="pt-BR" sz="1400" b="0" i="0" kern="1200" dirty="0">
+                          <a:solidFill>
+                            <a:schemeClr val="dk1"/>
+                          </a:solidFill>
+                          <a:effectLst/>
+                          <a:latin typeface="+mn-lt"/>
+                          <a:ea typeface="+mn-ea"/>
+                          <a:cs typeface="+mn-cs"/>
+                        </a:rPr>
+                        <a:t>. Onde a </a:t>
+                      </a:r>
+                      <a:r>
+                        <a:rPr lang="pt-BR" sz="1400" b="0" i="0" kern="1200" dirty="0" err="1">
+                          <a:solidFill>
+                            <a:schemeClr val="dk1"/>
+                          </a:solidFill>
+                          <a:effectLst/>
+                          <a:latin typeface="+mn-lt"/>
+                          <a:ea typeface="+mn-ea"/>
+                          <a:cs typeface="+mn-cs"/>
+                        </a:rPr>
+                        <a:t>Gupy</a:t>
+                      </a:r>
+                      <a:r>
+                        <a:rPr lang="pt-BR" sz="1400" b="0" i="0" kern="1200" dirty="0">
+                          <a:solidFill>
+                            <a:schemeClr val="dk1"/>
+                          </a:solidFill>
+                          <a:effectLst/>
+                          <a:latin typeface="+mn-lt"/>
+                          <a:ea typeface="+mn-ea"/>
+                          <a:cs typeface="+mn-cs"/>
+                        </a:rPr>
+                        <a:t> oferece um robô que decide, </a:t>
+                      </a:r>
+                      <a:r>
+                        <a:rPr lang="pt-BR" sz="1400" b="0" i="0" kern="1200" dirty="0" err="1">
+                          <a:solidFill>
+                            <a:schemeClr val="dk1"/>
+                          </a:solidFill>
+                          <a:effectLst/>
+                          <a:latin typeface="+mn-lt"/>
+                          <a:ea typeface="+mn-ea"/>
+                          <a:cs typeface="+mn-cs"/>
+                        </a:rPr>
+                        <a:t>Novva</a:t>
+                      </a:r>
+                      <a:r>
+                        <a:rPr lang="pt-BR" sz="1400" b="0" i="0" kern="1200" dirty="0">
+                          <a:solidFill>
+                            <a:schemeClr val="dk1"/>
+                          </a:solidFill>
+                          <a:effectLst/>
+                          <a:latin typeface="+mn-lt"/>
+                          <a:ea typeface="+mn-ea"/>
+                          <a:cs typeface="+mn-cs"/>
+                        </a:rPr>
+                        <a:t> oferece uma ferramenta que empodera o humano a decidir com dados. </a:t>
+                      </a:r>
+                      <a:r>
+                        <a:rPr lang="pt-BR" sz="1400" b="0" i="0" kern="1200" dirty="0" err="1">
+                          <a:solidFill>
+                            <a:schemeClr val="dk1"/>
+                          </a:solidFill>
+                          <a:effectLst/>
+                          <a:latin typeface="+mn-lt"/>
+                          <a:ea typeface="+mn-ea"/>
+                          <a:cs typeface="+mn-cs"/>
+                        </a:rPr>
+                        <a:t>Novva</a:t>
+                      </a:r>
+                      <a:r>
+                        <a:rPr lang="pt-BR" sz="1400" b="0" i="0" kern="1200" dirty="0">
+                          <a:solidFill>
+                            <a:schemeClr val="dk1"/>
+                          </a:solidFill>
+                          <a:effectLst/>
+                          <a:latin typeface="+mn-lt"/>
+                          <a:ea typeface="+mn-ea"/>
+                          <a:cs typeface="+mn-cs"/>
+                        </a:rPr>
+                        <a:t> vende controle e transparência, atributos valorizados por gestores técnicos e executivos.</a:t>
+                      </a:r>
+                      <a:endParaRPr lang="pt-BR" sz="1400" dirty="0">
+                        <a:solidFill>
+                          <a:schemeClr val="accent6">
+                            <a:lumMod val="40000"/>
+                            <a:lumOff val="60000"/>
+                          </a:schemeClr>
+                        </a:solidFill>
+                      </a:endParaRPr>
+                    </a:p>
+                  </a:txBody>
+                  <a:tcPr>
+                    <a:solidFill>
+                      <a:srgbClr val="00B050"/>
+                    </a:solidFill>
+                  </a:tcPr>
+                </a:tc>
+                <a:extLst>
+                  <a:ext uri="{0D108BD9-81ED-4DB2-BD59-A6C34878D82A}">
+                    <a16:rowId xmlns:a16="http://schemas.microsoft.com/office/drawing/2014/main" val="3054952549"/>
+                  </a:ext>
+                </a:extLst>
+              </a:tr>
+              <a:tr h="370840">
+                <a:tc>
+                  <a:txBody>
+                    <a:bodyPr/>
+                    <a:lstStyle/>
+                    <a:p>
+                      <a:r>
+                        <a:rPr lang="pt-BR" sz="1600" dirty="0" err="1"/>
+                        <a:t>Sólides</a:t>
+                      </a:r>
+                      <a:endParaRPr lang="pt-BR" sz="1600" dirty="0"/>
+                    </a:p>
+                  </a:txBody>
+                  <a:tcPr/>
+                </a:tc>
+                <a:tc>
+                  <a:txBody>
+                    <a:bodyPr/>
+                    <a:lstStyle/>
+                    <a:p>
+                      <a:r>
+                        <a:rPr lang="pt-BR" sz="1400" b="0" i="0" kern="1200" dirty="0">
+                          <a:solidFill>
+                            <a:schemeClr val="dk1"/>
+                          </a:solidFill>
+                          <a:effectLst/>
+                          <a:latin typeface="+mn-lt"/>
+                          <a:ea typeface="+mn-ea"/>
+                          <a:cs typeface="+mn-cs"/>
+                        </a:rPr>
+                        <a:t>Líder inconteste em </a:t>
+                      </a:r>
+                      <a:r>
+                        <a:rPr lang="pt-BR" sz="1400" b="0" i="0" kern="1200" dirty="0" err="1">
+                          <a:solidFill>
+                            <a:schemeClr val="dk1"/>
+                          </a:solidFill>
+                          <a:effectLst/>
+                          <a:latin typeface="+mn-lt"/>
+                          <a:ea typeface="+mn-ea"/>
+                          <a:cs typeface="+mn-cs"/>
+                        </a:rPr>
+                        <a:t>PMEs</a:t>
+                      </a:r>
+                      <a:r>
+                        <a:rPr lang="pt-BR" sz="1400" b="0" i="0" kern="1200" dirty="0">
+                          <a:solidFill>
+                            <a:schemeClr val="dk1"/>
+                          </a:solidFill>
+                          <a:effectLst/>
+                          <a:latin typeface="+mn-lt"/>
+                          <a:ea typeface="+mn-ea"/>
+                          <a:cs typeface="+mn-cs"/>
+                        </a:rPr>
+                        <a:t> com sua ferramenta Profiler (DISC + outras metodologias). Resolve a dor de "quem é essa pessoa?".</a:t>
+                      </a:r>
+                      <a:endParaRPr lang="pt-BR" sz="1400" dirty="0"/>
+                    </a:p>
+                  </a:txBody>
+                  <a:tcPr/>
+                </a:tc>
+                <a:tc>
+                  <a:txBody>
+                    <a:bodyPr/>
+                    <a:lstStyle/>
+                    <a:p>
+                      <a:r>
+                        <a:rPr lang="pt-BR" sz="1400" b="0" i="0" kern="1200" dirty="0">
+                          <a:solidFill>
+                            <a:schemeClr val="dk1"/>
+                          </a:solidFill>
+                          <a:effectLst/>
+                          <a:latin typeface="+mn-lt"/>
+                          <a:ea typeface="+mn-ea"/>
+                          <a:cs typeface="+mn-cs"/>
+                        </a:rPr>
+                        <a:t>Foca excessivamente no comportamento (Soft Skills). Muitas vezes, empresas de tecnologia precisam validar </a:t>
+                      </a:r>
+                      <a:r>
+                        <a:rPr lang="pt-BR" sz="1400" b="0" i="1" kern="1200" dirty="0">
+                          <a:solidFill>
+                            <a:schemeClr val="dk1"/>
+                          </a:solidFill>
+                          <a:effectLst/>
+                          <a:latin typeface="+mn-lt"/>
+                          <a:ea typeface="+mn-ea"/>
+                          <a:cs typeface="+mn-cs"/>
+                        </a:rPr>
+                        <a:t>Hard Skills</a:t>
+                      </a:r>
+                      <a:r>
+                        <a:rPr lang="pt-BR" sz="1400" b="0" i="0" kern="1200" dirty="0">
+                          <a:solidFill>
+                            <a:schemeClr val="dk1"/>
+                          </a:solidFill>
+                          <a:effectLst/>
+                          <a:latin typeface="+mn-lt"/>
+                          <a:ea typeface="+mn-ea"/>
+                          <a:cs typeface="+mn-cs"/>
+                        </a:rPr>
+                        <a:t> (código, engenharia) com a mesma profundidade, e o </a:t>
+                      </a:r>
+                      <a:r>
+                        <a:rPr lang="pt-BR" sz="1400" b="0" i="0" kern="1200" dirty="0" err="1">
+                          <a:solidFill>
+                            <a:schemeClr val="dk1"/>
+                          </a:solidFill>
+                          <a:effectLst/>
+                          <a:latin typeface="+mn-lt"/>
+                          <a:ea typeface="+mn-ea"/>
+                          <a:cs typeface="+mn-cs"/>
+                        </a:rPr>
+                        <a:t>Sólides</a:t>
+                      </a:r>
+                      <a:r>
+                        <a:rPr lang="pt-BR" sz="1400" b="0" i="0" kern="1200" dirty="0">
+                          <a:solidFill>
+                            <a:schemeClr val="dk1"/>
+                          </a:solidFill>
+                          <a:effectLst/>
+                          <a:latin typeface="+mn-lt"/>
+                          <a:ea typeface="+mn-ea"/>
+                          <a:cs typeface="+mn-cs"/>
+                        </a:rPr>
+                        <a:t> pode ser generalista demais nesse aspecto.</a:t>
+                      </a:r>
+                      <a:endParaRPr lang="pt-BR" sz="1400" dirty="0"/>
+                    </a:p>
+                  </a:txBody>
+                  <a:tcPr/>
+                </a:tc>
+                <a:tc>
+                  <a:txBody>
+                    <a:bodyPr/>
+                    <a:lstStyle/>
+                    <a:p>
+                      <a:r>
+                        <a:rPr lang="pt-BR" sz="1400" b="0" i="0" kern="1200" dirty="0" err="1">
+                          <a:solidFill>
+                            <a:schemeClr val="dk1"/>
+                          </a:solidFill>
+                          <a:effectLst/>
+                          <a:latin typeface="+mn-lt"/>
+                          <a:ea typeface="+mn-ea"/>
+                          <a:cs typeface="+mn-cs"/>
+                        </a:rPr>
+                        <a:t>Novva</a:t>
+                      </a:r>
+                      <a:r>
+                        <a:rPr lang="pt-BR" sz="1400" b="0" i="0" kern="1200" dirty="0">
+                          <a:solidFill>
+                            <a:schemeClr val="dk1"/>
+                          </a:solidFill>
+                          <a:effectLst/>
+                          <a:latin typeface="+mn-lt"/>
+                          <a:ea typeface="+mn-ea"/>
+                          <a:cs typeface="+mn-cs"/>
+                        </a:rPr>
+                        <a:t> equilibra o jogo. A estrutura de dados  permite criar um critério "Técnico" com peso 60% e "Cultura" com peso 40%, permitindo contratar um profissional tecnicamente brilhante que tenha apenas um </a:t>
+                      </a:r>
+                      <a:r>
+                        <a:rPr lang="pt-BR" sz="1400" b="0" i="0" kern="1200" dirty="0" err="1">
+                          <a:solidFill>
+                            <a:schemeClr val="dk1"/>
+                          </a:solidFill>
+                          <a:effectLst/>
+                          <a:latin typeface="+mn-lt"/>
+                          <a:ea typeface="+mn-ea"/>
+                          <a:cs typeface="+mn-cs"/>
+                        </a:rPr>
+                        <a:t>fit</a:t>
+                      </a:r>
+                      <a:r>
+                        <a:rPr lang="pt-BR" sz="1400" b="0" i="0" kern="1200" dirty="0">
+                          <a:solidFill>
+                            <a:schemeClr val="dk1"/>
+                          </a:solidFill>
+                          <a:effectLst/>
+                          <a:latin typeface="+mn-lt"/>
+                          <a:ea typeface="+mn-ea"/>
+                          <a:cs typeface="+mn-cs"/>
+                        </a:rPr>
+                        <a:t> cultural "ok", algo que sistemas puramente comportamentais poderiam desaconselhar.</a:t>
+                      </a:r>
+                      <a:endParaRPr lang="pt-BR" sz="1400" dirty="0">
+                        <a:solidFill>
+                          <a:schemeClr val="accent6">
+                            <a:lumMod val="40000"/>
+                            <a:lumOff val="60000"/>
+                          </a:schemeClr>
+                        </a:solidFill>
+                      </a:endParaRPr>
+                    </a:p>
+                  </a:txBody>
+                  <a:tcPr>
+                    <a:solidFill>
+                      <a:srgbClr val="00B050"/>
+                    </a:solidFill>
+                  </a:tcPr>
+                </a:tc>
+                <a:extLst>
+                  <a:ext uri="{0D108BD9-81ED-4DB2-BD59-A6C34878D82A}">
+                    <a16:rowId xmlns:a16="http://schemas.microsoft.com/office/drawing/2014/main" val="4057697058"/>
+                  </a:ext>
+                </a:extLst>
+              </a:tr>
+              <a:tr h="370840">
+                <a:tc>
+                  <a:txBody>
+                    <a:bodyPr/>
+                    <a:lstStyle/>
+                    <a:p>
+                      <a:r>
+                        <a:rPr lang="pt-BR" sz="1600" dirty="0" err="1"/>
+                        <a:t>Abler</a:t>
+                      </a:r>
+                      <a:endParaRPr lang="pt-BR" sz="1600" dirty="0"/>
+                    </a:p>
+                  </a:txBody>
+                  <a:tcPr/>
+                </a:tc>
+                <a:tc>
+                  <a:txBody>
+                    <a:bodyPr/>
+                    <a:lstStyle/>
+                    <a:p>
+                      <a:r>
+                        <a:rPr lang="pt-BR" sz="1400" b="0" i="0" kern="1200" dirty="0">
+                          <a:solidFill>
+                            <a:schemeClr val="dk1"/>
+                          </a:solidFill>
+                          <a:effectLst/>
+                          <a:latin typeface="+mn-lt"/>
+                          <a:ea typeface="+mn-ea"/>
+                          <a:cs typeface="+mn-cs"/>
+                        </a:rPr>
+                        <a:t>Excelente integração com WhatsApp e foco em agências que precisam de velocidade</a:t>
+                      </a:r>
+                      <a:endParaRPr lang="pt-BR" sz="1100" dirty="0"/>
+                    </a:p>
+                  </a:txBody>
+                  <a:tcPr/>
+                </a:tc>
+                <a:tc>
+                  <a:txBody>
+                    <a:bodyPr/>
+                    <a:lstStyle/>
+                    <a:p>
+                      <a:r>
+                        <a:rPr lang="pt-BR" sz="1400" dirty="0"/>
+                        <a:t>É focado no processo (funil) e não necessariamente na qualidade da decisão (quem é o melhor?)</a:t>
+                      </a:r>
+                    </a:p>
+                  </a:txBody>
+                  <a:tcPr/>
+                </a:tc>
+                <a:tc>
+                  <a:txBody>
+                    <a:bodyPr/>
+                    <a:lstStyle/>
+                    <a:p>
+                      <a:r>
+                        <a:rPr lang="pt-BR" sz="1400" b="0" i="0" kern="1200" dirty="0">
+                          <a:solidFill>
+                            <a:schemeClr val="dk1"/>
+                          </a:solidFill>
+                          <a:effectLst/>
+                          <a:latin typeface="+mn-lt"/>
+                          <a:ea typeface="+mn-ea"/>
+                          <a:cs typeface="+mn-cs"/>
+                        </a:rPr>
+                        <a:t>Inteligência de Decisão. Enquanto o </a:t>
+                      </a:r>
+                      <a:r>
+                        <a:rPr lang="pt-BR" sz="1400" b="0" i="0" kern="1200" dirty="0" err="1">
+                          <a:solidFill>
+                            <a:schemeClr val="dk1"/>
+                          </a:solidFill>
+                          <a:effectLst/>
+                          <a:latin typeface="+mn-lt"/>
+                          <a:ea typeface="+mn-ea"/>
+                          <a:cs typeface="+mn-cs"/>
+                        </a:rPr>
+                        <a:t>Abler</a:t>
+                      </a:r>
+                      <a:r>
+                        <a:rPr lang="pt-BR" sz="1400" b="0" i="0" kern="1200" dirty="0">
+                          <a:solidFill>
+                            <a:schemeClr val="dk1"/>
+                          </a:solidFill>
+                          <a:effectLst/>
+                          <a:latin typeface="+mn-lt"/>
+                          <a:ea typeface="+mn-ea"/>
+                          <a:cs typeface="+mn-cs"/>
+                        </a:rPr>
+                        <a:t> ajuda a processar o candidato rápido, </a:t>
+                      </a:r>
+                      <a:r>
+                        <a:rPr lang="pt-BR" sz="1400" b="0" i="0" kern="1200" dirty="0" err="1">
+                          <a:solidFill>
+                            <a:schemeClr val="dk1"/>
+                          </a:solidFill>
+                          <a:effectLst/>
+                          <a:latin typeface="+mn-lt"/>
+                          <a:ea typeface="+mn-ea"/>
+                          <a:cs typeface="+mn-cs"/>
+                        </a:rPr>
+                        <a:t>Novva</a:t>
+                      </a:r>
+                      <a:r>
+                        <a:rPr lang="pt-BR" sz="1400" b="0" i="0" kern="1200" dirty="0">
+                          <a:solidFill>
+                            <a:schemeClr val="dk1"/>
+                          </a:solidFill>
+                          <a:effectLst/>
+                          <a:latin typeface="+mn-lt"/>
+                          <a:ea typeface="+mn-ea"/>
+                          <a:cs typeface="+mn-cs"/>
+                        </a:rPr>
+                        <a:t> ajuda a escolher o candidato certo através da comparação visual com o Benchmark</a:t>
+                      </a:r>
+                      <a:endParaRPr lang="pt-BR" sz="1000" dirty="0">
+                        <a:solidFill>
+                          <a:schemeClr val="accent6">
+                            <a:lumMod val="40000"/>
+                            <a:lumOff val="60000"/>
+                          </a:schemeClr>
+                        </a:solidFill>
+                      </a:endParaRPr>
+                    </a:p>
+                  </a:txBody>
+                  <a:tcPr>
+                    <a:solidFill>
+                      <a:srgbClr val="00B050"/>
+                    </a:solidFill>
+                  </a:tcPr>
+                </a:tc>
+                <a:extLst>
+                  <a:ext uri="{0D108BD9-81ED-4DB2-BD59-A6C34878D82A}">
+                    <a16:rowId xmlns:a16="http://schemas.microsoft.com/office/drawing/2014/main" val="2951139582"/>
+                  </a:ext>
+                </a:extLst>
+              </a:tr>
+            </a:tbl>
+          </a:graphicData>
+        </a:graphic>
+      </p:graphicFrame>
+      <p:sp>
+        <p:nvSpPr>
+          <p:cNvPr id="5" name="CaixaDeTexto 4">
+            <a:extLst>
+              <a:ext uri="{FF2B5EF4-FFF2-40B4-BE49-F238E27FC236}">
+                <a16:creationId xmlns:a16="http://schemas.microsoft.com/office/drawing/2014/main" id="{914DF9CF-9E16-EF54-23ED-DDD69468C904}"/>
+              </a:ext>
+            </a:extLst>
+          </p:cNvPr>
+          <p:cNvSpPr txBox="1"/>
+          <p:nvPr/>
+        </p:nvSpPr>
+        <p:spPr>
+          <a:xfrm>
+            <a:off x="398362" y="5892581"/>
+            <a:ext cx="11075178" cy="646331"/>
+          </a:xfrm>
+          <a:prstGeom prst="rect">
+            <a:avLst/>
+          </a:prstGeom>
+          <a:noFill/>
+        </p:spPr>
+        <p:txBody>
+          <a:bodyPr wrap="square" rtlCol="0">
+            <a:spAutoFit/>
+          </a:bodyPr>
+          <a:lstStyle/>
+          <a:p>
+            <a:r>
+              <a:rPr lang="pt-BR" b="1" dirty="0">
+                <a:solidFill>
+                  <a:schemeClr val="bg1"/>
+                </a:solidFill>
+              </a:rPr>
+              <a:t>** </a:t>
+            </a:r>
             <a:r>
               <a:rPr lang="pt-BR" b="1" dirty="0" err="1">
                 <a:solidFill>
@@ -9419,14 +10646,732 @@
                   <a:schemeClr val="bg1"/>
                 </a:solidFill>
               </a:rPr>
-              <a:t> R&amp;S se posiciona não como um repositório de currículos, mas um motor de inteligência que mitiga o risco da subjetividade humana e do custo desnecessário da reposição.</a:t>
-            </a:r>
+              <a:t> é a única plataforma que tem um modelo de entrada </a:t>
+            </a:r>
+            <a:r>
+              <a:rPr lang="pt-BR" b="1" dirty="0" err="1">
+                <a:solidFill>
+                  <a:schemeClr val="bg1"/>
+                </a:solidFill>
+              </a:rPr>
+              <a:t>Freemium</a:t>
+            </a:r>
+            <a:r>
+              <a:rPr lang="pt-BR" b="1" dirty="0">
+                <a:solidFill>
+                  <a:schemeClr val="bg1"/>
+                </a:solidFill>
+              </a:rPr>
+              <a:t> com 1 usuário, 1 vaga ativa e candidatos ilimitados para teste.</a:t>
+            </a:r>
+          </a:p>
+        </p:txBody>
+      </p:sp>
+    </p:spTree>
+    <p:extLst>
+      <p:ext uri="{BB962C8B-B14F-4D97-AF65-F5344CB8AC3E}">
+        <p14:creationId xmlns:p14="http://schemas.microsoft.com/office/powerpoint/2010/main" val="4236062854"/>
+      </p:ext>
+    </p:extLst>
+  </p:cSld>
+  <p:clrMapOvr>
+    <a:masterClrMapping/>
+  </p:clrMapOvr>
+</p:sld>
+</file>
+
+<file path=ppt/slides/slide6.xml><?xml version="1.0" encoding="utf-8"?>
+<p:sld xmlns:a="http://schemas.openxmlformats.org/drawingml/2006/main" xmlns:r="http://schemas.openxmlformats.org/officeDocument/2006/relationships" xmlns:p="http://schemas.openxmlformats.org/presentationml/2006/main">
+  <p:cSld>
+    <p:spTree>
+      <p:nvGrpSpPr>
+        <p:cNvPr id="1" name="">
+          <a:extLst>
+            <a:ext uri="{FF2B5EF4-FFF2-40B4-BE49-F238E27FC236}">
+              <a16:creationId xmlns:a16="http://schemas.microsoft.com/office/drawing/2014/main" id="{CFE8F626-5D22-2BD0-4B67-4DED251AB45C}"/>
+            </a:ext>
+          </a:extLst>
+        </p:cNvPr>
+        <p:cNvGrpSpPr/>
+        <p:nvPr/>
+      </p:nvGrpSpPr>
+      <p:grpSpPr>
+        <a:xfrm>
+          <a:off x="0" y="0"/>
+          <a:ext cx="0" cy="0"/>
+          <a:chOff x="0" y="0"/>
+          <a:chExt cx="0" cy="0"/>
+        </a:xfrm>
+      </p:grpSpPr>
+      <p:sp>
+        <p:nvSpPr>
+          <p:cNvPr id="7" name="Retângulo 6">
+            <a:extLst>
+              <a:ext uri="{FF2B5EF4-FFF2-40B4-BE49-F238E27FC236}">
+                <a16:creationId xmlns:a16="http://schemas.microsoft.com/office/drawing/2014/main" id="{3601D76E-0B3E-986F-ED9A-CA8F5CF4D617}"/>
+              </a:ext>
+            </a:extLst>
+          </p:cNvPr>
+          <p:cNvSpPr/>
+          <p:nvPr/>
+        </p:nvSpPr>
+        <p:spPr>
+          <a:xfrm>
+            <a:off x="0" y="0"/>
+            <a:ext cx="12192000" cy="1208092"/>
+          </a:xfrm>
+          <a:prstGeom prst="rect">
+            <a:avLst/>
+          </a:prstGeom>
+          <a:solidFill>
+            <a:srgbClr val="ABA595"/>
+          </a:solidFill>
+          <a:ln>
+            <a:noFill/>
+          </a:ln>
+        </p:spPr>
+        <p:style>
+          <a:lnRef idx="2">
+            <a:schemeClr val="accent1">
+              <a:shade val="15000"/>
+            </a:schemeClr>
+          </a:lnRef>
+          <a:fillRef idx="1">
+            <a:schemeClr val="accent1"/>
+          </a:fillRef>
+          <a:effectRef idx="0">
+            <a:schemeClr val="accent1"/>
+          </a:effectRef>
+          <a:fontRef idx="minor">
+            <a:schemeClr val="lt1"/>
+          </a:fontRef>
+        </p:style>
+        <p:txBody>
+          <a:bodyPr rtlCol="0" anchor="ctr"/>
+          <a:lstStyle/>
+          <a:p>
+            <a:pPr algn="ctr"/>
+            <a:endParaRPr lang="pt-BR" dirty="0"/>
+          </a:p>
+        </p:txBody>
+      </p:sp>
+      <p:sp>
+        <p:nvSpPr>
+          <p:cNvPr id="13" name="Espaço Reservado para Número de Slide 12">
+            <a:extLst>
+              <a:ext uri="{FF2B5EF4-FFF2-40B4-BE49-F238E27FC236}">
+                <a16:creationId xmlns:a16="http://schemas.microsoft.com/office/drawing/2014/main" id="{957745CD-75A5-55BB-7F79-41095C2CD23E}"/>
+              </a:ext>
+            </a:extLst>
+          </p:cNvPr>
+          <p:cNvSpPr>
+            <a:spLocks noGrp="1"/>
+          </p:cNvSpPr>
+          <p:nvPr>
+            <p:ph type="sldNum" sz="quarter" idx="12"/>
+          </p:nvPr>
+        </p:nvSpPr>
+        <p:spPr/>
+        <p:txBody>
+          <a:bodyPr/>
+          <a:lstStyle/>
+          <a:p>
+            <a:fld id="{EC16DA9C-1B67-4414-87EE-2B247BC281D7}" type="slidenum">
+              <a:rPr lang="pt-BR" smtClean="0"/>
+              <a:t>6</a:t>
+            </a:fld>
+            <a:endParaRPr lang="pt-BR"/>
+          </a:p>
+        </p:txBody>
+      </p:sp>
+      <p:sp>
+        <p:nvSpPr>
+          <p:cNvPr id="11" name="CaixaDeTexto 10">
+            <a:extLst>
+              <a:ext uri="{FF2B5EF4-FFF2-40B4-BE49-F238E27FC236}">
+                <a16:creationId xmlns:a16="http://schemas.microsoft.com/office/drawing/2014/main" id="{77564AA8-3885-A4AB-85E3-73E7841DE630}"/>
+              </a:ext>
+            </a:extLst>
+          </p:cNvPr>
+          <p:cNvSpPr txBox="1"/>
+          <p:nvPr/>
+        </p:nvSpPr>
+        <p:spPr>
+          <a:xfrm>
+            <a:off x="1231640" y="17523"/>
+            <a:ext cx="9728719" cy="769441"/>
+          </a:xfrm>
+          <a:prstGeom prst="rect">
+            <a:avLst/>
+          </a:prstGeom>
+          <a:noFill/>
+        </p:spPr>
+        <p:txBody>
+          <a:bodyPr wrap="square" rtlCol="0">
+            <a:spAutoFit/>
+          </a:bodyPr>
+          <a:lstStyle/>
+          <a:p>
+            <a:r>
+              <a:rPr lang="pt-BR" sz="4400" dirty="0">
+                <a:solidFill>
+                  <a:schemeClr val="tx1">
+                    <a:lumMod val="65000"/>
+                    <a:lumOff val="35000"/>
+                  </a:schemeClr>
+                </a:solidFill>
+                <a:latin typeface="Abadi Extra Light" panose="020B0204020104020204" pitchFamily="34" charset="0"/>
+              </a:rPr>
+              <a:t>R&amp;S com Objetividade e Transparência</a:t>
+            </a:r>
+          </a:p>
+        </p:txBody>
+      </p:sp>
+      <p:sp>
+        <p:nvSpPr>
+          <p:cNvPr id="2" name="CaixaDeTexto 1">
+            <a:extLst>
+              <a:ext uri="{FF2B5EF4-FFF2-40B4-BE49-F238E27FC236}">
+                <a16:creationId xmlns:a16="http://schemas.microsoft.com/office/drawing/2014/main" id="{BA1763E2-8D6B-60A0-AA9D-B8683D4FD731}"/>
+              </a:ext>
+            </a:extLst>
+          </p:cNvPr>
+          <p:cNvSpPr txBox="1"/>
+          <p:nvPr/>
+        </p:nvSpPr>
+        <p:spPr>
+          <a:xfrm>
+            <a:off x="1299871" y="746427"/>
+            <a:ext cx="2747868" cy="461665"/>
+          </a:xfrm>
+          <a:prstGeom prst="rect">
+            <a:avLst/>
+          </a:prstGeom>
+          <a:noFill/>
+        </p:spPr>
+        <p:txBody>
+          <a:bodyPr wrap="none" rtlCol="0">
+            <a:spAutoFit/>
+          </a:bodyPr>
+          <a:lstStyle/>
+          <a:p>
+            <a:r>
+              <a:rPr lang="pt-BR" sz="2400" dirty="0">
+                <a:solidFill>
+                  <a:schemeClr val="tx1">
+                    <a:lumMod val="65000"/>
+                    <a:lumOff val="35000"/>
+                  </a:schemeClr>
+                </a:solidFill>
+                <a:latin typeface="Arial Nova" panose="020B0504020202020204" pitchFamily="34" charset="0"/>
+              </a:rPr>
+              <a:t>As funcionalidades</a:t>
+            </a:r>
+          </a:p>
+        </p:txBody>
+      </p:sp>
+      <p:pic>
+        <p:nvPicPr>
+          <p:cNvPr id="12" name="Imagem 11" descr="Interface gráfica do usuário, Aplicativo&#10;&#10;O conteúdo gerado por IA pode estar incorreto.">
+            <a:extLst>
+              <a:ext uri="{FF2B5EF4-FFF2-40B4-BE49-F238E27FC236}">
+                <a16:creationId xmlns:a16="http://schemas.microsoft.com/office/drawing/2014/main" id="{D688B843-F687-287B-1099-BCDC671C251E}"/>
+              </a:ext>
+            </a:extLst>
+          </p:cNvPr>
+          <p:cNvPicPr>
+            <a:picLocks noChangeAspect="1"/>
+          </p:cNvPicPr>
+          <p:nvPr/>
+        </p:nvPicPr>
+        <p:blipFill>
+          <a:blip r:embed="rId2"/>
+          <a:srcRect l="1660" r="7654"/>
+          <a:stretch>
+            <a:fillRect/>
+          </a:stretch>
+        </p:blipFill>
+        <p:spPr>
+          <a:xfrm>
+            <a:off x="3164278" y="1508024"/>
+            <a:ext cx="2939142" cy="3202571"/>
+          </a:xfrm>
+          <a:prstGeom prst="rect">
+            <a:avLst/>
+          </a:prstGeom>
+          <a:ln>
+            <a:noFill/>
+          </a:ln>
+          <a:effectLst>
+            <a:outerShdw blurRad="292100" dist="139700" dir="2700000" algn="tl" rotWithShape="0">
+              <a:srgbClr val="333333">
+                <a:alpha val="65000"/>
+              </a:srgbClr>
+            </a:outerShdw>
+          </a:effectLst>
+        </p:spPr>
+      </p:pic>
+      <p:pic>
+        <p:nvPicPr>
+          <p:cNvPr id="15" name="Imagem 14" descr="Interface gráfica do usuário, Texto, Aplicativo&#10;&#10;O conteúdo gerado por IA pode estar incorreto.">
+            <a:extLst>
+              <a:ext uri="{FF2B5EF4-FFF2-40B4-BE49-F238E27FC236}">
+                <a16:creationId xmlns:a16="http://schemas.microsoft.com/office/drawing/2014/main" id="{7067EF1A-7193-53D9-15C7-FF11A7390097}"/>
+              </a:ext>
+            </a:extLst>
+          </p:cNvPr>
+          <p:cNvPicPr>
+            <a:picLocks noChangeAspect="1"/>
+          </p:cNvPicPr>
+          <p:nvPr/>
+        </p:nvPicPr>
+        <p:blipFill>
+          <a:blip r:embed="rId3"/>
+          <a:stretch>
+            <a:fillRect/>
+          </a:stretch>
+        </p:blipFill>
+        <p:spPr>
+          <a:xfrm>
+            <a:off x="7188277" y="1623441"/>
+            <a:ext cx="3307357" cy="2894757"/>
+          </a:xfrm>
+          <a:prstGeom prst="rect">
+            <a:avLst/>
+          </a:prstGeom>
+        </p:spPr>
+      </p:pic>
+      <p:sp>
+        <p:nvSpPr>
+          <p:cNvPr id="17" name="CaixaDeTexto 16">
+            <a:extLst>
+              <a:ext uri="{FF2B5EF4-FFF2-40B4-BE49-F238E27FC236}">
+                <a16:creationId xmlns:a16="http://schemas.microsoft.com/office/drawing/2014/main" id="{C3CF4D2B-722D-D12E-D15A-E2159E7C5714}"/>
+              </a:ext>
+            </a:extLst>
+          </p:cNvPr>
+          <p:cNvSpPr txBox="1"/>
+          <p:nvPr/>
+        </p:nvSpPr>
+        <p:spPr>
+          <a:xfrm>
+            <a:off x="343483" y="1508024"/>
+            <a:ext cx="2747868" cy="2308324"/>
+          </a:xfrm>
+          <a:prstGeom prst="rect">
+            <a:avLst/>
+          </a:prstGeom>
+          <a:solidFill>
+            <a:srgbClr val="006600">
+              <a:alpha val="30196"/>
+            </a:srgbClr>
+          </a:solidFill>
+          <a:ln>
+            <a:solidFill>
+              <a:schemeClr val="tx1">
+                <a:lumMod val="65000"/>
+                <a:lumOff val="35000"/>
+              </a:schemeClr>
+            </a:solidFill>
+          </a:ln>
+        </p:spPr>
+        <p:txBody>
+          <a:bodyPr wrap="square" rtlCol="0">
+            <a:spAutoFit/>
+          </a:bodyPr>
+          <a:lstStyle/>
+          <a:p>
+            <a:pPr algn="r"/>
+            <a:r>
+              <a:rPr lang="pt-BR" dirty="0">
+                <a:solidFill>
+                  <a:schemeClr val="bg1"/>
+                </a:solidFill>
+              </a:rPr>
+              <a:t>Sistema nativamente SaaS com total segurança dos dados da empresa.</a:t>
+            </a:r>
+          </a:p>
+          <a:p>
+            <a:pPr algn="r"/>
             <a:endParaRPr lang="pt-BR" dirty="0">
               <a:solidFill>
                 <a:schemeClr val="bg1"/>
               </a:solidFill>
             </a:endParaRPr>
           </a:p>
+          <a:p>
+            <a:pPr algn="r"/>
+            <a:r>
+              <a:rPr lang="pt-BR" dirty="0">
+                <a:solidFill>
+                  <a:schemeClr val="bg1"/>
+                </a:solidFill>
+              </a:rPr>
+              <a:t>O sistema detecta automaticamente a qual empresa o usuário está vinculado.</a:t>
+            </a:r>
+          </a:p>
+        </p:txBody>
+      </p:sp>
+      <p:sp>
+        <p:nvSpPr>
+          <p:cNvPr id="18" name="CaixaDeTexto 17">
+            <a:extLst>
+              <a:ext uri="{FF2B5EF4-FFF2-40B4-BE49-F238E27FC236}">
+                <a16:creationId xmlns:a16="http://schemas.microsoft.com/office/drawing/2014/main" id="{8476F9E9-34A9-2451-5BF2-29A6C08412B8}"/>
+              </a:ext>
+            </a:extLst>
+          </p:cNvPr>
+          <p:cNvSpPr txBox="1"/>
+          <p:nvPr/>
+        </p:nvSpPr>
+        <p:spPr>
+          <a:xfrm>
+            <a:off x="838200" y="5061584"/>
+            <a:ext cx="2552018" cy="923330"/>
+          </a:xfrm>
+          <a:prstGeom prst="rect">
+            <a:avLst/>
+          </a:prstGeom>
+          <a:solidFill>
+            <a:srgbClr val="006600">
+              <a:alpha val="30196"/>
+            </a:srgbClr>
+          </a:solidFill>
+          <a:ln>
+            <a:solidFill>
+              <a:schemeClr val="tx1">
+                <a:lumMod val="65000"/>
+                <a:lumOff val="35000"/>
+              </a:schemeClr>
+            </a:solidFill>
+          </a:ln>
+        </p:spPr>
+        <p:txBody>
+          <a:bodyPr wrap="square" rtlCol="0">
+            <a:spAutoFit/>
+          </a:bodyPr>
+          <a:lstStyle/>
+          <a:p>
+            <a:pPr algn="r"/>
+            <a:r>
+              <a:rPr lang="pt-BR" dirty="0">
+                <a:solidFill>
+                  <a:schemeClr val="bg1"/>
+                </a:solidFill>
+              </a:rPr>
+              <a:t>Acesso imediato a uma conta gratuita para testar as funcionalidades</a:t>
+            </a:r>
+          </a:p>
+        </p:txBody>
+      </p:sp>
+      <mc:AlternateContent xmlns:mc="http://schemas.openxmlformats.org/markup-compatibility/2006">
+        <mc:Choice xmlns:p14="http://schemas.microsoft.com/office/powerpoint/2010/main" Requires="p14">
+          <p:contentPart p14:bwMode="auto" r:id="rId4">
+            <p14:nvContentPartPr>
+              <p14:cNvPr id="19" name="Tinta 18">
+                <a:extLst>
+                  <a:ext uri="{FF2B5EF4-FFF2-40B4-BE49-F238E27FC236}">
+                    <a16:creationId xmlns:a16="http://schemas.microsoft.com/office/drawing/2014/main" id="{575DE2F5-59E8-CE7E-AC2B-8ACF1A4978C8}"/>
+                  </a:ext>
+                </a:extLst>
+              </p14:cNvPr>
+              <p14:cNvContentPartPr/>
+              <p14:nvPr/>
+            </p14:nvContentPartPr>
+            <p14:xfrm>
+              <a:off x="3863583" y="4218978"/>
+              <a:ext cx="1623600" cy="387000"/>
+            </p14:xfrm>
+          </p:contentPart>
+        </mc:Choice>
+        <mc:Fallback>
+          <p:pic>
+            <p:nvPicPr>
+              <p:cNvPr id="19" name="Tinta 18">
+                <a:extLst>
+                  <a:ext uri="{FF2B5EF4-FFF2-40B4-BE49-F238E27FC236}">
+                    <a16:creationId xmlns:a16="http://schemas.microsoft.com/office/drawing/2014/main" id="{575DE2F5-59E8-CE7E-AC2B-8ACF1A4978C8}"/>
+                  </a:ext>
+                </a:extLst>
+              </p:cNvPr>
+              <p:cNvPicPr/>
+              <p:nvPr/>
+            </p:nvPicPr>
+            <p:blipFill>
+              <a:blip r:embed="rId5"/>
+              <a:stretch>
+                <a:fillRect/>
+              </a:stretch>
+            </p:blipFill>
+            <p:spPr>
+              <a:xfrm>
+                <a:off x="3849543" y="4204938"/>
+                <a:ext cx="1651680" cy="415440"/>
+              </a:xfrm>
+              <a:prstGeom prst="rect">
+                <a:avLst/>
+              </a:prstGeom>
+            </p:spPr>
+          </p:pic>
+        </mc:Fallback>
+      </mc:AlternateContent>
+      <p:pic>
+        <p:nvPicPr>
+          <p:cNvPr id="2050" name="Picture 2" descr="setas-png-1 (1) – Academia do Direito de Trânsito">
+            <a:extLst>
+              <a:ext uri="{FF2B5EF4-FFF2-40B4-BE49-F238E27FC236}">
+                <a16:creationId xmlns:a16="http://schemas.microsoft.com/office/drawing/2014/main" id="{76C21E98-D21D-654A-570E-64758931E05F}"/>
+              </a:ext>
+            </a:extLst>
+          </p:cNvPr>
+          <p:cNvPicPr>
+            <a:picLocks noChangeAspect="1" noChangeArrowheads="1"/>
+          </p:cNvPicPr>
+          <p:nvPr/>
+        </p:nvPicPr>
+        <p:blipFill rotWithShape="1">
+          <a:blip r:embed="rId6">
+            <a:extLst>
+              <a:ext uri="{28A0092B-C50C-407E-A947-70E740481C1C}">
+                <a14:useLocalDpi xmlns:a14="http://schemas.microsoft.com/office/drawing/2010/main" val="0"/>
+              </a:ext>
+            </a:extLst>
+          </a:blip>
+          <a:srcRect l="13298" r="60035" b="9226"/>
+          <a:stretch>
+            <a:fillRect/>
+          </a:stretch>
+        </p:blipFill>
+        <p:spPr bwMode="auto">
+          <a:xfrm rot="12048519" flipH="1">
+            <a:off x="3608288" y="4543676"/>
+            <a:ext cx="796595" cy="1035816"/>
+          </a:xfrm>
+          <a:prstGeom prst="rect">
+            <a:avLst/>
+          </a:prstGeom>
+          <a:noFill/>
+          <a:extLst>
+            <a:ext uri="{909E8E84-426E-40DD-AFC4-6F175D3DCCD1}">
+              <a14:hiddenFill xmlns:a14="http://schemas.microsoft.com/office/drawing/2010/main">
+                <a:solidFill>
+                  <a:srgbClr val="FFFFFF"/>
+                </a:solidFill>
+              </a14:hiddenFill>
+            </a:ext>
+          </a:extLst>
+        </p:spPr>
+      </p:pic>
+      <p:sp>
+        <p:nvSpPr>
+          <p:cNvPr id="21" name="CaixaDeTexto 20">
+            <a:extLst>
+              <a:ext uri="{FF2B5EF4-FFF2-40B4-BE49-F238E27FC236}">
+                <a16:creationId xmlns:a16="http://schemas.microsoft.com/office/drawing/2014/main" id="{23E7485B-AD62-C28A-88F7-294E5936BFDA}"/>
+              </a:ext>
+            </a:extLst>
+          </p:cNvPr>
+          <p:cNvSpPr txBox="1"/>
+          <p:nvPr/>
+        </p:nvSpPr>
+        <p:spPr>
+          <a:xfrm>
+            <a:off x="7665691" y="4646681"/>
+            <a:ext cx="2829943" cy="1477328"/>
+          </a:xfrm>
+          <a:prstGeom prst="rect">
+            <a:avLst/>
+          </a:prstGeom>
+          <a:solidFill>
+            <a:srgbClr val="006600">
+              <a:alpha val="30196"/>
+            </a:srgbClr>
+          </a:solidFill>
+          <a:ln>
+            <a:solidFill>
+              <a:schemeClr val="tx1">
+                <a:lumMod val="65000"/>
+                <a:lumOff val="35000"/>
+              </a:schemeClr>
+            </a:solidFill>
+          </a:ln>
+        </p:spPr>
+        <p:txBody>
+          <a:bodyPr wrap="square" rtlCol="0">
+            <a:spAutoFit/>
+          </a:bodyPr>
+          <a:lstStyle/>
+          <a:p>
+            <a:pPr algn="r"/>
+            <a:r>
+              <a:rPr lang="pt-BR" dirty="0">
+                <a:solidFill>
+                  <a:schemeClr val="bg1"/>
+                </a:solidFill>
+              </a:rPr>
+              <a:t>Automaticamente, detecta usuários que são avaliadores/admin em mais de uma empresa cliente (para agências de RH)</a:t>
+            </a:r>
+          </a:p>
+        </p:txBody>
+      </p:sp>
+    </p:spTree>
+    <p:extLst>
+      <p:ext uri="{BB962C8B-B14F-4D97-AF65-F5344CB8AC3E}">
+        <p14:creationId xmlns:p14="http://schemas.microsoft.com/office/powerpoint/2010/main" val="2767929576"/>
+      </p:ext>
+    </p:extLst>
+  </p:cSld>
+  <p:clrMapOvr>
+    <a:masterClrMapping/>
+  </p:clrMapOvr>
+</p:sld>
+</file>
+
+<file path=ppt/slides/slide7.xml><?xml version="1.0" encoding="utf-8"?>
+<p:sld xmlns:a="http://schemas.openxmlformats.org/drawingml/2006/main" xmlns:r="http://schemas.openxmlformats.org/officeDocument/2006/relationships" xmlns:p="http://schemas.openxmlformats.org/presentationml/2006/main">
+  <p:cSld>
+    <p:spTree>
+      <p:nvGrpSpPr>
+        <p:cNvPr id="1" name="">
+          <a:extLst>
+            <a:ext uri="{FF2B5EF4-FFF2-40B4-BE49-F238E27FC236}">
+              <a16:creationId xmlns:a16="http://schemas.microsoft.com/office/drawing/2014/main" id="{C4B4408C-BCEE-658B-F4F7-1C94D933C9A9}"/>
+            </a:ext>
+          </a:extLst>
+        </p:cNvPr>
+        <p:cNvGrpSpPr/>
+        <p:nvPr/>
+      </p:nvGrpSpPr>
+      <p:grpSpPr>
+        <a:xfrm>
+          <a:off x="0" y="0"/>
+          <a:ext cx="0" cy="0"/>
+          <a:chOff x="0" y="0"/>
+          <a:chExt cx="0" cy="0"/>
+        </a:xfrm>
+      </p:grpSpPr>
+      <p:sp>
+        <p:nvSpPr>
+          <p:cNvPr id="7" name="Retângulo 6">
+            <a:extLst>
+              <a:ext uri="{FF2B5EF4-FFF2-40B4-BE49-F238E27FC236}">
+                <a16:creationId xmlns:a16="http://schemas.microsoft.com/office/drawing/2014/main" id="{0A00DB99-92DB-1649-09B4-0DE6B456634A}"/>
+              </a:ext>
+            </a:extLst>
+          </p:cNvPr>
+          <p:cNvSpPr/>
+          <p:nvPr/>
+        </p:nvSpPr>
+        <p:spPr>
+          <a:xfrm>
+            <a:off x="0" y="0"/>
+            <a:ext cx="12192000" cy="1208092"/>
+          </a:xfrm>
+          <a:prstGeom prst="rect">
+            <a:avLst/>
+          </a:prstGeom>
+          <a:solidFill>
+            <a:srgbClr val="ABA595"/>
+          </a:solidFill>
+          <a:ln>
+            <a:noFill/>
+          </a:ln>
+        </p:spPr>
+        <p:style>
+          <a:lnRef idx="2">
+            <a:schemeClr val="accent1">
+              <a:shade val="15000"/>
+            </a:schemeClr>
+          </a:lnRef>
+          <a:fillRef idx="1">
+            <a:schemeClr val="accent1"/>
+          </a:fillRef>
+          <a:effectRef idx="0">
+            <a:schemeClr val="accent1"/>
+          </a:effectRef>
+          <a:fontRef idx="minor">
+            <a:schemeClr val="lt1"/>
+          </a:fontRef>
+        </p:style>
+        <p:txBody>
+          <a:bodyPr rtlCol="0" anchor="ctr"/>
+          <a:lstStyle/>
+          <a:p>
+            <a:pPr algn="ctr"/>
+            <a:endParaRPr lang="pt-BR" dirty="0"/>
+          </a:p>
+        </p:txBody>
+      </p:sp>
+      <p:sp>
+        <p:nvSpPr>
+          <p:cNvPr id="13" name="Espaço Reservado para Número de Slide 12">
+            <a:extLst>
+              <a:ext uri="{FF2B5EF4-FFF2-40B4-BE49-F238E27FC236}">
+                <a16:creationId xmlns:a16="http://schemas.microsoft.com/office/drawing/2014/main" id="{C84CDDE6-CF5F-1E67-E9D8-F405C9203148}"/>
+              </a:ext>
+            </a:extLst>
+          </p:cNvPr>
+          <p:cNvSpPr>
+            <a:spLocks noGrp="1"/>
+          </p:cNvSpPr>
+          <p:nvPr>
+            <p:ph type="sldNum" sz="quarter" idx="12"/>
+          </p:nvPr>
+        </p:nvSpPr>
+        <p:spPr/>
+        <p:txBody>
+          <a:bodyPr/>
+          <a:lstStyle/>
+          <a:p>
+            <a:fld id="{EC16DA9C-1B67-4414-87EE-2B247BC281D7}" type="slidenum">
+              <a:rPr lang="pt-BR" smtClean="0"/>
+              <a:t>7</a:t>
+            </a:fld>
+            <a:endParaRPr lang="pt-BR"/>
+          </a:p>
+        </p:txBody>
+      </p:sp>
+      <p:sp>
+        <p:nvSpPr>
+          <p:cNvPr id="11" name="CaixaDeTexto 10">
+            <a:extLst>
+              <a:ext uri="{FF2B5EF4-FFF2-40B4-BE49-F238E27FC236}">
+                <a16:creationId xmlns:a16="http://schemas.microsoft.com/office/drawing/2014/main" id="{A541928D-B8E2-3C38-122E-072FEE71292C}"/>
+              </a:ext>
+            </a:extLst>
+          </p:cNvPr>
+          <p:cNvSpPr txBox="1"/>
+          <p:nvPr/>
+        </p:nvSpPr>
+        <p:spPr>
+          <a:xfrm>
+            <a:off x="1231640" y="17523"/>
+            <a:ext cx="9728719" cy="769441"/>
+          </a:xfrm>
+          <a:prstGeom prst="rect">
+            <a:avLst/>
+          </a:prstGeom>
+          <a:noFill/>
+        </p:spPr>
+        <p:txBody>
+          <a:bodyPr wrap="square" rtlCol="0">
+            <a:spAutoFit/>
+          </a:bodyPr>
+          <a:lstStyle/>
+          <a:p>
+            <a:r>
+              <a:rPr lang="pt-BR" sz="4400" dirty="0">
+                <a:solidFill>
+                  <a:schemeClr val="tx1">
+                    <a:lumMod val="65000"/>
+                    <a:lumOff val="35000"/>
+                  </a:schemeClr>
+                </a:solidFill>
+                <a:latin typeface="Abadi Extra Light" panose="020B0204020104020204" pitchFamily="34" charset="0"/>
+              </a:rPr>
+              <a:t>R&amp;S com Objetividade e Transparência</a:t>
+            </a:r>
+          </a:p>
         </p:txBody>
       </p:sp>
       <p:pic>
@@ -9434,7 +11379,7 @@
           <p:cNvPr id="10" name="Imagem 9" descr="Interface gráfica do usuário, Aplicativo&#10;&#10;O conteúdo gerado por IA pode estar incorreto.">
             <a:extLst>
               <a:ext uri="{FF2B5EF4-FFF2-40B4-BE49-F238E27FC236}">
-                <a16:creationId xmlns:a16="http://schemas.microsoft.com/office/drawing/2014/main" id="{9EB4E9A1-8A2B-864D-B49F-9C58ADE042B1}"/>
+                <a16:creationId xmlns:a16="http://schemas.microsoft.com/office/drawing/2014/main" id="{2A671CFC-23CA-A53B-9C67-BED62A825C3C}"/>
               </a:ext>
             </a:extLst>
           </p:cNvPr>
@@ -9451,8 +11396,8 @@
         </p:blipFill>
         <p:spPr>
           <a:xfrm>
-            <a:off x="154800" y="3454860"/>
-            <a:ext cx="3570047" cy="2922704"/>
+            <a:off x="1627178" y="1434364"/>
+            <a:ext cx="3313272" cy="2712489"/>
           </a:xfrm>
           <a:prstGeom prst="rect">
             <a:avLst/>
@@ -9478,7 +11423,7 @@
           <p:cNvPr id="16" name="Imagem 15" descr="Interface gráfica do usuário, Aplicativo&#10;&#10;O conteúdo gerado por IA pode estar incorreto.">
             <a:extLst>
               <a:ext uri="{FF2B5EF4-FFF2-40B4-BE49-F238E27FC236}">
-                <a16:creationId xmlns:a16="http://schemas.microsoft.com/office/drawing/2014/main" id="{D2BB92E1-D2A5-9D90-FDE1-A94A417EE677}"/>
+                <a16:creationId xmlns:a16="http://schemas.microsoft.com/office/drawing/2014/main" id="{8D9C322A-2334-6EF3-3326-C3AB0BF1A9C7}"/>
               </a:ext>
             </a:extLst>
           </p:cNvPr>
@@ -9495,8 +11440,8 @@
         </p:blipFill>
         <p:spPr>
           <a:xfrm>
-            <a:off x="4001396" y="3454860"/>
-            <a:ext cx="3590067" cy="2922704"/>
+            <a:off x="2673805" y="3844762"/>
+            <a:ext cx="3550168" cy="2890221"/>
           </a:xfrm>
           <a:prstGeom prst="rect">
             <a:avLst/>
@@ -9522,7 +11467,7 @@
           <p:cNvPr id="20" name="Imagem 19" descr="Gráfico, Gráfico de barras&#10;&#10;O conteúdo gerado por IA pode estar incorreto.">
             <a:extLst>
               <a:ext uri="{FF2B5EF4-FFF2-40B4-BE49-F238E27FC236}">
-                <a16:creationId xmlns:a16="http://schemas.microsoft.com/office/drawing/2014/main" id="{B329DCCB-63B1-6108-07D6-EBEAB21180E4}"/>
+                <a16:creationId xmlns:a16="http://schemas.microsoft.com/office/drawing/2014/main" id="{FBC50D47-6026-E497-4266-DF02DE3D82CC}"/>
               </a:ext>
             </a:extLst>
           </p:cNvPr>
@@ -9539,8 +11484,8 @@
         </p:blipFill>
         <p:spPr>
           <a:xfrm>
-            <a:off x="7868012" y="3469620"/>
-            <a:ext cx="4138156" cy="2945174"/>
+            <a:off x="5627056" y="1376682"/>
+            <a:ext cx="3973316" cy="2827855"/>
           </a:xfrm>
           <a:prstGeom prst="rect">
             <a:avLst/>
@@ -9566,7 +11511,7 @@
           <p:cNvPr id="2" name="CaixaDeTexto 1">
             <a:extLst>
               <a:ext uri="{FF2B5EF4-FFF2-40B4-BE49-F238E27FC236}">
-                <a16:creationId xmlns:a16="http://schemas.microsoft.com/office/drawing/2014/main" id="{BA1763E2-8D6B-60A0-AA9D-B8683D4FD731}"/>
+                <a16:creationId xmlns:a16="http://schemas.microsoft.com/office/drawing/2014/main" id="{28B15AA0-C842-B82F-F2DB-0C48368C089C}"/>
               </a:ext>
             </a:extLst>
           </p:cNvPr>
@@ -9604,10 +11549,812 @@
           </a:p>
         </p:txBody>
       </p:sp>
+      <p:pic>
+        <p:nvPicPr>
+          <p:cNvPr id="5" name="Imagem 4" descr="Interface gráfica do usuário&#10;&#10;O conteúdo gerado por IA pode estar incorreto.">
+            <a:extLst>
+              <a:ext uri="{FF2B5EF4-FFF2-40B4-BE49-F238E27FC236}">
+                <a16:creationId xmlns:a16="http://schemas.microsoft.com/office/drawing/2014/main" id="{2FB37E33-F696-2D69-570D-333E96FC4EDB}"/>
+              </a:ext>
+            </a:extLst>
+          </p:cNvPr>
+          <p:cNvPicPr>
+            <a:picLocks noChangeAspect="1"/>
+          </p:cNvPicPr>
+          <p:nvPr/>
+        </p:nvPicPr>
+        <p:blipFill>
+          <a:blip r:embed="rId5"/>
+          <a:stretch>
+            <a:fillRect/>
+          </a:stretch>
+        </p:blipFill>
+        <p:spPr>
+          <a:xfrm>
+            <a:off x="8967021" y="2992970"/>
+            <a:ext cx="2639913" cy="3742013"/>
+          </a:xfrm>
+          <a:prstGeom prst="rect">
+            <a:avLst/>
+          </a:prstGeom>
+          <a:ln w="38100">
+            <a:solidFill>
+              <a:schemeClr val="bg1">
+                <a:lumMod val="75000"/>
+              </a:schemeClr>
+            </a:solidFill>
+          </a:ln>
+          <a:effectLst>
+            <a:outerShdw blurRad="292100" dist="139700" dir="2700000" algn="tl" rotWithShape="0">
+              <a:srgbClr val="333333">
+                <a:alpha val="65000"/>
+              </a:srgbClr>
+            </a:outerShdw>
+          </a:effectLst>
+        </p:spPr>
+      </p:pic>
     </p:spTree>
     <p:extLst>
       <p:ext uri="{BB962C8B-B14F-4D97-AF65-F5344CB8AC3E}">
-        <p14:creationId xmlns:p14="http://schemas.microsoft.com/office/powerpoint/2010/main" val="2767929576"/>
+        <p14:creationId xmlns:p14="http://schemas.microsoft.com/office/powerpoint/2010/main" val="2293371816"/>
+      </p:ext>
+    </p:extLst>
+  </p:cSld>
+  <p:clrMapOvr>
+    <a:masterClrMapping/>
+  </p:clrMapOvr>
+</p:sld>
+</file>
+
+<file path=ppt/slides/slide8.xml><?xml version="1.0" encoding="utf-8"?>
+<p:sld xmlns:a="http://schemas.openxmlformats.org/drawingml/2006/main" xmlns:r="http://schemas.openxmlformats.org/officeDocument/2006/relationships" xmlns:p="http://schemas.openxmlformats.org/presentationml/2006/main">
+  <p:cSld>
+    <p:spTree>
+      <p:nvGrpSpPr>
+        <p:cNvPr id="1" name="">
+          <a:extLst>
+            <a:ext uri="{FF2B5EF4-FFF2-40B4-BE49-F238E27FC236}">
+              <a16:creationId xmlns:a16="http://schemas.microsoft.com/office/drawing/2014/main" id="{FAB0C9C8-73D6-A737-9351-BEE0D888ABC4}"/>
+            </a:ext>
+          </a:extLst>
+        </p:cNvPr>
+        <p:cNvGrpSpPr/>
+        <p:nvPr/>
+      </p:nvGrpSpPr>
+      <p:grpSpPr>
+        <a:xfrm>
+          <a:off x="0" y="0"/>
+          <a:ext cx="0" cy="0"/>
+          <a:chOff x="0" y="0"/>
+          <a:chExt cx="0" cy="0"/>
+        </a:xfrm>
+      </p:grpSpPr>
+      <p:sp>
+        <p:nvSpPr>
+          <p:cNvPr id="7" name="Retângulo 6">
+            <a:extLst>
+              <a:ext uri="{FF2B5EF4-FFF2-40B4-BE49-F238E27FC236}">
+                <a16:creationId xmlns:a16="http://schemas.microsoft.com/office/drawing/2014/main" id="{C958D995-2DC8-C6DB-7464-B8A0D2BB6039}"/>
+              </a:ext>
+            </a:extLst>
+          </p:cNvPr>
+          <p:cNvSpPr/>
+          <p:nvPr/>
+        </p:nvSpPr>
+        <p:spPr>
+          <a:xfrm>
+            <a:off x="0" y="0"/>
+            <a:ext cx="12192000" cy="1208092"/>
+          </a:xfrm>
+          <a:prstGeom prst="rect">
+            <a:avLst/>
+          </a:prstGeom>
+          <a:solidFill>
+            <a:srgbClr val="ABA595"/>
+          </a:solidFill>
+          <a:ln>
+            <a:noFill/>
+          </a:ln>
+        </p:spPr>
+        <p:style>
+          <a:lnRef idx="2">
+            <a:schemeClr val="accent1">
+              <a:shade val="15000"/>
+            </a:schemeClr>
+          </a:lnRef>
+          <a:fillRef idx="1">
+            <a:schemeClr val="accent1"/>
+          </a:fillRef>
+          <a:effectRef idx="0">
+            <a:schemeClr val="accent1"/>
+          </a:effectRef>
+          <a:fontRef idx="minor">
+            <a:schemeClr val="lt1"/>
+          </a:fontRef>
+        </p:style>
+        <p:txBody>
+          <a:bodyPr rtlCol="0" anchor="ctr"/>
+          <a:lstStyle/>
+          <a:p>
+            <a:pPr algn="ctr"/>
+            <a:endParaRPr lang="pt-BR" dirty="0"/>
+          </a:p>
+        </p:txBody>
+      </p:sp>
+      <p:sp>
+        <p:nvSpPr>
+          <p:cNvPr id="13" name="Espaço Reservado para Número de Slide 12">
+            <a:extLst>
+              <a:ext uri="{FF2B5EF4-FFF2-40B4-BE49-F238E27FC236}">
+                <a16:creationId xmlns:a16="http://schemas.microsoft.com/office/drawing/2014/main" id="{313A3BCC-7F08-304B-6F7B-F766B9D011E9}"/>
+              </a:ext>
+            </a:extLst>
+          </p:cNvPr>
+          <p:cNvSpPr>
+            <a:spLocks noGrp="1"/>
+          </p:cNvSpPr>
+          <p:nvPr>
+            <p:ph type="sldNum" sz="quarter" idx="12"/>
+          </p:nvPr>
+        </p:nvSpPr>
+        <p:spPr/>
+        <p:txBody>
+          <a:bodyPr/>
+          <a:lstStyle/>
+          <a:p>
+            <a:fld id="{EC16DA9C-1B67-4414-87EE-2B247BC281D7}" type="slidenum">
+              <a:rPr lang="pt-BR" smtClean="0"/>
+              <a:t>8</a:t>
+            </a:fld>
+            <a:endParaRPr lang="pt-BR"/>
+          </a:p>
+        </p:txBody>
+      </p:sp>
+      <p:sp>
+        <p:nvSpPr>
+          <p:cNvPr id="11" name="CaixaDeTexto 10">
+            <a:extLst>
+              <a:ext uri="{FF2B5EF4-FFF2-40B4-BE49-F238E27FC236}">
+                <a16:creationId xmlns:a16="http://schemas.microsoft.com/office/drawing/2014/main" id="{F66E6753-A9BB-84E8-D48F-EBEFAEEA54D4}"/>
+              </a:ext>
+            </a:extLst>
+          </p:cNvPr>
+          <p:cNvSpPr txBox="1"/>
+          <p:nvPr/>
+        </p:nvSpPr>
+        <p:spPr>
+          <a:xfrm>
+            <a:off x="1231640" y="17523"/>
+            <a:ext cx="9728719" cy="769441"/>
+          </a:xfrm>
+          <a:prstGeom prst="rect">
+            <a:avLst/>
+          </a:prstGeom>
+          <a:noFill/>
+        </p:spPr>
+        <p:txBody>
+          <a:bodyPr wrap="square" rtlCol="0">
+            <a:spAutoFit/>
+          </a:bodyPr>
+          <a:lstStyle/>
+          <a:p>
+            <a:r>
+              <a:rPr lang="pt-BR" sz="4400" dirty="0">
+                <a:solidFill>
+                  <a:schemeClr val="tx1">
+                    <a:lumMod val="65000"/>
+                    <a:lumOff val="35000"/>
+                  </a:schemeClr>
+                </a:solidFill>
+                <a:latin typeface="Abadi Extra Light" panose="020B0204020104020204" pitchFamily="34" charset="0"/>
+              </a:rPr>
+              <a:t>R&amp;S com Objetividade e Transparência</a:t>
+            </a:r>
+          </a:p>
+        </p:txBody>
+      </p:sp>
+      <p:pic>
+        <p:nvPicPr>
+          <p:cNvPr id="10" name="Imagem 9" descr="Interface gráfica do usuário, Aplicativo&#10;&#10;O conteúdo gerado por IA pode estar incorreto.">
+            <a:extLst>
+              <a:ext uri="{FF2B5EF4-FFF2-40B4-BE49-F238E27FC236}">
+                <a16:creationId xmlns:a16="http://schemas.microsoft.com/office/drawing/2014/main" id="{0D0F57B5-0008-0372-FEF1-69C0F46260A4}"/>
+              </a:ext>
+            </a:extLst>
+          </p:cNvPr>
+          <p:cNvPicPr>
+            <a:picLocks noChangeAspect="1"/>
+          </p:cNvPicPr>
+          <p:nvPr/>
+        </p:nvPicPr>
+        <p:blipFill>
+          <a:blip r:embed="rId2"/>
+          <a:stretch>
+            <a:fillRect/>
+          </a:stretch>
+        </p:blipFill>
+        <p:spPr>
+          <a:xfrm>
+            <a:off x="1627178" y="1434364"/>
+            <a:ext cx="3313272" cy="2712489"/>
+          </a:xfrm>
+          <a:prstGeom prst="rect">
+            <a:avLst/>
+          </a:prstGeom>
+          <a:ln w="38100">
+            <a:solidFill>
+              <a:schemeClr val="bg1">
+                <a:lumMod val="75000"/>
+              </a:schemeClr>
+            </a:solidFill>
+          </a:ln>
+          <a:effectLst>
+            <a:outerShdw blurRad="292100" dist="139700" dir="2700000" algn="tl" rotWithShape="0">
+              <a:srgbClr val="333333">
+                <a:alpha val="65000"/>
+              </a:srgbClr>
+            </a:outerShdw>
+          </a:effectLst>
+        </p:spPr>
+      </p:pic>
+      <p:pic>
+        <p:nvPicPr>
+          <p:cNvPr id="16" name="Imagem 15" descr="Interface gráfica do usuário, Aplicativo&#10;&#10;O conteúdo gerado por IA pode estar incorreto.">
+            <a:extLst>
+              <a:ext uri="{FF2B5EF4-FFF2-40B4-BE49-F238E27FC236}">
+                <a16:creationId xmlns:a16="http://schemas.microsoft.com/office/drawing/2014/main" id="{36B0F01C-A562-3583-92B4-EC311CBD4D1C}"/>
+              </a:ext>
+            </a:extLst>
+          </p:cNvPr>
+          <p:cNvPicPr>
+            <a:picLocks noChangeAspect="1"/>
+          </p:cNvPicPr>
+          <p:nvPr/>
+        </p:nvPicPr>
+        <p:blipFill>
+          <a:blip r:embed="rId3"/>
+          <a:stretch>
+            <a:fillRect/>
+          </a:stretch>
+        </p:blipFill>
+        <p:spPr>
+          <a:xfrm>
+            <a:off x="2673805" y="3844762"/>
+            <a:ext cx="3550168" cy="2890221"/>
+          </a:xfrm>
+          <a:prstGeom prst="rect">
+            <a:avLst/>
+          </a:prstGeom>
+          <a:ln w="38100">
+            <a:solidFill>
+              <a:schemeClr val="bg1">
+                <a:lumMod val="75000"/>
+              </a:schemeClr>
+            </a:solidFill>
+          </a:ln>
+          <a:effectLst>
+            <a:outerShdw blurRad="292100" dist="139700" dir="2700000" algn="tl" rotWithShape="0">
+              <a:srgbClr val="333333">
+                <a:alpha val="65000"/>
+              </a:srgbClr>
+            </a:outerShdw>
+          </a:effectLst>
+        </p:spPr>
+      </p:pic>
+      <p:pic>
+        <p:nvPicPr>
+          <p:cNvPr id="20" name="Imagem 19" descr="Gráfico, Gráfico de barras&#10;&#10;O conteúdo gerado por IA pode estar incorreto.">
+            <a:extLst>
+              <a:ext uri="{FF2B5EF4-FFF2-40B4-BE49-F238E27FC236}">
+                <a16:creationId xmlns:a16="http://schemas.microsoft.com/office/drawing/2014/main" id="{B0AF4482-A72D-C3AE-7121-45C0D3FF31B3}"/>
+              </a:ext>
+            </a:extLst>
+          </p:cNvPr>
+          <p:cNvPicPr>
+            <a:picLocks noChangeAspect="1"/>
+          </p:cNvPicPr>
+          <p:nvPr/>
+        </p:nvPicPr>
+        <p:blipFill>
+          <a:blip r:embed="rId4"/>
+          <a:stretch>
+            <a:fillRect/>
+          </a:stretch>
+        </p:blipFill>
+        <p:spPr>
+          <a:xfrm>
+            <a:off x="5627056" y="1376682"/>
+            <a:ext cx="3973316" cy="2827855"/>
+          </a:xfrm>
+          <a:prstGeom prst="rect">
+            <a:avLst/>
+          </a:prstGeom>
+          <a:ln w="38100">
+            <a:solidFill>
+              <a:schemeClr val="bg1">
+                <a:lumMod val="75000"/>
+              </a:schemeClr>
+            </a:solidFill>
+          </a:ln>
+          <a:effectLst>
+            <a:outerShdw blurRad="292100" dist="139700" dir="2700000" algn="tl" rotWithShape="0">
+              <a:srgbClr val="333333">
+                <a:alpha val="65000"/>
+              </a:srgbClr>
+            </a:outerShdw>
+          </a:effectLst>
+        </p:spPr>
+      </p:pic>
+      <p:sp>
+        <p:nvSpPr>
+          <p:cNvPr id="2" name="CaixaDeTexto 1">
+            <a:extLst>
+              <a:ext uri="{FF2B5EF4-FFF2-40B4-BE49-F238E27FC236}">
+                <a16:creationId xmlns:a16="http://schemas.microsoft.com/office/drawing/2014/main" id="{3F1F6B8F-2EFB-508A-7471-66CD7B805B68}"/>
+              </a:ext>
+            </a:extLst>
+          </p:cNvPr>
+          <p:cNvSpPr txBox="1"/>
+          <p:nvPr/>
+        </p:nvSpPr>
+        <p:spPr>
+          <a:xfrm>
+            <a:off x="1299871" y="746427"/>
+            <a:ext cx="2747868" cy="461665"/>
+          </a:xfrm>
+          <a:prstGeom prst="rect">
+            <a:avLst/>
+          </a:prstGeom>
+          <a:noFill/>
+        </p:spPr>
+        <p:txBody>
+          <a:bodyPr wrap="none" rtlCol="0">
+            <a:spAutoFit/>
+          </a:bodyPr>
+          <a:lstStyle/>
+          <a:p>
+            <a:r>
+              <a:rPr lang="pt-BR" sz="2400" dirty="0">
+                <a:solidFill>
+                  <a:schemeClr val="tx1">
+                    <a:lumMod val="65000"/>
+                    <a:lumOff val="35000"/>
+                  </a:schemeClr>
+                </a:solidFill>
+                <a:latin typeface="Arial Nova" panose="020B0504020202020204" pitchFamily="34" charset="0"/>
+              </a:rPr>
+              <a:t>As funcionalidades</a:t>
+            </a:r>
+          </a:p>
+        </p:txBody>
+      </p:sp>
+      <p:pic>
+        <p:nvPicPr>
+          <p:cNvPr id="5" name="Imagem 4" descr="Interface gráfica do usuário&#10;&#10;O conteúdo gerado por IA pode estar incorreto.">
+            <a:extLst>
+              <a:ext uri="{FF2B5EF4-FFF2-40B4-BE49-F238E27FC236}">
+                <a16:creationId xmlns:a16="http://schemas.microsoft.com/office/drawing/2014/main" id="{C052FFDC-40E1-3F94-604C-7E60153A45BF}"/>
+              </a:ext>
+            </a:extLst>
+          </p:cNvPr>
+          <p:cNvPicPr>
+            <a:picLocks noChangeAspect="1"/>
+          </p:cNvPicPr>
+          <p:nvPr/>
+        </p:nvPicPr>
+        <p:blipFill>
+          <a:blip r:embed="rId5"/>
+          <a:stretch>
+            <a:fillRect/>
+          </a:stretch>
+        </p:blipFill>
+        <p:spPr>
+          <a:xfrm>
+            <a:off x="8967021" y="2992970"/>
+            <a:ext cx="2639913" cy="3742013"/>
+          </a:xfrm>
+          <a:prstGeom prst="rect">
+            <a:avLst/>
+          </a:prstGeom>
+          <a:ln w="38100">
+            <a:solidFill>
+              <a:schemeClr val="bg1">
+                <a:lumMod val="75000"/>
+              </a:schemeClr>
+            </a:solidFill>
+          </a:ln>
+          <a:effectLst>
+            <a:outerShdw blurRad="292100" dist="139700" dir="2700000" algn="tl" rotWithShape="0">
+              <a:srgbClr val="333333">
+                <a:alpha val="65000"/>
+              </a:srgbClr>
+            </a:outerShdw>
+          </a:effectLst>
+        </p:spPr>
+      </p:pic>
+    </p:spTree>
+    <p:extLst>
+      <p:ext uri="{BB962C8B-B14F-4D97-AF65-F5344CB8AC3E}">
+        <p14:creationId xmlns:p14="http://schemas.microsoft.com/office/powerpoint/2010/main" val="3289289253"/>
+      </p:ext>
+    </p:extLst>
+  </p:cSld>
+  <p:clrMapOvr>
+    <a:masterClrMapping/>
+  </p:clrMapOvr>
+</p:sld>
+</file>
+
+<file path=ppt/slides/slide9.xml><?xml version="1.0" encoding="utf-8"?>
+<p:sld xmlns:a="http://schemas.openxmlformats.org/drawingml/2006/main" xmlns:r="http://schemas.openxmlformats.org/officeDocument/2006/relationships" xmlns:p="http://schemas.openxmlformats.org/presentationml/2006/main">
+  <p:cSld>
+    <p:spTree>
+      <p:nvGrpSpPr>
+        <p:cNvPr id="1" name="">
+          <a:extLst>
+            <a:ext uri="{FF2B5EF4-FFF2-40B4-BE49-F238E27FC236}">
+              <a16:creationId xmlns:a16="http://schemas.microsoft.com/office/drawing/2014/main" id="{83A285C9-7B58-05A9-7F29-4ACDB5AFB70B}"/>
+            </a:ext>
+          </a:extLst>
+        </p:cNvPr>
+        <p:cNvGrpSpPr/>
+        <p:nvPr/>
+      </p:nvGrpSpPr>
+      <p:grpSpPr>
+        <a:xfrm>
+          <a:off x="0" y="0"/>
+          <a:ext cx="0" cy="0"/>
+          <a:chOff x="0" y="0"/>
+          <a:chExt cx="0" cy="0"/>
+        </a:xfrm>
+      </p:grpSpPr>
+      <p:sp>
+        <p:nvSpPr>
+          <p:cNvPr id="7" name="Retângulo 6">
+            <a:extLst>
+              <a:ext uri="{FF2B5EF4-FFF2-40B4-BE49-F238E27FC236}">
+                <a16:creationId xmlns:a16="http://schemas.microsoft.com/office/drawing/2014/main" id="{1A52EF7B-13AA-F2BD-0DCA-D525F0AD6180}"/>
+              </a:ext>
+            </a:extLst>
+          </p:cNvPr>
+          <p:cNvSpPr/>
+          <p:nvPr/>
+        </p:nvSpPr>
+        <p:spPr>
+          <a:xfrm>
+            <a:off x="0" y="0"/>
+            <a:ext cx="12192000" cy="1208092"/>
+          </a:xfrm>
+          <a:prstGeom prst="rect">
+            <a:avLst/>
+          </a:prstGeom>
+          <a:solidFill>
+            <a:srgbClr val="ABA595"/>
+          </a:solidFill>
+          <a:ln>
+            <a:noFill/>
+          </a:ln>
+        </p:spPr>
+        <p:style>
+          <a:lnRef idx="2">
+            <a:schemeClr val="accent1">
+              <a:shade val="15000"/>
+            </a:schemeClr>
+          </a:lnRef>
+          <a:fillRef idx="1">
+            <a:schemeClr val="accent1"/>
+          </a:fillRef>
+          <a:effectRef idx="0">
+            <a:schemeClr val="accent1"/>
+          </a:effectRef>
+          <a:fontRef idx="minor">
+            <a:schemeClr val="lt1"/>
+          </a:fontRef>
+        </p:style>
+        <p:txBody>
+          <a:bodyPr rtlCol="0" anchor="ctr"/>
+          <a:lstStyle/>
+          <a:p>
+            <a:pPr algn="ctr"/>
+            <a:endParaRPr lang="pt-BR" dirty="0"/>
+          </a:p>
+        </p:txBody>
+      </p:sp>
+      <p:sp>
+        <p:nvSpPr>
+          <p:cNvPr id="13" name="Espaço Reservado para Número de Slide 12">
+            <a:extLst>
+              <a:ext uri="{FF2B5EF4-FFF2-40B4-BE49-F238E27FC236}">
+                <a16:creationId xmlns:a16="http://schemas.microsoft.com/office/drawing/2014/main" id="{81D20513-1A8E-B79B-0C15-9DAAD298C0F5}"/>
+              </a:ext>
+            </a:extLst>
+          </p:cNvPr>
+          <p:cNvSpPr>
+            <a:spLocks noGrp="1"/>
+          </p:cNvSpPr>
+          <p:nvPr>
+            <p:ph type="sldNum" sz="quarter" idx="12"/>
+          </p:nvPr>
+        </p:nvSpPr>
+        <p:spPr/>
+        <p:txBody>
+          <a:bodyPr/>
+          <a:lstStyle/>
+          <a:p>
+            <a:fld id="{EC16DA9C-1B67-4414-87EE-2B247BC281D7}" type="slidenum">
+              <a:rPr lang="pt-BR" smtClean="0"/>
+              <a:t>9</a:t>
+            </a:fld>
+            <a:endParaRPr lang="pt-BR"/>
+          </a:p>
+        </p:txBody>
+      </p:sp>
+      <p:sp>
+        <p:nvSpPr>
+          <p:cNvPr id="11" name="CaixaDeTexto 10">
+            <a:extLst>
+              <a:ext uri="{FF2B5EF4-FFF2-40B4-BE49-F238E27FC236}">
+                <a16:creationId xmlns:a16="http://schemas.microsoft.com/office/drawing/2014/main" id="{CEB38247-437C-5861-D146-9EC5F02BF867}"/>
+              </a:ext>
+            </a:extLst>
+          </p:cNvPr>
+          <p:cNvSpPr txBox="1"/>
+          <p:nvPr/>
+        </p:nvSpPr>
+        <p:spPr>
+          <a:xfrm>
+            <a:off x="1231640" y="17523"/>
+            <a:ext cx="9728719" cy="769441"/>
+          </a:xfrm>
+          <a:prstGeom prst="rect">
+            <a:avLst/>
+          </a:prstGeom>
+          <a:noFill/>
+        </p:spPr>
+        <p:txBody>
+          <a:bodyPr wrap="square" rtlCol="0">
+            <a:spAutoFit/>
+          </a:bodyPr>
+          <a:lstStyle/>
+          <a:p>
+            <a:r>
+              <a:rPr lang="pt-BR" sz="4400" dirty="0">
+                <a:solidFill>
+                  <a:schemeClr val="tx1">
+                    <a:lumMod val="65000"/>
+                    <a:lumOff val="35000"/>
+                  </a:schemeClr>
+                </a:solidFill>
+                <a:latin typeface="Abadi Extra Light" panose="020B0204020104020204" pitchFamily="34" charset="0"/>
+              </a:rPr>
+              <a:t>R&amp;S com Objetividade e Transparência</a:t>
+            </a:r>
+          </a:p>
+        </p:txBody>
+      </p:sp>
+      <p:pic>
+        <p:nvPicPr>
+          <p:cNvPr id="10" name="Imagem 9" descr="Interface gráfica do usuário, Aplicativo&#10;&#10;O conteúdo gerado por IA pode estar incorreto.">
+            <a:extLst>
+              <a:ext uri="{FF2B5EF4-FFF2-40B4-BE49-F238E27FC236}">
+                <a16:creationId xmlns:a16="http://schemas.microsoft.com/office/drawing/2014/main" id="{C2A9C702-1E73-EE2F-2BD5-CEB55C96D1E4}"/>
+              </a:ext>
+            </a:extLst>
+          </p:cNvPr>
+          <p:cNvPicPr>
+            <a:picLocks noChangeAspect="1"/>
+          </p:cNvPicPr>
+          <p:nvPr/>
+        </p:nvPicPr>
+        <p:blipFill>
+          <a:blip r:embed="rId2"/>
+          <a:stretch>
+            <a:fillRect/>
+          </a:stretch>
+        </p:blipFill>
+        <p:spPr>
+          <a:xfrm>
+            <a:off x="1627178" y="1434364"/>
+            <a:ext cx="3313272" cy="2712489"/>
+          </a:xfrm>
+          <a:prstGeom prst="rect">
+            <a:avLst/>
+          </a:prstGeom>
+          <a:ln w="38100">
+            <a:solidFill>
+              <a:schemeClr val="bg1">
+                <a:lumMod val="75000"/>
+              </a:schemeClr>
+            </a:solidFill>
+          </a:ln>
+          <a:effectLst>
+            <a:outerShdw blurRad="292100" dist="139700" dir="2700000" algn="tl" rotWithShape="0">
+              <a:srgbClr val="333333">
+                <a:alpha val="65000"/>
+              </a:srgbClr>
+            </a:outerShdw>
+          </a:effectLst>
+        </p:spPr>
+      </p:pic>
+      <p:pic>
+        <p:nvPicPr>
+          <p:cNvPr id="16" name="Imagem 15" descr="Interface gráfica do usuário, Aplicativo&#10;&#10;O conteúdo gerado por IA pode estar incorreto.">
+            <a:extLst>
+              <a:ext uri="{FF2B5EF4-FFF2-40B4-BE49-F238E27FC236}">
+                <a16:creationId xmlns:a16="http://schemas.microsoft.com/office/drawing/2014/main" id="{D2C29180-D159-1C0D-92BB-981EA2B5354F}"/>
+              </a:ext>
+            </a:extLst>
+          </p:cNvPr>
+          <p:cNvPicPr>
+            <a:picLocks noChangeAspect="1"/>
+          </p:cNvPicPr>
+          <p:nvPr/>
+        </p:nvPicPr>
+        <p:blipFill>
+          <a:blip r:embed="rId3"/>
+          <a:stretch>
+            <a:fillRect/>
+          </a:stretch>
+        </p:blipFill>
+        <p:spPr>
+          <a:xfrm>
+            <a:off x="2673805" y="3844762"/>
+            <a:ext cx="3550168" cy="2890221"/>
+          </a:xfrm>
+          <a:prstGeom prst="rect">
+            <a:avLst/>
+          </a:prstGeom>
+          <a:ln w="38100">
+            <a:solidFill>
+              <a:schemeClr val="bg1">
+                <a:lumMod val="75000"/>
+              </a:schemeClr>
+            </a:solidFill>
+          </a:ln>
+          <a:effectLst>
+            <a:outerShdw blurRad="292100" dist="139700" dir="2700000" algn="tl" rotWithShape="0">
+              <a:srgbClr val="333333">
+                <a:alpha val="65000"/>
+              </a:srgbClr>
+            </a:outerShdw>
+          </a:effectLst>
+        </p:spPr>
+      </p:pic>
+      <p:pic>
+        <p:nvPicPr>
+          <p:cNvPr id="20" name="Imagem 19" descr="Gráfico, Gráfico de barras&#10;&#10;O conteúdo gerado por IA pode estar incorreto.">
+            <a:extLst>
+              <a:ext uri="{FF2B5EF4-FFF2-40B4-BE49-F238E27FC236}">
+                <a16:creationId xmlns:a16="http://schemas.microsoft.com/office/drawing/2014/main" id="{A8E1F8AD-56A3-E977-C06C-AD8DD29E771D}"/>
+              </a:ext>
+            </a:extLst>
+          </p:cNvPr>
+          <p:cNvPicPr>
+            <a:picLocks noChangeAspect="1"/>
+          </p:cNvPicPr>
+          <p:nvPr/>
+        </p:nvPicPr>
+        <p:blipFill>
+          <a:blip r:embed="rId4"/>
+          <a:stretch>
+            <a:fillRect/>
+          </a:stretch>
+        </p:blipFill>
+        <p:spPr>
+          <a:xfrm>
+            <a:off x="5627056" y="1376682"/>
+            <a:ext cx="3973316" cy="2827855"/>
+          </a:xfrm>
+          <a:prstGeom prst="rect">
+            <a:avLst/>
+          </a:prstGeom>
+          <a:ln w="38100">
+            <a:solidFill>
+              <a:schemeClr val="bg1">
+                <a:lumMod val="75000"/>
+              </a:schemeClr>
+            </a:solidFill>
+          </a:ln>
+          <a:effectLst>
+            <a:outerShdw blurRad="292100" dist="139700" dir="2700000" algn="tl" rotWithShape="0">
+              <a:srgbClr val="333333">
+                <a:alpha val="65000"/>
+              </a:srgbClr>
+            </a:outerShdw>
+          </a:effectLst>
+        </p:spPr>
+      </p:pic>
+      <p:sp>
+        <p:nvSpPr>
+          <p:cNvPr id="2" name="CaixaDeTexto 1">
+            <a:extLst>
+              <a:ext uri="{FF2B5EF4-FFF2-40B4-BE49-F238E27FC236}">
+                <a16:creationId xmlns:a16="http://schemas.microsoft.com/office/drawing/2014/main" id="{DFF9D908-F030-C99B-6FA6-40B3FB24611B}"/>
+              </a:ext>
+            </a:extLst>
+          </p:cNvPr>
+          <p:cNvSpPr txBox="1"/>
+          <p:nvPr/>
+        </p:nvSpPr>
+        <p:spPr>
+          <a:xfrm>
+            <a:off x="1299871" y="746427"/>
+            <a:ext cx="2747868" cy="461665"/>
+          </a:xfrm>
+          <a:prstGeom prst="rect">
+            <a:avLst/>
+          </a:prstGeom>
+          <a:noFill/>
+        </p:spPr>
+        <p:txBody>
+          <a:bodyPr wrap="none" rtlCol="0">
+            <a:spAutoFit/>
+          </a:bodyPr>
+          <a:lstStyle/>
+          <a:p>
+            <a:r>
+              <a:rPr lang="pt-BR" sz="2400" dirty="0">
+                <a:solidFill>
+                  <a:schemeClr val="tx1">
+                    <a:lumMod val="65000"/>
+                    <a:lumOff val="35000"/>
+                  </a:schemeClr>
+                </a:solidFill>
+                <a:latin typeface="Arial Nova" panose="020B0504020202020204" pitchFamily="34" charset="0"/>
+              </a:rPr>
+              <a:t>As funcionalidades</a:t>
+            </a:r>
+          </a:p>
+        </p:txBody>
+      </p:sp>
+      <p:pic>
+        <p:nvPicPr>
+          <p:cNvPr id="5" name="Imagem 4" descr="Interface gráfica do usuário&#10;&#10;O conteúdo gerado por IA pode estar incorreto.">
+            <a:extLst>
+              <a:ext uri="{FF2B5EF4-FFF2-40B4-BE49-F238E27FC236}">
+                <a16:creationId xmlns:a16="http://schemas.microsoft.com/office/drawing/2014/main" id="{34AF15BA-4C16-B42E-C709-CFECDCCEE986}"/>
+              </a:ext>
+            </a:extLst>
+          </p:cNvPr>
+          <p:cNvPicPr>
+            <a:picLocks noChangeAspect="1"/>
+          </p:cNvPicPr>
+          <p:nvPr/>
+        </p:nvPicPr>
+        <p:blipFill>
+          <a:blip r:embed="rId5"/>
+          <a:stretch>
+            <a:fillRect/>
+          </a:stretch>
+        </p:blipFill>
+        <p:spPr>
+          <a:xfrm>
+            <a:off x="8967021" y="2992970"/>
+            <a:ext cx="2639913" cy="3742013"/>
+          </a:xfrm>
+          <a:prstGeom prst="rect">
+            <a:avLst/>
+          </a:prstGeom>
+          <a:ln w="38100">
+            <a:solidFill>
+              <a:schemeClr val="bg1">
+                <a:lumMod val="75000"/>
+              </a:schemeClr>
+            </a:solidFill>
+          </a:ln>
+          <a:effectLst>
+            <a:outerShdw blurRad="292100" dist="139700" dir="2700000" algn="tl" rotWithShape="0">
+              <a:srgbClr val="333333">
+                <a:alpha val="65000"/>
+              </a:srgbClr>
+            </a:outerShdw>
+          </a:effectLst>
+        </p:spPr>
+      </p:pic>
+    </p:spTree>
+    <p:extLst>
+      <p:ext uri="{BB962C8B-B14F-4D97-AF65-F5344CB8AC3E}">
+        <p14:creationId xmlns:p14="http://schemas.microsoft.com/office/powerpoint/2010/main" val="2164991741"/>
       </p:ext>
     </p:extLst>
   </p:cSld>

</xml_diff>

<commit_message>
Fix: Correcao final JobDetails e arquivos pendentes
</commit_message>
<xml_diff>
--- a/Novva R&S - Pitch Deck.pptx
+++ b/Novva R&S - Pitch Deck.pptx
@@ -5,7 +5,7 @@
     <p:sldMasterId id="2147483648" r:id="rId1"/>
   </p:sldMasterIdLst>
   <p:notesMasterIdLst>
-    <p:notesMasterId r:id="rId11"/>
+    <p:notesMasterId r:id="rId15"/>
   </p:notesMasterIdLst>
   <p:sldIdLst>
     <p:sldId id="267" r:id="rId2"/>
@@ -15,8 +15,12 @@
     <p:sldId id="270" r:id="rId6"/>
     <p:sldId id="269" r:id="rId7"/>
     <p:sldId id="271" r:id="rId8"/>
-    <p:sldId id="272" r:id="rId9"/>
-    <p:sldId id="273" r:id="rId10"/>
+    <p:sldId id="274" r:id="rId9"/>
+    <p:sldId id="275" r:id="rId10"/>
+    <p:sldId id="272" r:id="rId11"/>
+    <p:sldId id="276" r:id="rId12"/>
+    <p:sldId id="277" r:id="rId13"/>
+    <p:sldId id="278" r:id="rId14"/>
   </p:sldIdLst>
   <p:sldSz cx="12192000" cy="6858000"/>
   <p:notesSz cx="6858000" cy="9144000"/>
@@ -3149,6 +3153,34 @@
 </inkml:ink>
 </file>
 
+<file path=ppt/ink/ink2.xml><?xml version="1.0" encoding="utf-8"?>
+<inkml:ink xmlns:inkml="http://www.w3.org/2003/InkML">
+  <inkml:definitions>
+    <inkml:context xml:id="ctx0">
+      <inkml:inkSource xml:id="inkSrc0">
+        <inkml:traceFormat>
+          <inkml:channel name="X" type="integer" min="-2.14748E9" max="2.14748E9" units="cm"/>
+          <inkml:channel name="Y" type="integer" min="-2.14748E9" max="2.14748E9" units="cm"/>
+          <inkml:channel name="F" type="integer" max="32767" units="dev"/>
+        </inkml:traceFormat>
+        <inkml:channelProperties>
+          <inkml:channelProperty channel="X" name="resolution" value="1000" units="1/cm"/>
+          <inkml:channelProperty channel="Y" name="resolution" value="1000" units="1/cm"/>
+          <inkml:channelProperty channel="F" name="resolution" value="0" units="1/dev"/>
+        </inkml:channelProperties>
+      </inkml:inkSource>
+      <inkml:timestamp xml:id="ts0" timeString="2026-01-15T00:21:52.143"/>
+    </inkml:context>
+    <inkml:brush xml:id="br0">
+      <inkml:brushProperty name="width" value="0.07938" units="cm"/>
+      <inkml:brushProperty name="height" value="0.07938" units="cm"/>
+      <inkml:brushProperty name="color" value="#E71224"/>
+    </inkml:brush>
+  </inkml:definitions>
+  <inkml:trace contextRef="#ctx0" brushRef="#br0">1768 32 24575,'-52'-10'0,"8"0"0,-55 2 0,0 4 0,-105 11 0,185-4 0,2 0 0,-1 1 0,-29 11 0,-10 3 0,13-4 0,1 1 0,-47 24 0,45-18 0,-71 21 0,77-29 0,0 2 0,-40 21 0,58-24 0,-2-1 0,0-1 0,0-1 0,0-1 0,-1-1 0,0-1 0,-1-1 0,-41 3 0,52-8 0,0 1 0,0 1 0,1 0 0,-1 1 0,1 1 0,-1 0 0,1 0 0,0 2 0,0-1 0,1 2 0,0-1 0,-14 11 0,9-5 0,0 1 0,1 0 0,1 2 0,0-1 0,0 2 0,-12 18 0,20-24 0,0-1 0,1 1 0,0 0 0,1 0 0,0 0 0,1 1 0,0 0 0,1 0 0,0 0 0,1 0 0,0 1 0,-1 21 0,4-27 0,0 0 0,0 0 0,0-1 0,1 1 0,0 0 0,0 0 0,1-1 0,0 0 0,0 1 0,0-1 0,0 0 0,1 0 0,0-1 0,0 1 0,0-1 0,0 0 0,1 0 0,0 0 0,9 5 0,12 7 0,1-1 0,51 21 0,-20-11 0,-15-5 0,1-2 0,1-2 0,1-2 0,0-2 0,76 10 0,245 3 0,-327-24 0,537 21 0,613 15 0,-791-11 0,-291-24 0,52 2 0,251-25 0,-364 11 0,-1-1 0,0-2 0,81-37 0,-79 30 0,1 2 0,82-20 0,-120 36 0,1-1 0,-1 0 0,0 0 0,0-1 0,0-1 0,-1 0 0,0 0 0,0-1 0,17-12 0,-24 15 0,0 0 0,0 0 0,0 0 0,-1 0 0,1-1 0,-1 1 0,0-1 0,0 0 0,0 1 0,0-1 0,0 0 0,-1 0 0,0 0 0,0 0 0,0-1 0,0 1 0,-1 0 0,0 0 0,0-1 0,0 1 0,0 0 0,0 0 0,-1 0 0,0-1 0,0 1 0,0 0 0,0 0 0,-1 0 0,-2-5 0,-3-4 0,0 0 0,-1 1 0,-1 1 0,1-1 0,-2 1 0,1 1 0,-2 0 0,1 0 0,-1 1 0,-1 0 0,-17-10 0,-19-9 0,-81-33 0,108 51 0,-53-20 0,-2 4 0,-140-31 0,-164-6 0,237 43 0,-681-93 0,663 101 0,-196 11 0,154 4 0,156-8-1365,31-1-5461</inkml:trace>
+</inkml:ink>
+</file>
+
 <file path=ppt/notesMasters/notesMaster1.xml><?xml version="1.0" encoding="utf-8"?>
 <p:notesMaster xmlns:a="http://schemas.openxmlformats.org/drawingml/2006/main" xmlns:r="http://schemas.openxmlformats.org/officeDocument/2006/relationships" xmlns:p="http://schemas.openxmlformats.org/presentationml/2006/main">
   <p:cSld>
@@ -3657,6 +3689,114 @@
     <p:extLst>
       <p:ext uri="{BB962C8B-B14F-4D97-AF65-F5344CB8AC3E}">
         <p14:creationId xmlns:p14="http://schemas.microsoft.com/office/powerpoint/2010/main" val="3303778335"/>
+      </p:ext>
+    </p:extLst>
+  </p:cSld>
+  <p:clrMapOvr>
+    <a:masterClrMapping/>
+  </p:clrMapOvr>
+</p:notes>
+</file>
+
+<file path=ppt/notesSlides/notesSlide3.xml><?xml version="1.0" encoding="utf-8"?>
+<p:notes xmlns:a="http://schemas.openxmlformats.org/drawingml/2006/main" xmlns:r="http://schemas.openxmlformats.org/officeDocument/2006/relationships" xmlns:p="http://schemas.openxmlformats.org/presentationml/2006/main">
+  <p:cSld>
+    <p:spTree>
+      <p:nvGrpSpPr>
+        <p:cNvPr id="1" name="">
+          <a:extLst>
+            <a:ext uri="{FF2B5EF4-FFF2-40B4-BE49-F238E27FC236}">
+              <a16:creationId xmlns:a16="http://schemas.microsoft.com/office/drawing/2014/main" id="{BCA83E3D-CF58-7F99-9845-E9F649DD3855}"/>
+            </a:ext>
+          </a:extLst>
+        </p:cNvPr>
+        <p:cNvGrpSpPr/>
+        <p:nvPr/>
+      </p:nvGrpSpPr>
+      <p:grpSpPr>
+        <a:xfrm>
+          <a:off x="0" y="0"/>
+          <a:ext cx="0" cy="0"/>
+          <a:chOff x="0" y="0"/>
+          <a:chExt cx="0" cy="0"/>
+        </a:xfrm>
+      </p:grpSpPr>
+      <p:sp>
+        <p:nvSpPr>
+          <p:cNvPr id="2" name="Espaço Reservado para Imagem de Slide 1">
+            <a:extLst>
+              <a:ext uri="{FF2B5EF4-FFF2-40B4-BE49-F238E27FC236}">
+                <a16:creationId xmlns:a16="http://schemas.microsoft.com/office/drawing/2014/main" id="{969B97D2-ACE2-FA67-3A81-7A768097FCC7}"/>
+              </a:ext>
+            </a:extLst>
+          </p:cNvPr>
+          <p:cNvSpPr>
+            <a:spLocks noGrp="1" noRot="1" noChangeAspect="1"/>
+          </p:cNvSpPr>
+          <p:nvPr>
+            <p:ph type="sldImg"/>
+          </p:nvPr>
+        </p:nvSpPr>
+        <p:spPr/>
+      </p:sp>
+      <p:sp>
+        <p:nvSpPr>
+          <p:cNvPr id="3" name="Espaço Reservado para Anotações 2">
+            <a:extLst>
+              <a:ext uri="{FF2B5EF4-FFF2-40B4-BE49-F238E27FC236}">
+                <a16:creationId xmlns:a16="http://schemas.microsoft.com/office/drawing/2014/main" id="{5D5D224E-2A52-73D6-139A-88CC98D68F22}"/>
+              </a:ext>
+            </a:extLst>
+          </p:cNvPr>
+          <p:cNvSpPr>
+            <a:spLocks noGrp="1"/>
+          </p:cNvSpPr>
+          <p:nvPr>
+            <p:ph type="body" idx="1"/>
+          </p:nvPr>
+        </p:nvSpPr>
+        <p:spPr/>
+        <p:txBody>
+          <a:bodyPr/>
+          <a:lstStyle/>
+          <a:p>
+            <a:endParaRPr lang="pt-BR" dirty="0"/>
+          </a:p>
+        </p:txBody>
+      </p:sp>
+      <p:sp>
+        <p:nvSpPr>
+          <p:cNvPr id="4" name="Espaço Reservado para Número de Slide 3">
+            <a:extLst>
+              <a:ext uri="{FF2B5EF4-FFF2-40B4-BE49-F238E27FC236}">
+                <a16:creationId xmlns:a16="http://schemas.microsoft.com/office/drawing/2014/main" id="{07F67C60-A539-5137-D901-CE726772F98A}"/>
+              </a:ext>
+            </a:extLst>
+          </p:cNvPr>
+          <p:cNvSpPr>
+            <a:spLocks noGrp="1"/>
+          </p:cNvSpPr>
+          <p:nvPr>
+            <p:ph type="sldNum" sz="quarter" idx="5"/>
+          </p:nvPr>
+        </p:nvSpPr>
+        <p:spPr/>
+        <p:txBody>
+          <a:bodyPr/>
+          <a:lstStyle/>
+          <a:p>
+            <a:fld id="{05BB08CD-6665-49F1-885F-6B82713B202B}" type="slidenum">
+              <a:rPr lang="pt-BR" smtClean="0"/>
+              <a:t>13</a:t>
+            </a:fld>
+            <a:endParaRPr lang="pt-BR"/>
+          </a:p>
+        </p:txBody>
+      </p:sp>
+    </p:spTree>
+    <p:extLst>
+      <p:ext uri="{BB962C8B-B14F-4D97-AF65-F5344CB8AC3E}">
+        <p14:creationId xmlns:p14="http://schemas.microsoft.com/office/powerpoint/2010/main" val="91310260"/>
       </p:ext>
     </p:extLst>
   </p:cSld>
@@ -7114,6 +7254,1271 @@
     <p:extLst>
       <p:ext uri="{BB962C8B-B14F-4D97-AF65-F5344CB8AC3E}">
         <p14:creationId xmlns:p14="http://schemas.microsoft.com/office/powerpoint/2010/main" val="1499394520"/>
+      </p:ext>
+    </p:extLst>
+  </p:cSld>
+  <p:clrMapOvr>
+    <a:masterClrMapping/>
+  </p:clrMapOvr>
+</p:sld>
+</file>
+
+<file path=ppt/slides/slide10.xml><?xml version="1.0" encoding="utf-8"?>
+<p:sld xmlns:a="http://schemas.openxmlformats.org/drawingml/2006/main" xmlns:r="http://schemas.openxmlformats.org/officeDocument/2006/relationships" xmlns:p="http://schemas.openxmlformats.org/presentationml/2006/main">
+  <p:cSld>
+    <p:spTree>
+      <p:nvGrpSpPr>
+        <p:cNvPr id="1" name="">
+          <a:extLst>
+            <a:ext uri="{FF2B5EF4-FFF2-40B4-BE49-F238E27FC236}">
+              <a16:creationId xmlns:a16="http://schemas.microsoft.com/office/drawing/2014/main" id="{FAB0C9C8-73D6-A737-9351-BEE0D888ABC4}"/>
+            </a:ext>
+          </a:extLst>
+        </p:cNvPr>
+        <p:cNvGrpSpPr/>
+        <p:nvPr/>
+      </p:nvGrpSpPr>
+      <p:grpSpPr>
+        <a:xfrm>
+          <a:off x="0" y="0"/>
+          <a:ext cx="0" cy="0"/>
+          <a:chOff x="0" y="0"/>
+          <a:chExt cx="0" cy="0"/>
+        </a:xfrm>
+      </p:grpSpPr>
+      <p:sp>
+        <p:nvSpPr>
+          <p:cNvPr id="7" name="Retângulo 6">
+            <a:extLst>
+              <a:ext uri="{FF2B5EF4-FFF2-40B4-BE49-F238E27FC236}">
+                <a16:creationId xmlns:a16="http://schemas.microsoft.com/office/drawing/2014/main" id="{C958D995-2DC8-C6DB-7464-B8A0D2BB6039}"/>
+              </a:ext>
+            </a:extLst>
+          </p:cNvPr>
+          <p:cNvSpPr/>
+          <p:nvPr/>
+        </p:nvSpPr>
+        <p:spPr>
+          <a:xfrm>
+            <a:off x="0" y="0"/>
+            <a:ext cx="12192000" cy="1208092"/>
+          </a:xfrm>
+          <a:prstGeom prst="rect">
+            <a:avLst/>
+          </a:prstGeom>
+          <a:solidFill>
+            <a:srgbClr val="ABA595"/>
+          </a:solidFill>
+          <a:ln>
+            <a:noFill/>
+          </a:ln>
+        </p:spPr>
+        <p:style>
+          <a:lnRef idx="2">
+            <a:schemeClr val="accent1">
+              <a:shade val="15000"/>
+            </a:schemeClr>
+          </a:lnRef>
+          <a:fillRef idx="1">
+            <a:schemeClr val="accent1"/>
+          </a:fillRef>
+          <a:effectRef idx="0">
+            <a:schemeClr val="accent1"/>
+          </a:effectRef>
+          <a:fontRef idx="minor">
+            <a:schemeClr val="lt1"/>
+          </a:fontRef>
+        </p:style>
+        <p:txBody>
+          <a:bodyPr rtlCol="0" anchor="ctr"/>
+          <a:lstStyle/>
+          <a:p>
+            <a:pPr algn="ctr"/>
+            <a:endParaRPr lang="pt-BR" dirty="0"/>
+          </a:p>
+        </p:txBody>
+      </p:sp>
+      <p:sp>
+        <p:nvSpPr>
+          <p:cNvPr id="13" name="Espaço Reservado para Número de Slide 12">
+            <a:extLst>
+              <a:ext uri="{FF2B5EF4-FFF2-40B4-BE49-F238E27FC236}">
+                <a16:creationId xmlns:a16="http://schemas.microsoft.com/office/drawing/2014/main" id="{313A3BCC-7F08-304B-6F7B-F766B9D011E9}"/>
+              </a:ext>
+            </a:extLst>
+          </p:cNvPr>
+          <p:cNvSpPr>
+            <a:spLocks noGrp="1"/>
+          </p:cNvSpPr>
+          <p:nvPr>
+            <p:ph type="sldNum" sz="quarter" idx="12"/>
+          </p:nvPr>
+        </p:nvSpPr>
+        <p:spPr>
+          <a:xfrm>
+            <a:off x="9311915" y="6475352"/>
+            <a:ext cx="2743200" cy="365125"/>
+          </a:xfrm>
+        </p:spPr>
+        <p:txBody>
+          <a:bodyPr/>
+          <a:lstStyle/>
+          <a:p>
+            <a:fld id="{EC16DA9C-1B67-4414-87EE-2B247BC281D7}" type="slidenum">
+              <a:rPr lang="pt-BR" smtClean="0">
+                <a:solidFill>
+                  <a:schemeClr val="bg1"/>
+                </a:solidFill>
+              </a:rPr>
+              <a:t>10</a:t>
+            </a:fld>
+            <a:endParaRPr lang="pt-BR" dirty="0">
+              <a:solidFill>
+                <a:schemeClr val="bg1"/>
+              </a:solidFill>
+            </a:endParaRPr>
+          </a:p>
+        </p:txBody>
+      </p:sp>
+      <p:sp>
+        <p:nvSpPr>
+          <p:cNvPr id="11" name="CaixaDeTexto 10">
+            <a:extLst>
+              <a:ext uri="{FF2B5EF4-FFF2-40B4-BE49-F238E27FC236}">
+                <a16:creationId xmlns:a16="http://schemas.microsoft.com/office/drawing/2014/main" id="{F66E6753-A9BB-84E8-D48F-EBEFAEEA54D4}"/>
+              </a:ext>
+            </a:extLst>
+          </p:cNvPr>
+          <p:cNvSpPr txBox="1"/>
+          <p:nvPr/>
+        </p:nvSpPr>
+        <p:spPr>
+          <a:xfrm>
+            <a:off x="1231640" y="17523"/>
+            <a:ext cx="9728719" cy="769441"/>
+          </a:xfrm>
+          <a:prstGeom prst="rect">
+            <a:avLst/>
+          </a:prstGeom>
+          <a:noFill/>
+        </p:spPr>
+        <p:txBody>
+          <a:bodyPr wrap="square" rtlCol="0">
+            <a:spAutoFit/>
+          </a:bodyPr>
+          <a:lstStyle/>
+          <a:p>
+            <a:r>
+              <a:rPr lang="pt-BR" sz="4400" dirty="0">
+                <a:solidFill>
+                  <a:schemeClr val="tx1">
+                    <a:lumMod val="65000"/>
+                    <a:lumOff val="35000"/>
+                  </a:schemeClr>
+                </a:solidFill>
+                <a:latin typeface="Abadi Extra Light" panose="020B0204020104020204" pitchFamily="34" charset="0"/>
+              </a:rPr>
+              <a:t>R&amp;S com Objetividade e Transparência</a:t>
+            </a:r>
+          </a:p>
+        </p:txBody>
+      </p:sp>
+      <p:pic>
+        <p:nvPicPr>
+          <p:cNvPr id="16" name="Imagem 15" descr="Interface gráfica do usuário, Aplicativo&#10;&#10;O conteúdo gerado por IA pode estar incorreto.">
+            <a:extLst>
+              <a:ext uri="{FF2B5EF4-FFF2-40B4-BE49-F238E27FC236}">
+                <a16:creationId xmlns:a16="http://schemas.microsoft.com/office/drawing/2014/main" id="{36B0F01C-A562-3583-92B4-EC311CBD4D1C}"/>
+              </a:ext>
+            </a:extLst>
+          </p:cNvPr>
+          <p:cNvPicPr>
+            <a:picLocks noChangeAspect="1"/>
+          </p:cNvPicPr>
+          <p:nvPr/>
+        </p:nvPicPr>
+        <p:blipFill>
+          <a:blip r:embed="rId2"/>
+          <a:stretch>
+            <a:fillRect/>
+          </a:stretch>
+        </p:blipFill>
+        <p:spPr>
+          <a:xfrm>
+            <a:off x="136885" y="1371162"/>
+            <a:ext cx="6571992" cy="5350313"/>
+          </a:xfrm>
+          <a:prstGeom prst="rect">
+            <a:avLst/>
+          </a:prstGeom>
+          <a:ln w="38100">
+            <a:solidFill>
+              <a:schemeClr val="bg1">
+                <a:lumMod val="75000"/>
+              </a:schemeClr>
+            </a:solidFill>
+          </a:ln>
+          <a:effectLst>
+            <a:outerShdw blurRad="292100" dist="139700" dir="2700000" algn="tl" rotWithShape="0">
+              <a:srgbClr val="333333">
+                <a:alpha val="65000"/>
+              </a:srgbClr>
+            </a:outerShdw>
+          </a:effectLst>
+        </p:spPr>
+      </p:pic>
+      <p:sp>
+        <p:nvSpPr>
+          <p:cNvPr id="2" name="CaixaDeTexto 1">
+            <a:extLst>
+              <a:ext uri="{FF2B5EF4-FFF2-40B4-BE49-F238E27FC236}">
+                <a16:creationId xmlns:a16="http://schemas.microsoft.com/office/drawing/2014/main" id="{3F1F6B8F-2EFB-508A-7471-66CD7B805B68}"/>
+              </a:ext>
+            </a:extLst>
+          </p:cNvPr>
+          <p:cNvSpPr txBox="1"/>
+          <p:nvPr/>
+        </p:nvSpPr>
+        <p:spPr>
+          <a:xfrm>
+            <a:off x="1299871" y="746427"/>
+            <a:ext cx="2747868" cy="461665"/>
+          </a:xfrm>
+          <a:prstGeom prst="rect">
+            <a:avLst/>
+          </a:prstGeom>
+          <a:noFill/>
+        </p:spPr>
+        <p:txBody>
+          <a:bodyPr wrap="none" rtlCol="0">
+            <a:spAutoFit/>
+          </a:bodyPr>
+          <a:lstStyle/>
+          <a:p>
+            <a:r>
+              <a:rPr lang="pt-BR" sz="2400" dirty="0">
+                <a:solidFill>
+                  <a:schemeClr val="tx1">
+                    <a:lumMod val="65000"/>
+                    <a:lumOff val="35000"/>
+                  </a:schemeClr>
+                </a:solidFill>
+                <a:latin typeface="Arial Nova" panose="020B0504020202020204" pitchFamily="34" charset="0"/>
+              </a:rPr>
+              <a:t>As funcionalidades</a:t>
+            </a:r>
+          </a:p>
+        </p:txBody>
+      </p:sp>
+      <p:sp>
+        <p:nvSpPr>
+          <p:cNvPr id="3" name="CaixaDeTexto 2">
+            <a:extLst>
+              <a:ext uri="{FF2B5EF4-FFF2-40B4-BE49-F238E27FC236}">
+                <a16:creationId xmlns:a16="http://schemas.microsoft.com/office/drawing/2014/main" id="{25D2E5C7-E249-6452-0E37-F1212EC32B85}"/>
+              </a:ext>
+            </a:extLst>
+          </p:cNvPr>
+          <p:cNvSpPr txBox="1"/>
+          <p:nvPr/>
+        </p:nvSpPr>
+        <p:spPr>
+          <a:xfrm>
+            <a:off x="6895322" y="1371162"/>
+            <a:ext cx="4954519" cy="4801314"/>
+          </a:xfrm>
+          <a:prstGeom prst="rect">
+            <a:avLst/>
+          </a:prstGeom>
+          <a:solidFill>
+            <a:srgbClr val="006600">
+              <a:alpha val="30196"/>
+            </a:srgbClr>
+          </a:solidFill>
+          <a:ln w="19050">
+            <a:solidFill>
+              <a:schemeClr val="bg1">
+                <a:lumMod val="65000"/>
+              </a:schemeClr>
+            </a:solidFill>
+          </a:ln>
+        </p:spPr>
+        <p:txBody>
+          <a:bodyPr wrap="square" rtlCol="0">
+            <a:spAutoFit/>
+          </a:bodyPr>
+          <a:lstStyle/>
+          <a:p>
+            <a:r>
+              <a:rPr lang="pt-BR" dirty="0">
+                <a:solidFill>
+                  <a:schemeClr val="bg1"/>
+                </a:solidFill>
+              </a:rPr>
+              <a:t>A partir da configuração da vaga e da candidatura efetuada, o avaliador pode realizar a sua avaliação usando a régua de notas definidas para cada um dos critérios. O sistema, então, calcula automaticamente a nota do usuário e a geral, considerando todos os avaliadores.</a:t>
+            </a:r>
+          </a:p>
+          <a:p>
+            <a:r>
+              <a:rPr lang="pt-BR" dirty="0">
+                <a:solidFill>
+                  <a:schemeClr val="bg1"/>
+                </a:solidFill>
+              </a:rPr>
+              <a:t>Como exemplo, em uma vaga de Desenvolvedor Full Stack, o profissional de RH poderia realizar a avaliação dos pilares Triagem e Fit Cultural. O demandante da vaga poderia fazer a avaliação de Fit Cultural e um especialista a avaliação do pilar Teste Técnico. Assim, a nota do candidato seria a composição de todas as avaliações ponderadas.</a:t>
+            </a:r>
+          </a:p>
+          <a:p>
+            <a:endParaRPr lang="pt-BR" dirty="0">
+              <a:solidFill>
+                <a:schemeClr val="bg1"/>
+              </a:solidFill>
+            </a:endParaRPr>
+          </a:p>
+          <a:p>
+            <a:r>
+              <a:rPr lang="pt-BR" dirty="0">
+                <a:solidFill>
+                  <a:schemeClr val="bg1"/>
+                </a:solidFill>
+              </a:rPr>
+              <a:t>O usuário só tem acesso à sua própria avaliação, mas vê a Nota Global e as anotações dos outros avaliadores.</a:t>
+            </a:r>
+          </a:p>
+        </p:txBody>
+      </p:sp>
+    </p:spTree>
+    <p:extLst>
+      <p:ext uri="{BB962C8B-B14F-4D97-AF65-F5344CB8AC3E}">
+        <p14:creationId xmlns:p14="http://schemas.microsoft.com/office/powerpoint/2010/main" val="3289289253"/>
+      </p:ext>
+    </p:extLst>
+  </p:cSld>
+  <p:clrMapOvr>
+    <a:masterClrMapping/>
+  </p:clrMapOvr>
+</p:sld>
+</file>
+
+<file path=ppt/slides/slide11.xml><?xml version="1.0" encoding="utf-8"?>
+<p:sld xmlns:a="http://schemas.openxmlformats.org/drawingml/2006/main" xmlns:r="http://schemas.openxmlformats.org/officeDocument/2006/relationships" xmlns:p="http://schemas.openxmlformats.org/presentationml/2006/main">
+  <p:cSld>
+    <p:spTree>
+      <p:nvGrpSpPr>
+        <p:cNvPr id="1" name="">
+          <a:extLst>
+            <a:ext uri="{FF2B5EF4-FFF2-40B4-BE49-F238E27FC236}">
+              <a16:creationId xmlns:a16="http://schemas.microsoft.com/office/drawing/2014/main" id="{0215D24D-146D-2AA4-2C9A-81208033B0A7}"/>
+            </a:ext>
+          </a:extLst>
+        </p:cNvPr>
+        <p:cNvGrpSpPr/>
+        <p:nvPr/>
+      </p:nvGrpSpPr>
+      <p:grpSpPr>
+        <a:xfrm>
+          <a:off x="0" y="0"/>
+          <a:ext cx="0" cy="0"/>
+          <a:chOff x="0" y="0"/>
+          <a:chExt cx="0" cy="0"/>
+        </a:xfrm>
+      </p:grpSpPr>
+      <p:sp>
+        <p:nvSpPr>
+          <p:cNvPr id="7" name="Retângulo 6">
+            <a:extLst>
+              <a:ext uri="{FF2B5EF4-FFF2-40B4-BE49-F238E27FC236}">
+                <a16:creationId xmlns:a16="http://schemas.microsoft.com/office/drawing/2014/main" id="{9B9FEB76-20B0-BCD7-7BE1-449663F32D6E}"/>
+              </a:ext>
+            </a:extLst>
+          </p:cNvPr>
+          <p:cNvSpPr/>
+          <p:nvPr/>
+        </p:nvSpPr>
+        <p:spPr>
+          <a:xfrm>
+            <a:off x="0" y="0"/>
+            <a:ext cx="12192000" cy="1208092"/>
+          </a:xfrm>
+          <a:prstGeom prst="rect">
+            <a:avLst/>
+          </a:prstGeom>
+          <a:solidFill>
+            <a:srgbClr val="ABA595"/>
+          </a:solidFill>
+          <a:ln>
+            <a:noFill/>
+          </a:ln>
+        </p:spPr>
+        <p:style>
+          <a:lnRef idx="2">
+            <a:schemeClr val="accent1">
+              <a:shade val="15000"/>
+            </a:schemeClr>
+          </a:lnRef>
+          <a:fillRef idx="1">
+            <a:schemeClr val="accent1"/>
+          </a:fillRef>
+          <a:effectRef idx="0">
+            <a:schemeClr val="accent1"/>
+          </a:effectRef>
+          <a:fontRef idx="minor">
+            <a:schemeClr val="lt1"/>
+          </a:fontRef>
+        </p:style>
+        <p:txBody>
+          <a:bodyPr rtlCol="0" anchor="ctr"/>
+          <a:lstStyle/>
+          <a:p>
+            <a:pPr algn="ctr"/>
+            <a:endParaRPr lang="pt-BR" dirty="0"/>
+          </a:p>
+        </p:txBody>
+      </p:sp>
+      <p:sp>
+        <p:nvSpPr>
+          <p:cNvPr id="13" name="Espaço Reservado para Número de Slide 12">
+            <a:extLst>
+              <a:ext uri="{FF2B5EF4-FFF2-40B4-BE49-F238E27FC236}">
+                <a16:creationId xmlns:a16="http://schemas.microsoft.com/office/drawing/2014/main" id="{74FDA367-6DBE-87AD-1266-737B21219DC2}"/>
+              </a:ext>
+            </a:extLst>
+          </p:cNvPr>
+          <p:cNvSpPr>
+            <a:spLocks noGrp="1"/>
+          </p:cNvSpPr>
+          <p:nvPr>
+            <p:ph type="sldNum" sz="quarter" idx="12"/>
+          </p:nvPr>
+        </p:nvSpPr>
+        <p:spPr>
+          <a:xfrm>
+            <a:off x="9347629" y="6460125"/>
+            <a:ext cx="2743200" cy="365125"/>
+          </a:xfrm>
+        </p:spPr>
+        <p:txBody>
+          <a:bodyPr/>
+          <a:lstStyle/>
+          <a:p>
+            <a:fld id="{EC16DA9C-1B67-4414-87EE-2B247BC281D7}" type="slidenum">
+              <a:rPr lang="pt-BR" smtClean="0">
+                <a:solidFill>
+                  <a:schemeClr val="bg1"/>
+                </a:solidFill>
+              </a:rPr>
+              <a:t>11</a:t>
+            </a:fld>
+            <a:endParaRPr lang="pt-BR">
+              <a:solidFill>
+                <a:schemeClr val="bg1"/>
+              </a:solidFill>
+            </a:endParaRPr>
+          </a:p>
+        </p:txBody>
+      </p:sp>
+      <p:sp>
+        <p:nvSpPr>
+          <p:cNvPr id="11" name="CaixaDeTexto 10">
+            <a:extLst>
+              <a:ext uri="{FF2B5EF4-FFF2-40B4-BE49-F238E27FC236}">
+                <a16:creationId xmlns:a16="http://schemas.microsoft.com/office/drawing/2014/main" id="{00F757F8-6B69-A43D-2F8C-41B6D00D8ADD}"/>
+              </a:ext>
+            </a:extLst>
+          </p:cNvPr>
+          <p:cNvSpPr txBox="1"/>
+          <p:nvPr/>
+        </p:nvSpPr>
+        <p:spPr>
+          <a:xfrm>
+            <a:off x="1231640" y="17523"/>
+            <a:ext cx="9728719" cy="769441"/>
+          </a:xfrm>
+          <a:prstGeom prst="rect">
+            <a:avLst/>
+          </a:prstGeom>
+          <a:noFill/>
+        </p:spPr>
+        <p:txBody>
+          <a:bodyPr wrap="square" rtlCol="0">
+            <a:spAutoFit/>
+          </a:bodyPr>
+          <a:lstStyle/>
+          <a:p>
+            <a:r>
+              <a:rPr lang="pt-BR" sz="4400" dirty="0">
+                <a:solidFill>
+                  <a:schemeClr val="tx1">
+                    <a:lumMod val="65000"/>
+                    <a:lumOff val="35000"/>
+                  </a:schemeClr>
+                </a:solidFill>
+                <a:latin typeface="Abadi Extra Light" panose="020B0204020104020204" pitchFamily="34" charset="0"/>
+              </a:rPr>
+              <a:t>R&amp;S com Objetividade e Transparência</a:t>
+            </a:r>
+          </a:p>
+        </p:txBody>
+      </p:sp>
+      <p:pic>
+        <p:nvPicPr>
+          <p:cNvPr id="20" name="Imagem 19" descr="Gráfico, Gráfico de barras&#10;&#10;O conteúdo gerado por IA pode estar incorreto.">
+            <a:extLst>
+              <a:ext uri="{FF2B5EF4-FFF2-40B4-BE49-F238E27FC236}">
+                <a16:creationId xmlns:a16="http://schemas.microsoft.com/office/drawing/2014/main" id="{1590BF8B-2D11-B550-E27B-BFA1D68A3DAE}"/>
+              </a:ext>
+            </a:extLst>
+          </p:cNvPr>
+          <p:cNvPicPr>
+            <a:picLocks noChangeAspect="1"/>
+          </p:cNvPicPr>
+          <p:nvPr/>
+        </p:nvPicPr>
+        <p:blipFill>
+          <a:blip r:embed="rId2"/>
+          <a:stretch>
+            <a:fillRect/>
+          </a:stretch>
+        </p:blipFill>
+        <p:spPr>
+          <a:xfrm>
+            <a:off x="101171" y="1327701"/>
+            <a:ext cx="7578595" cy="5393774"/>
+          </a:xfrm>
+          <a:prstGeom prst="rect">
+            <a:avLst/>
+          </a:prstGeom>
+          <a:ln w="38100">
+            <a:solidFill>
+              <a:schemeClr val="bg1">
+                <a:lumMod val="75000"/>
+              </a:schemeClr>
+            </a:solidFill>
+          </a:ln>
+          <a:effectLst>
+            <a:outerShdw blurRad="292100" dist="139700" dir="2700000" algn="tl" rotWithShape="0">
+              <a:srgbClr val="333333">
+                <a:alpha val="65000"/>
+              </a:srgbClr>
+            </a:outerShdw>
+          </a:effectLst>
+        </p:spPr>
+      </p:pic>
+      <p:sp>
+        <p:nvSpPr>
+          <p:cNvPr id="2" name="CaixaDeTexto 1">
+            <a:extLst>
+              <a:ext uri="{FF2B5EF4-FFF2-40B4-BE49-F238E27FC236}">
+                <a16:creationId xmlns:a16="http://schemas.microsoft.com/office/drawing/2014/main" id="{B6E2D8B2-8642-D158-A08D-2EC24BC20D4F}"/>
+              </a:ext>
+            </a:extLst>
+          </p:cNvPr>
+          <p:cNvSpPr txBox="1"/>
+          <p:nvPr/>
+        </p:nvSpPr>
+        <p:spPr>
+          <a:xfrm>
+            <a:off x="1299871" y="746427"/>
+            <a:ext cx="2747868" cy="461665"/>
+          </a:xfrm>
+          <a:prstGeom prst="rect">
+            <a:avLst/>
+          </a:prstGeom>
+          <a:noFill/>
+        </p:spPr>
+        <p:txBody>
+          <a:bodyPr wrap="none" rtlCol="0">
+            <a:spAutoFit/>
+          </a:bodyPr>
+          <a:lstStyle/>
+          <a:p>
+            <a:r>
+              <a:rPr lang="pt-BR" sz="2400" dirty="0">
+                <a:solidFill>
+                  <a:schemeClr val="tx1">
+                    <a:lumMod val="65000"/>
+                    <a:lumOff val="35000"/>
+                  </a:schemeClr>
+                </a:solidFill>
+                <a:latin typeface="Arial Nova" panose="020B0504020202020204" pitchFamily="34" charset="0"/>
+              </a:rPr>
+              <a:t>As funcionalidades</a:t>
+            </a:r>
+          </a:p>
+        </p:txBody>
+      </p:sp>
+      <p:sp>
+        <p:nvSpPr>
+          <p:cNvPr id="3" name="CaixaDeTexto 2">
+            <a:extLst>
+              <a:ext uri="{FF2B5EF4-FFF2-40B4-BE49-F238E27FC236}">
+                <a16:creationId xmlns:a16="http://schemas.microsoft.com/office/drawing/2014/main" id="{9CD924D7-4E5B-8FC5-41FE-2F48A6CF6201}"/>
+              </a:ext>
+            </a:extLst>
+          </p:cNvPr>
+          <p:cNvSpPr txBox="1"/>
+          <p:nvPr/>
+        </p:nvSpPr>
+        <p:spPr>
+          <a:xfrm>
+            <a:off x="7825992" y="1762430"/>
+            <a:ext cx="4264837" cy="4524315"/>
+          </a:xfrm>
+          <a:prstGeom prst="rect">
+            <a:avLst/>
+          </a:prstGeom>
+          <a:solidFill>
+            <a:srgbClr val="006600">
+              <a:alpha val="30196"/>
+            </a:srgbClr>
+          </a:solidFill>
+          <a:ln w="19050">
+            <a:solidFill>
+              <a:schemeClr val="bg1">
+                <a:lumMod val="65000"/>
+              </a:schemeClr>
+            </a:solidFill>
+          </a:ln>
+        </p:spPr>
+        <p:txBody>
+          <a:bodyPr wrap="square" rtlCol="0">
+            <a:spAutoFit/>
+          </a:bodyPr>
+          <a:lstStyle/>
+          <a:p>
+            <a:r>
+              <a:rPr lang="pt-BR" dirty="0">
+                <a:solidFill>
+                  <a:schemeClr val="bg1"/>
+                </a:solidFill>
+              </a:rPr>
+              <a:t>Depois que todos os candidatos foram avaliados, o usuário pode ver a classificação (ranking) e graficamente comparar as notas dadas a cada candidato em cada um dos pilares.</a:t>
+            </a:r>
+          </a:p>
+          <a:p>
+            <a:r>
+              <a:rPr lang="pt-BR" dirty="0">
+                <a:solidFill>
+                  <a:schemeClr val="bg1"/>
+                </a:solidFill>
+              </a:rPr>
+              <a:t>Pode-se filtrar o avaliador e o critério. Ou seja, o usuário pode ver como cada um dos avaliadores avaliou cada um dos candidatos por cada um dos critérios.</a:t>
+            </a:r>
+          </a:p>
+          <a:p>
+            <a:endParaRPr lang="pt-BR" dirty="0">
+              <a:solidFill>
+                <a:schemeClr val="bg1"/>
+              </a:solidFill>
+            </a:endParaRPr>
+          </a:p>
+          <a:p>
+            <a:r>
+              <a:rPr lang="pt-BR" dirty="0">
+                <a:solidFill>
+                  <a:schemeClr val="bg1"/>
+                </a:solidFill>
+              </a:rPr>
+              <a:t>Detalhe: pode-se criar um candidato ideal para efeito de parâmetro. Ou seja, um candidato padrão para a vaga pode ser criado e suas notas atribuídas de forma a ser o ideal da vaga. Assim, os candidatos reais serão comparados a ele.</a:t>
+            </a:r>
+          </a:p>
+        </p:txBody>
+      </p:sp>
+    </p:spTree>
+    <p:extLst>
+      <p:ext uri="{BB962C8B-B14F-4D97-AF65-F5344CB8AC3E}">
+        <p14:creationId xmlns:p14="http://schemas.microsoft.com/office/powerpoint/2010/main" val="447688999"/>
+      </p:ext>
+    </p:extLst>
+  </p:cSld>
+  <p:clrMapOvr>
+    <a:masterClrMapping/>
+  </p:clrMapOvr>
+</p:sld>
+</file>
+
+<file path=ppt/slides/slide12.xml><?xml version="1.0" encoding="utf-8"?>
+<p:sld xmlns:a="http://schemas.openxmlformats.org/drawingml/2006/main" xmlns:r="http://schemas.openxmlformats.org/officeDocument/2006/relationships" xmlns:p="http://schemas.openxmlformats.org/presentationml/2006/main">
+  <p:cSld>
+    <p:spTree>
+      <p:nvGrpSpPr>
+        <p:cNvPr id="1" name="">
+          <a:extLst>
+            <a:ext uri="{FF2B5EF4-FFF2-40B4-BE49-F238E27FC236}">
+              <a16:creationId xmlns:a16="http://schemas.microsoft.com/office/drawing/2014/main" id="{44D4508C-7F2E-D05E-838B-D21B011CD40D}"/>
+            </a:ext>
+          </a:extLst>
+        </p:cNvPr>
+        <p:cNvGrpSpPr/>
+        <p:nvPr/>
+      </p:nvGrpSpPr>
+      <p:grpSpPr>
+        <a:xfrm>
+          <a:off x="0" y="0"/>
+          <a:ext cx="0" cy="0"/>
+          <a:chOff x="0" y="0"/>
+          <a:chExt cx="0" cy="0"/>
+        </a:xfrm>
+      </p:grpSpPr>
+      <p:sp>
+        <p:nvSpPr>
+          <p:cNvPr id="7" name="Retângulo 6">
+            <a:extLst>
+              <a:ext uri="{FF2B5EF4-FFF2-40B4-BE49-F238E27FC236}">
+                <a16:creationId xmlns:a16="http://schemas.microsoft.com/office/drawing/2014/main" id="{4BF04B8A-B763-33AA-E963-4888C74E236E}"/>
+              </a:ext>
+            </a:extLst>
+          </p:cNvPr>
+          <p:cNvSpPr/>
+          <p:nvPr/>
+        </p:nvSpPr>
+        <p:spPr>
+          <a:xfrm>
+            <a:off x="0" y="0"/>
+            <a:ext cx="12192000" cy="1208092"/>
+          </a:xfrm>
+          <a:prstGeom prst="rect">
+            <a:avLst/>
+          </a:prstGeom>
+          <a:solidFill>
+            <a:srgbClr val="ABA595"/>
+          </a:solidFill>
+          <a:ln>
+            <a:noFill/>
+          </a:ln>
+        </p:spPr>
+        <p:style>
+          <a:lnRef idx="2">
+            <a:schemeClr val="accent1">
+              <a:shade val="15000"/>
+            </a:schemeClr>
+          </a:lnRef>
+          <a:fillRef idx="1">
+            <a:schemeClr val="accent1"/>
+          </a:fillRef>
+          <a:effectRef idx="0">
+            <a:schemeClr val="accent1"/>
+          </a:effectRef>
+          <a:fontRef idx="minor">
+            <a:schemeClr val="lt1"/>
+          </a:fontRef>
+        </p:style>
+        <p:txBody>
+          <a:bodyPr rtlCol="0" anchor="ctr"/>
+          <a:lstStyle/>
+          <a:p>
+            <a:pPr algn="ctr"/>
+            <a:endParaRPr lang="pt-BR" dirty="0"/>
+          </a:p>
+        </p:txBody>
+      </p:sp>
+      <p:sp>
+        <p:nvSpPr>
+          <p:cNvPr id="13" name="Espaço Reservado para Número de Slide 12">
+            <a:extLst>
+              <a:ext uri="{FF2B5EF4-FFF2-40B4-BE49-F238E27FC236}">
+                <a16:creationId xmlns:a16="http://schemas.microsoft.com/office/drawing/2014/main" id="{62C02DC9-BD90-B0E5-81D8-A0D6224919A1}"/>
+              </a:ext>
+            </a:extLst>
+          </p:cNvPr>
+          <p:cNvSpPr>
+            <a:spLocks noGrp="1"/>
+          </p:cNvSpPr>
+          <p:nvPr>
+            <p:ph type="sldNum" sz="quarter" idx="12"/>
+          </p:nvPr>
+        </p:nvSpPr>
+        <p:spPr/>
+        <p:txBody>
+          <a:bodyPr/>
+          <a:lstStyle/>
+          <a:p>
+            <a:fld id="{EC16DA9C-1B67-4414-87EE-2B247BC281D7}" type="slidenum">
+              <a:rPr lang="pt-BR" smtClean="0"/>
+              <a:t>12</a:t>
+            </a:fld>
+            <a:endParaRPr lang="pt-BR"/>
+          </a:p>
+        </p:txBody>
+      </p:sp>
+      <p:sp>
+        <p:nvSpPr>
+          <p:cNvPr id="11" name="CaixaDeTexto 10">
+            <a:extLst>
+              <a:ext uri="{FF2B5EF4-FFF2-40B4-BE49-F238E27FC236}">
+                <a16:creationId xmlns:a16="http://schemas.microsoft.com/office/drawing/2014/main" id="{67963F21-DB2E-D520-F875-741C0E3C6062}"/>
+              </a:ext>
+            </a:extLst>
+          </p:cNvPr>
+          <p:cNvSpPr txBox="1"/>
+          <p:nvPr/>
+        </p:nvSpPr>
+        <p:spPr>
+          <a:xfrm>
+            <a:off x="1231640" y="17523"/>
+            <a:ext cx="9728719" cy="769441"/>
+          </a:xfrm>
+          <a:prstGeom prst="rect">
+            <a:avLst/>
+          </a:prstGeom>
+          <a:noFill/>
+        </p:spPr>
+        <p:txBody>
+          <a:bodyPr wrap="square" rtlCol="0">
+            <a:spAutoFit/>
+          </a:bodyPr>
+          <a:lstStyle/>
+          <a:p>
+            <a:r>
+              <a:rPr lang="pt-BR" sz="4400" dirty="0">
+                <a:solidFill>
+                  <a:schemeClr val="tx1">
+                    <a:lumMod val="65000"/>
+                    <a:lumOff val="35000"/>
+                  </a:schemeClr>
+                </a:solidFill>
+                <a:latin typeface="Abadi Extra Light" panose="020B0204020104020204" pitchFamily="34" charset="0"/>
+              </a:rPr>
+              <a:t>R&amp;S com Objetividade e Transparência</a:t>
+            </a:r>
+          </a:p>
+        </p:txBody>
+      </p:sp>
+      <p:sp>
+        <p:nvSpPr>
+          <p:cNvPr id="2" name="CaixaDeTexto 1">
+            <a:extLst>
+              <a:ext uri="{FF2B5EF4-FFF2-40B4-BE49-F238E27FC236}">
+                <a16:creationId xmlns:a16="http://schemas.microsoft.com/office/drawing/2014/main" id="{3BDDE887-3A2F-341A-F2C3-43651129C739}"/>
+              </a:ext>
+            </a:extLst>
+          </p:cNvPr>
+          <p:cNvSpPr txBox="1"/>
+          <p:nvPr/>
+        </p:nvSpPr>
+        <p:spPr>
+          <a:xfrm>
+            <a:off x="1299871" y="746427"/>
+            <a:ext cx="2747868" cy="461665"/>
+          </a:xfrm>
+          <a:prstGeom prst="rect">
+            <a:avLst/>
+          </a:prstGeom>
+          <a:noFill/>
+        </p:spPr>
+        <p:txBody>
+          <a:bodyPr wrap="none" rtlCol="0">
+            <a:spAutoFit/>
+          </a:bodyPr>
+          <a:lstStyle/>
+          <a:p>
+            <a:r>
+              <a:rPr lang="pt-BR" sz="2400" dirty="0">
+                <a:solidFill>
+                  <a:schemeClr val="tx1">
+                    <a:lumMod val="65000"/>
+                    <a:lumOff val="35000"/>
+                  </a:schemeClr>
+                </a:solidFill>
+                <a:latin typeface="Arial Nova" panose="020B0504020202020204" pitchFamily="34" charset="0"/>
+              </a:rPr>
+              <a:t>As funcionalidades</a:t>
+            </a:r>
+          </a:p>
+        </p:txBody>
+      </p:sp>
+      <p:pic>
+        <p:nvPicPr>
+          <p:cNvPr id="5" name="Imagem 4" descr="Interface gráfica do usuário&#10;&#10;O conteúdo gerado por IA pode estar incorreto.">
+            <a:extLst>
+              <a:ext uri="{FF2B5EF4-FFF2-40B4-BE49-F238E27FC236}">
+                <a16:creationId xmlns:a16="http://schemas.microsoft.com/office/drawing/2014/main" id="{2D92A68E-981A-9316-110E-6BE9C5929BB0}"/>
+              </a:ext>
+            </a:extLst>
+          </p:cNvPr>
+          <p:cNvPicPr>
+            <a:picLocks noChangeAspect="1"/>
+          </p:cNvPicPr>
+          <p:nvPr/>
+        </p:nvPicPr>
+        <p:blipFill>
+          <a:blip r:embed="rId2"/>
+          <a:stretch>
+            <a:fillRect/>
+          </a:stretch>
+        </p:blipFill>
+        <p:spPr>
+          <a:xfrm>
+            <a:off x="1391073" y="1328926"/>
+            <a:ext cx="3804332" cy="5392549"/>
+          </a:xfrm>
+          <a:prstGeom prst="rect">
+            <a:avLst/>
+          </a:prstGeom>
+          <a:ln w="38100">
+            <a:solidFill>
+              <a:schemeClr val="bg1">
+                <a:lumMod val="75000"/>
+              </a:schemeClr>
+            </a:solidFill>
+          </a:ln>
+          <a:effectLst>
+            <a:outerShdw blurRad="292100" dist="139700" dir="2700000" algn="tl" rotWithShape="0">
+              <a:srgbClr val="333333">
+                <a:alpha val="65000"/>
+              </a:srgbClr>
+            </a:outerShdw>
+          </a:effectLst>
+        </p:spPr>
+      </p:pic>
+      <p:sp>
+        <p:nvSpPr>
+          <p:cNvPr id="3" name="CaixaDeTexto 2">
+            <a:extLst>
+              <a:ext uri="{FF2B5EF4-FFF2-40B4-BE49-F238E27FC236}">
+                <a16:creationId xmlns:a16="http://schemas.microsoft.com/office/drawing/2014/main" id="{F0998B75-0CE9-497A-F251-DEC44E030E30}"/>
+              </a:ext>
+            </a:extLst>
+          </p:cNvPr>
+          <p:cNvSpPr txBox="1"/>
+          <p:nvPr/>
+        </p:nvSpPr>
+        <p:spPr>
+          <a:xfrm>
+            <a:off x="5438912" y="3332207"/>
+            <a:ext cx="5160664" cy="1477328"/>
+          </a:xfrm>
+          <a:prstGeom prst="rect">
+            <a:avLst/>
+          </a:prstGeom>
+          <a:solidFill>
+            <a:srgbClr val="006600">
+              <a:alpha val="30196"/>
+            </a:srgbClr>
+          </a:solidFill>
+          <a:ln w="19050">
+            <a:solidFill>
+              <a:schemeClr val="bg1">
+                <a:lumMod val="65000"/>
+              </a:schemeClr>
+            </a:solidFill>
+          </a:ln>
+        </p:spPr>
+        <p:txBody>
+          <a:bodyPr wrap="square" rtlCol="0">
+            <a:spAutoFit/>
+          </a:bodyPr>
+          <a:lstStyle/>
+          <a:p>
+            <a:r>
+              <a:rPr lang="pt-BR" dirty="0">
+                <a:solidFill>
+                  <a:schemeClr val="bg1"/>
+                </a:solidFill>
+              </a:rPr>
+              <a:t>Uma lista com os candidatos aprovados é gerada e as suas informações de contato são disponibilizadas. Se tiver o número do telefone móvel, um ícone de Whatsapp estará disponível para entrar em contato. Da mesma forma, o </a:t>
+            </a:r>
+            <a:r>
+              <a:rPr lang="pt-BR" dirty="0" err="1">
+                <a:solidFill>
+                  <a:schemeClr val="bg1"/>
+                </a:solidFill>
+              </a:rPr>
+              <a:t>email</a:t>
+            </a:r>
+            <a:r>
+              <a:rPr lang="pt-BR" dirty="0">
+                <a:solidFill>
+                  <a:schemeClr val="bg1"/>
+                </a:solidFill>
+              </a:rPr>
+              <a:t>.</a:t>
+            </a:r>
+          </a:p>
+        </p:txBody>
+      </p:sp>
+    </p:spTree>
+    <p:extLst>
+      <p:ext uri="{BB962C8B-B14F-4D97-AF65-F5344CB8AC3E}">
+        <p14:creationId xmlns:p14="http://schemas.microsoft.com/office/powerpoint/2010/main" val="1828134045"/>
+      </p:ext>
+    </p:extLst>
+  </p:cSld>
+  <p:clrMapOvr>
+    <a:masterClrMapping/>
+  </p:clrMapOvr>
+</p:sld>
+</file>
+
+<file path=ppt/slides/slide13.xml><?xml version="1.0" encoding="utf-8"?>
+<p:sld xmlns:a="http://schemas.openxmlformats.org/drawingml/2006/main" xmlns:r="http://schemas.openxmlformats.org/officeDocument/2006/relationships" xmlns:p="http://schemas.openxmlformats.org/presentationml/2006/main">
+  <p:cSld>
+    <p:spTree>
+      <p:nvGrpSpPr>
+        <p:cNvPr id="1" name="">
+          <a:extLst>
+            <a:ext uri="{FF2B5EF4-FFF2-40B4-BE49-F238E27FC236}">
+              <a16:creationId xmlns:a16="http://schemas.microsoft.com/office/drawing/2014/main" id="{6758A00F-A408-7209-A5B3-B18406286433}"/>
+            </a:ext>
+          </a:extLst>
+        </p:cNvPr>
+        <p:cNvGrpSpPr/>
+        <p:nvPr/>
+      </p:nvGrpSpPr>
+      <p:grpSpPr>
+        <a:xfrm>
+          <a:off x="0" y="0"/>
+          <a:ext cx="0" cy="0"/>
+          <a:chOff x="0" y="0"/>
+          <a:chExt cx="0" cy="0"/>
+        </a:xfrm>
+      </p:grpSpPr>
+      <p:pic>
+        <p:nvPicPr>
+          <p:cNvPr id="4" name="Imagem 3">
+            <a:extLst>
+              <a:ext uri="{FF2B5EF4-FFF2-40B4-BE49-F238E27FC236}">
+                <a16:creationId xmlns:a16="http://schemas.microsoft.com/office/drawing/2014/main" id="{6298D9BB-00FC-12A8-AE9D-DFD37B787BD8}"/>
+              </a:ext>
+            </a:extLst>
+          </p:cNvPr>
+          <p:cNvPicPr>
+            <a:picLocks noChangeAspect="1"/>
+          </p:cNvPicPr>
+          <p:nvPr/>
+        </p:nvPicPr>
+        <p:blipFill>
+          <a:blip r:embed="rId3"/>
+          <a:srcRect l="22389" r="11301"/>
+          <a:stretch>
+            <a:fillRect/>
+          </a:stretch>
+        </p:blipFill>
+        <p:spPr>
+          <a:xfrm>
+            <a:off x="0" y="0"/>
+            <a:ext cx="2482517" cy="6858000"/>
+          </a:xfrm>
+          <a:prstGeom prst="rect">
+            <a:avLst/>
+          </a:prstGeom>
+        </p:spPr>
+      </p:pic>
+      <p:sp>
+        <p:nvSpPr>
+          <p:cNvPr id="13" name="Espaço Reservado para Número de Slide 12">
+            <a:extLst>
+              <a:ext uri="{FF2B5EF4-FFF2-40B4-BE49-F238E27FC236}">
+                <a16:creationId xmlns:a16="http://schemas.microsoft.com/office/drawing/2014/main" id="{6E8489F3-9871-30AA-6422-466425279CB2}"/>
+              </a:ext>
+            </a:extLst>
+          </p:cNvPr>
+          <p:cNvSpPr>
+            <a:spLocks noGrp="1"/>
+          </p:cNvSpPr>
+          <p:nvPr>
+            <p:ph type="sldNum" sz="quarter" idx="12"/>
+          </p:nvPr>
+        </p:nvSpPr>
+        <p:spPr/>
+        <p:txBody>
+          <a:bodyPr/>
+          <a:lstStyle/>
+          <a:p>
+            <a:fld id="{EC16DA9C-1B67-4414-87EE-2B247BC281D7}" type="slidenum">
+              <a:rPr lang="pt-BR" smtClean="0"/>
+              <a:t>13</a:t>
+            </a:fld>
+            <a:endParaRPr lang="pt-BR"/>
+          </a:p>
+        </p:txBody>
+      </p:sp>
+      <p:sp>
+        <p:nvSpPr>
+          <p:cNvPr id="14" name="CaixaDeTexto 13">
+            <a:extLst>
+              <a:ext uri="{FF2B5EF4-FFF2-40B4-BE49-F238E27FC236}">
+                <a16:creationId xmlns:a16="http://schemas.microsoft.com/office/drawing/2014/main" id="{B2277A24-F15B-DC27-66D1-1024D4361597}"/>
+              </a:ext>
+            </a:extLst>
+          </p:cNvPr>
+          <p:cNvSpPr txBox="1"/>
+          <p:nvPr/>
+        </p:nvSpPr>
+        <p:spPr>
+          <a:xfrm>
+            <a:off x="2476499" y="2555680"/>
+            <a:ext cx="7238999" cy="923330"/>
+          </a:xfrm>
+          <a:prstGeom prst="rect">
+            <a:avLst/>
+          </a:prstGeom>
+          <a:noFill/>
+        </p:spPr>
+        <p:txBody>
+          <a:bodyPr wrap="square">
+            <a:spAutoFit/>
+          </a:bodyPr>
+          <a:lstStyle/>
+          <a:p>
+            <a:pPr algn="ctr">
+              <a:buNone/>
+            </a:pPr>
+            <a:r>
+              <a:rPr lang="pt-BR" sz="5400" b="1" dirty="0" err="1">
+                <a:solidFill>
+                  <a:schemeClr val="bg1"/>
+                </a:solidFill>
+              </a:rPr>
+              <a:t>Novva</a:t>
+            </a:r>
+            <a:r>
+              <a:rPr lang="pt-BR" sz="5400" b="1" dirty="0">
+                <a:solidFill>
+                  <a:schemeClr val="bg1"/>
+                </a:solidFill>
+              </a:rPr>
+              <a:t> R&amp;S</a:t>
+            </a:r>
+          </a:p>
+        </p:txBody>
+      </p:sp>
+      <p:pic>
+        <p:nvPicPr>
+          <p:cNvPr id="3" name="Imagem 2">
+            <a:extLst>
+              <a:ext uri="{FF2B5EF4-FFF2-40B4-BE49-F238E27FC236}">
+                <a16:creationId xmlns:a16="http://schemas.microsoft.com/office/drawing/2014/main" id="{3FDAE95A-AB9D-42EC-073A-498EE653BBEB}"/>
+              </a:ext>
+            </a:extLst>
+          </p:cNvPr>
+          <p:cNvPicPr>
+            <a:picLocks noChangeAspect="1"/>
+          </p:cNvPicPr>
+          <p:nvPr/>
+        </p:nvPicPr>
+        <p:blipFill>
+          <a:blip r:embed="rId4">
+            <a:extLst>
+              <a:ext uri="{28A0092B-C50C-407E-A947-70E740481C1C}">
+                <a14:useLocalDpi xmlns:a14="http://schemas.microsoft.com/office/drawing/2010/main" val="0"/>
+              </a:ext>
+            </a:extLst>
+          </a:blip>
+          <a:stretch>
+            <a:fillRect/>
+          </a:stretch>
+        </p:blipFill>
+        <p:spPr>
+          <a:xfrm>
+            <a:off x="5456764" y="213374"/>
+            <a:ext cx="1278472" cy="657212"/>
+          </a:xfrm>
+          <a:prstGeom prst="rect">
+            <a:avLst/>
+          </a:prstGeom>
+        </p:spPr>
+      </p:pic>
+      <p:pic>
+        <p:nvPicPr>
+          <p:cNvPr id="12" name="Imagem 11" descr="Gráfico, Gráfico de barras&#10;&#10;O conteúdo gerado por IA pode estar incorreto.">
+            <a:extLst>
+              <a:ext uri="{FF2B5EF4-FFF2-40B4-BE49-F238E27FC236}">
+                <a16:creationId xmlns:a16="http://schemas.microsoft.com/office/drawing/2014/main" id="{00D17B67-0FC1-C88A-9114-4D53440CEC36}"/>
+              </a:ext>
+            </a:extLst>
+          </p:cNvPr>
+          <p:cNvPicPr>
+            <a:picLocks noChangeAspect="1"/>
+          </p:cNvPicPr>
+          <p:nvPr/>
+        </p:nvPicPr>
+        <p:blipFill>
+          <a:blip r:embed="rId5">
+            <a:extLst>
+              <a:ext uri="{BEBA8EAE-BF5A-486C-A8C5-ECC9F3942E4B}">
+                <a14:imgProps xmlns:a14="http://schemas.microsoft.com/office/drawing/2010/main">
+                  <a14:imgLayer r:embed="rId6">
+                    <a14:imgEffect>
+                      <a14:brightnessContrast bright="-40000" contrast="40000"/>
+                    </a14:imgEffect>
+                  </a14:imgLayer>
+                </a14:imgProps>
+              </a:ext>
+            </a:extLst>
+          </a:blip>
+          <a:stretch>
+            <a:fillRect/>
+          </a:stretch>
+        </p:blipFill>
+        <p:spPr>
+          <a:xfrm>
+            <a:off x="9721516" y="2406"/>
+            <a:ext cx="2482517" cy="6855594"/>
+          </a:xfrm>
+          <a:prstGeom prst="rect">
+            <a:avLst/>
+          </a:prstGeom>
+        </p:spPr>
+      </p:pic>
+      <p:sp>
+        <p:nvSpPr>
+          <p:cNvPr id="2" name="CaixaDeTexto 1">
+            <a:extLst>
+              <a:ext uri="{FF2B5EF4-FFF2-40B4-BE49-F238E27FC236}">
+                <a16:creationId xmlns:a16="http://schemas.microsoft.com/office/drawing/2014/main" id="{994D8825-316E-443D-B3E9-113502C1299F}"/>
+              </a:ext>
+            </a:extLst>
+          </p:cNvPr>
+          <p:cNvSpPr txBox="1"/>
+          <p:nvPr/>
+        </p:nvSpPr>
+        <p:spPr>
+          <a:xfrm>
+            <a:off x="3515667" y="5164105"/>
+            <a:ext cx="5160664" cy="646331"/>
+          </a:xfrm>
+          <a:prstGeom prst="rect">
+            <a:avLst/>
+          </a:prstGeom>
+          <a:noFill/>
+          <a:ln w="19050">
+            <a:noFill/>
+          </a:ln>
+        </p:spPr>
+        <p:txBody>
+          <a:bodyPr wrap="square" rtlCol="0">
+            <a:spAutoFit/>
+          </a:bodyPr>
+          <a:lstStyle/>
+          <a:p>
+            <a:pPr algn="ctr"/>
+            <a:r>
+              <a:rPr lang="pt-BR" dirty="0">
+                <a:solidFill>
+                  <a:schemeClr val="bg1"/>
+                </a:solidFill>
+              </a:rPr>
+              <a:t>Eider Arantes de Oliveira</a:t>
+            </a:r>
+          </a:p>
+          <a:p>
+            <a:pPr algn="ctr"/>
+            <a:r>
+              <a:rPr lang="pt-BR" dirty="0">
+                <a:solidFill>
+                  <a:schemeClr val="bg1"/>
+                </a:solidFill>
+              </a:rPr>
+              <a:t>(34) 99977-5266</a:t>
+            </a:r>
+          </a:p>
+        </p:txBody>
+      </p:sp>
+    </p:spTree>
+    <p:extLst>
+      <p:ext uri="{BB962C8B-B14F-4D97-AF65-F5344CB8AC3E}">
+        <p14:creationId xmlns:p14="http://schemas.microsoft.com/office/powerpoint/2010/main" val="1488468804"/>
       </p:ext>
     </p:extLst>
   </p:cSld>
@@ -10966,11 +12371,10 @@
               <a:alpha val="30196"/>
             </a:srgbClr>
           </a:solidFill>
-          <a:ln>
+          <a:ln w="19050">
             <a:solidFill>
-              <a:schemeClr val="tx1">
+              <a:schemeClr val="bg1">
                 <a:lumMod val="65000"/>
-                <a:lumOff val="35000"/>
               </a:schemeClr>
             </a:solidFill>
           </a:ln>
@@ -11037,11 +12441,10 @@
               <a:alpha val="30196"/>
             </a:srgbClr>
           </a:solidFill>
-          <a:ln>
+          <a:ln w="19050">
             <a:solidFill>
-              <a:schemeClr val="tx1">
+              <a:schemeClr val="bg1">
                 <a:lumMod val="65000"/>
-                <a:lumOff val="35000"/>
               </a:schemeClr>
             </a:solidFill>
           </a:ln>
@@ -11050,15 +12453,21 @@
           <a:bodyPr wrap="square" rtlCol="0">
             <a:spAutoFit/>
           </a:bodyPr>
-          <a:lstStyle/>
-          <a:p>
-            <a:pPr algn="r"/>
-            <a:r>
-              <a:rPr lang="pt-BR" dirty="0">
+          <a:lstStyle>
+            <a:defPPr>
+              <a:defRPr lang="pt-BR"/>
+            </a:defPPr>
+            <a:lvl1pPr algn="r">
+              <a:defRPr>
                 <a:solidFill>
                   <a:schemeClr val="bg1"/>
                 </a:solidFill>
-              </a:rPr>
+              </a:defRPr>
+            </a:lvl1pPr>
+          </a:lstStyle>
+          <a:p>
+            <a:r>
+              <a:rPr lang="pt-BR" dirty="0"/>
               <a:t>Acesso imediato a uma conta gratuita para testar as funcionalidades</a:t>
             </a:r>
           </a:p>
@@ -11187,11 +12596,10 @@
               <a:alpha val="30196"/>
             </a:srgbClr>
           </a:solidFill>
-          <a:ln>
+          <a:ln w="19050">
             <a:solidFill>
-              <a:schemeClr val="tx1">
+              <a:schemeClr val="bg1">
                 <a:lumMod val="65000"/>
-                <a:lumOff val="35000"/>
               </a:schemeClr>
             </a:solidFill>
           </a:ln>
@@ -11200,15 +12608,21 @@
           <a:bodyPr wrap="square" rtlCol="0">
             <a:spAutoFit/>
           </a:bodyPr>
-          <a:lstStyle/>
-          <a:p>
-            <a:pPr algn="r"/>
-            <a:r>
-              <a:rPr lang="pt-BR" dirty="0">
+          <a:lstStyle>
+            <a:defPPr>
+              <a:defRPr lang="pt-BR"/>
+            </a:defPPr>
+            <a:lvl1pPr algn="r">
+              <a:defRPr>
                 <a:solidFill>
                   <a:schemeClr val="bg1"/>
                 </a:solidFill>
-              </a:rPr>
+              </a:defRPr>
+            </a:lvl1pPr>
+          </a:lstStyle>
+          <a:p>
+            <a:r>
+              <a:rPr lang="pt-BR" dirty="0"/>
               <a:t>Automaticamente, detecta usuários que são avaliadores/admin em mais de uma empresa cliente (para agências de RH)</a:t>
             </a:r>
           </a:p>
@@ -11374,12 +12788,55 @@
           </a:p>
         </p:txBody>
       </p:sp>
+      <p:sp>
+        <p:nvSpPr>
+          <p:cNvPr id="2" name="CaixaDeTexto 1">
+            <a:extLst>
+              <a:ext uri="{FF2B5EF4-FFF2-40B4-BE49-F238E27FC236}">
+                <a16:creationId xmlns:a16="http://schemas.microsoft.com/office/drawing/2014/main" id="{28B15AA0-C842-B82F-F2DB-0C48368C089C}"/>
+              </a:ext>
+            </a:extLst>
+          </p:cNvPr>
+          <p:cNvSpPr txBox="1"/>
+          <p:nvPr/>
+        </p:nvSpPr>
+        <p:spPr>
+          <a:xfrm>
+            <a:off x="1299871" y="746427"/>
+            <a:ext cx="2747868" cy="461665"/>
+          </a:xfrm>
+          <a:prstGeom prst="rect">
+            <a:avLst/>
+          </a:prstGeom>
+          <a:noFill/>
+        </p:spPr>
+        <p:txBody>
+          <a:bodyPr wrap="none" rtlCol="0">
+            <a:spAutoFit/>
+          </a:bodyPr>
+          <a:lstStyle/>
+          <a:p>
+            <a:r>
+              <a:rPr lang="pt-BR" sz="2400" dirty="0">
+                <a:solidFill>
+                  <a:schemeClr val="tx1">
+                    <a:lumMod val="65000"/>
+                    <a:lumOff val="35000"/>
+                  </a:schemeClr>
+                </a:solidFill>
+                <a:latin typeface="Arial Nova" panose="020B0504020202020204" pitchFamily="34" charset="0"/>
+              </a:rPr>
+              <a:t>As funcionalidades</a:t>
+            </a:r>
+          </a:p>
+        </p:txBody>
+      </p:sp>
       <p:pic>
         <p:nvPicPr>
-          <p:cNvPr id="10" name="Imagem 9" descr="Interface gráfica do usuário, Aplicativo&#10;&#10;O conteúdo gerado por IA pode estar incorreto.">
-            <a:extLst>
-              <a:ext uri="{FF2B5EF4-FFF2-40B4-BE49-F238E27FC236}">
-                <a16:creationId xmlns:a16="http://schemas.microsoft.com/office/drawing/2014/main" id="{2A671CFC-23CA-A53B-9C67-BED62A825C3C}"/>
+          <p:cNvPr id="4" name="Imagem 3" descr="Interface gráfica do usuário, Aplicativo&#10;&#10;O conteúdo gerado por IA pode estar incorreto.">
+            <a:extLst>
+              <a:ext uri="{FF2B5EF4-FFF2-40B4-BE49-F238E27FC236}">
+                <a16:creationId xmlns:a16="http://schemas.microsoft.com/office/drawing/2014/main" id="{CE090985-0357-1E80-2A22-140A45F6332B}"/>
               </a:ext>
             </a:extLst>
           </p:cNvPr>
@@ -11396,203 +12853,135 @@
         </p:blipFill>
         <p:spPr>
           <a:xfrm>
-            <a:off x="1627178" y="1434364"/>
-            <a:ext cx="3313272" cy="2712489"/>
+            <a:off x="257283" y="2227223"/>
+            <a:ext cx="6060403" cy="3671855"/>
           </a:xfrm>
           <a:prstGeom prst="rect">
             <a:avLst/>
           </a:prstGeom>
-          <a:ln w="38100">
-            <a:solidFill>
-              <a:schemeClr val="bg1">
-                <a:lumMod val="75000"/>
-              </a:schemeClr>
-            </a:solidFill>
-          </a:ln>
-          <a:effectLst>
-            <a:outerShdw blurRad="292100" dist="139700" dir="2700000" algn="tl" rotWithShape="0">
-              <a:srgbClr val="333333">
-                <a:alpha val="65000"/>
-              </a:srgbClr>
-            </a:outerShdw>
-          </a:effectLst>
         </p:spPr>
       </p:pic>
-      <p:pic>
-        <p:nvPicPr>
-          <p:cNvPr id="16" name="Imagem 15" descr="Interface gráfica do usuário, Aplicativo&#10;&#10;O conteúdo gerado por IA pode estar incorreto.">
-            <a:extLst>
-              <a:ext uri="{FF2B5EF4-FFF2-40B4-BE49-F238E27FC236}">
-                <a16:creationId xmlns:a16="http://schemas.microsoft.com/office/drawing/2014/main" id="{8D9C322A-2334-6EF3-3326-C3AB0BF1A9C7}"/>
-              </a:ext>
-            </a:extLst>
-          </p:cNvPr>
-          <p:cNvPicPr>
-            <a:picLocks noChangeAspect="1"/>
-          </p:cNvPicPr>
+      <p:sp>
+        <p:nvSpPr>
+          <p:cNvPr id="6" name="CaixaDeTexto 5">
+            <a:extLst>
+              <a:ext uri="{FF2B5EF4-FFF2-40B4-BE49-F238E27FC236}">
+                <a16:creationId xmlns:a16="http://schemas.microsoft.com/office/drawing/2014/main" id="{1A5CF01F-8666-74FF-35FB-905CE9ABDDCB}"/>
+              </a:ext>
+            </a:extLst>
+          </p:cNvPr>
+          <p:cNvSpPr txBox="1"/>
           <p:nvPr/>
-        </p:nvPicPr>
-        <p:blipFill>
-          <a:blip r:embed="rId3"/>
-          <a:stretch>
-            <a:fillRect/>
-          </a:stretch>
-        </p:blipFill>
+        </p:nvSpPr>
         <p:spPr>
           <a:xfrm>
-            <a:off x="2673805" y="3844762"/>
-            <a:ext cx="3550168" cy="2890221"/>
+            <a:off x="6554584" y="2505963"/>
+            <a:ext cx="4698134" cy="2862322"/>
           </a:xfrm>
           <a:prstGeom prst="rect">
             <a:avLst/>
           </a:prstGeom>
-          <a:ln w="38100">
+          <a:solidFill>
+            <a:srgbClr val="006600">
+              <a:alpha val="30196"/>
+            </a:srgbClr>
+          </a:solidFill>
+          <a:ln w="19050">
             <a:solidFill>
               <a:schemeClr val="bg1">
-                <a:lumMod val="75000"/>
+                <a:lumMod val="65000"/>
               </a:schemeClr>
             </a:solidFill>
           </a:ln>
-          <a:effectLst>
-            <a:outerShdw blurRad="292100" dist="139700" dir="2700000" algn="tl" rotWithShape="0">
-              <a:srgbClr val="333333">
-                <a:alpha val="65000"/>
-              </a:srgbClr>
-            </a:outerShdw>
-          </a:effectLst>
         </p:spPr>
-      </p:pic>
-      <p:pic>
-        <p:nvPicPr>
-          <p:cNvPr id="20" name="Imagem 19" descr="Gráfico, Gráfico de barras&#10;&#10;O conteúdo gerado por IA pode estar incorreto.">
-            <a:extLst>
-              <a:ext uri="{FF2B5EF4-FFF2-40B4-BE49-F238E27FC236}">
-                <a16:creationId xmlns:a16="http://schemas.microsoft.com/office/drawing/2014/main" id="{FBC50D47-6026-E497-4266-DF02DE3D82CC}"/>
-              </a:ext>
-            </a:extLst>
-          </p:cNvPr>
-          <p:cNvPicPr>
-            <a:picLocks noChangeAspect="1"/>
-          </p:cNvPicPr>
-          <p:nvPr/>
-        </p:nvPicPr>
-        <p:blipFill>
-          <a:blip r:embed="rId4"/>
-          <a:stretch>
-            <a:fillRect/>
-          </a:stretch>
-        </p:blipFill>
-        <p:spPr>
-          <a:xfrm>
-            <a:off x="5627056" y="1376682"/>
-            <a:ext cx="3973316" cy="2827855"/>
-          </a:xfrm>
-          <a:prstGeom prst="rect">
-            <a:avLst/>
-          </a:prstGeom>
-          <a:ln w="38100">
-            <a:solidFill>
-              <a:schemeClr val="bg1">
-                <a:lumMod val="75000"/>
-              </a:schemeClr>
-            </a:solidFill>
-          </a:ln>
-          <a:effectLst>
-            <a:outerShdw blurRad="292100" dist="139700" dir="2700000" algn="tl" rotWithShape="0">
-              <a:srgbClr val="333333">
-                <a:alpha val="65000"/>
-              </a:srgbClr>
-            </a:outerShdw>
-          </a:effectLst>
-        </p:spPr>
-      </p:pic>
-      <p:sp>
-        <p:nvSpPr>
-          <p:cNvPr id="2" name="CaixaDeTexto 1">
-            <a:extLst>
-              <a:ext uri="{FF2B5EF4-FFF2-40B4-BE49-F238E27FC236}">
-                <a16:creationId xmlns:a16="http://schemas.microsoft.com/office/drawing/2014/main" id="{28B15AA0-C842-B82F-F2DB-0C48368C089C}"/>
-              </a:ext>
-            </a:extLst>
-          </p:cNvPr>
-          <p:cNvSpPr txBox="1"/>
-          <p:nvPr/>
-        </p:nvSpPr>
-        <p:spPr>
-          <a:xfrm>
-            <a:off x="1299871" y="746427"/>
-            <a:ext cx="2747868" cy="461665"/>
-          </a:xfrm>
-          <a:prstGeom prst="rect">
-            <a:avLst/>
-          </a:prstGeom>
-          <a:noFill/>
-        </p:spPr>
-        <p:txBody>
-          <a:bodyPr wrap="none" rtlCol="0">
+        <p:txBody>
+          <a:bodyPr wrap="square" rtlCol="0">
             <a:spAutoFit/>
           </a:bodyPr>
           <a:lstStyle/>
           <a:p>
             <a:r>
-              <a:rPr lang="pt-BR" sz="2400" dirty="0">
+              <a:rPr lang="pt-BR" dirty="0">
                 <a:solidFill>
-                  <a:schemeClr val="tx1">
-                    <a:lumMod val="65000"/>
-                    <a:lumOff val="35000"/>
-                  </a:schemeClr>
+                  <a:schemeClr val="bg1"/>
                 </a:solidFill>
-                <a:latin typeface="Arial Nova" panose="020B0504020202020204" pitchFamily="34" charset="0"/>
               </a:rPr>
-              <a:t>As funcionalidades</a:t>
-            </a:r>
-          </a:p>
-        </p:txBody>
-      </p:sp>
-      <p:pic>
-        <p:nvPicPr>
-          <p:cNvPr id="5" name="Imagem 4" descr="Interface gráfica do usuário&#10;&#10;O conteúdo gerado por IA pode estar incorreto.">
-            <a:extLst>
-              <a:ext uri="{FF2B5EF4-FFF2-40B4-BE49-F238E27FC236}">
-                <a16:creationId xmlns:a16="http://schemas.microsoft.com/office/drawing/2014/main" id="{2FB37E33-F696-2D69-570D-333E96FC4EDB}"/>
-              </a:ext>
-            </a:extLst>
-          </p:cNvPr>
-          <p:cNvPicPr>
-            <a:picLocks noChangeAspect="1"/>
-          </p:cNvPicPr>
-          <p:nvPr/>
-        </p:nvPicPr>
-        <p:blipFill>
-          <a:blip r:embed="rId5"/>
-          <a:stretch>
-            <a:fillRect/>
-          </a:stretch>
-        </p:blipFill>
-        <p:spPr>
-          <a:xfrm>
-            <a:off x="8967021" y="2992970"/>
-            <a:ext cx="2639913" cy="3742013"/>
-          </a:xfrm>
-          <a:prstGeom prst="rect">
-            <a:avLst/>
-          </a:prstGeom>
-          <a:ln w="38100">
-            <a:solidFill>
-              <a:schemeClr val="bg1">
-                <a:lumMod val="75000"/>
-              </a:schemeClr>
-            </a:solidFill>
-          </a:ln>
-          <a:effectLst>
-            <a:outerShdw blurRad="292100" dist="139700" dir="2700000" algn="tl" rotWithShape="0">
-              <a:srgbClr val="333333">
-                <a:alpha val="65000"/>
-              </a:srgbClr>
-            </a:outerShdw>
-          </a:effectLst>
-        </p:spPr>
-      </p:pic>
+              <a:t>Nas configurações, o responsável pelo processo na empresa, pode gerenciar:</a:t>
+            </a:r>
+          </a:p>
+          <a:p>
+            <a:pPr marL="285750" indent="-285750">
+              <a:buFont typeface="Arial" panose="020B0604020202020204" pitchFamily="34" charset="0"/>
+              <a:buChar char="•"/>
+            </a:pPr>
+            <a:endParaRPr lang="pt-BR" dirty="0">
+              <a:solidFill>
+                <a:schemeClr val="bg1"/>
+              </a:solidFill>
+            </a:endParaRPr>
+          </a:p>
+          <a:p>
+            <a:pPr marL="285750" indent="-285750">
+              <a:buFont typeface="Arial" panose="020B0604020202020204" pitchFamily="34" charset="0"/>
+              <a:buChar char="•"/>
+            </a:pPr>
+            <a:r>
+              <a:rPr lang="pt-BR" dirty="0">
+                <a:solidFill>
+                  <a:schemeClr val="bg1"/>
+                </a:solidFill>
+              </a:rPr>
+              <a:t>Os dados da empresa</a:t>
+            </a:r>
+          </a:p>
+          <a:p>
+            <a:pPr marL="285750" indent="-285750">
+              <a:buFont typeface="Arial" panose="020B0604020202020204" pitchFamily="34" charset="0"/>
+              <a:buChar char="•"/>
+            </a:pPr>
+            <a:endParaRPr lang="pt-BR" dirty="0">
+              <a:solidFill>
+                <a:schemeClr val="bg1"/>
+              </a:solidFill>
+            </a:endParaRPr>
+          </a:p>
+          <a:p>
+            <a:pPr marL="285750" indent="-285750">
+              <a:buFont typeface="Arial" panose="020B0604020202020204" pitchFamily="34" charset="0"/>
+              <a:buChar char="•"/>
+            </a:pPr>
+            <a:r>
+              <a:rPr lang="pt-BR" dirty="0">
+                <a:solidFill>
+                  <a:schemeClr val="bg1"/>
+                </a:solidFill>
+              </a:rPr>
+              <a:t>Os dados dos membros, sejam outros administradores do sistema, ou somente avaliadores dos candidatos</a:t>
+            </a:r>
+          </a:p>
+          <a:p>
+            <a:pPr marL="285750" indent="-285750">
+              <a:buFont typeface="Arial" panose="020B0604020202020204" pitchFamily="34" charset="0"/>
+              <a:buChar char="•"/>
+            </a:pPr>
+            <a:endParaRPr lang="pt-BR" dirty="0">
+              <a:solidFill>
+                <a:schemeClr val="bg1"/>
+              </a:solidFill>
+            </a:endParaRPr>
+          </a:p>
+          <a:p>
+            <a:r>
+              <a:rPr lang="pt-BR" dirty="0">
+                <a:solidFill>
+                  <a:schemeClr val="bg1"/>
+                </a:solidFill>
+              </a:rPr>
+              <a:t>Qualquer usuário pode manutenir seus dados</a:t>
+            </a:r>
+          </a:p>
+        </p:txBody>
+      </p:sp>
     </p:spTree>
     <p:extLst>
       <p:ext uri="{BB962C8B-B14F-4D97-AF65-F5344CB8AC3E}">
@@ -11614,7 +13003,7 @@
         <p:cNvPr id="1" name="">
           <a:extLst>
             <a:ext uri="{FF2B5EF4-FFF2-40B4-BE49-F238E27FC236}">
-              <a16:creationId xmlns:a16="http://schemas.microsoft.com/office/drawing/2014/main" id="{FAB0C9C8-73D6-A737-9351-BEE0D888ABC4}"/>
+              <a16:creationId xmlns:a16="http://schemas.microsoft.com/office/drawing/2014/main" id="{FDD92F50-2ED9-0040-DADF-D32C0FC4E8BE}"/>
             </a:ext>
           </a:extLst>
         </p:cNvPr>
@@ -11634,7 +13023,7 @@
           <p:cNvPr id="7" name="Retângulo 6">
             <a:extLst>
               <a:ext uri="{FF2B5EF4-FFF2-40B4-BE49-F238E27FC236}">
-                <a16:creationId xmlns:a16="http://schemas.microsoft.com/office/drawing/2014/main" id="{C958D995-2DC8-C6DB-7464-B8A0D2BB6039}"/>
+                <a16:creationId xmlns:a16="http://schemas.microsoft.com/office/drawing/2014/main" id="{680E11D4-5187-24C4-7FEF-F794F1E00C33}"/>
               </a:ext>
             </a:extLst>
           </p:cNvPr>
@@ -11686,7 +13075,7 @@
           <p:cNvPr id="13" name="Espaço Reservado para Número de Slide 12">
             <a:extLst>
               <a:ext uri="{FF2B5EF4-FFF2-40B4-BE49-F238E27FC236}">
-                <a16:creationId xmlns:a16="http://schemas.microsoft.com/office/drawing/2014/main" id="{313A3BCC-7F08-304B-6F7B-F766B9D011E9}"/>
+                <a16:creationId xmlns:a16="http://schemas.microsoft.com/office/drawing/2014/main" id="{C40E006A-B04B-BBEA-F8F2-6D1328582685}"/>
               </a:ext>
             </a:extLst>
           </p:cNvPr>
@@ -11715,7 +13104,7 @@
           <p:cNvPr id="11" name="CaixaDeTexto 10">
             <a:extLst>
               <a:ext uri="{FF2B5EF4-FFF2-40B4-BE49-F238E27FC236}">
-                <a16:creationId xmlns:a16="http://schemas.microsoft.com/office/drawing/2014/main" id="{F66E6753-A9BB-84E8-D48F-EBEFAEEA54D4}"/>
+                <a16:creationId xmlns:a16="http://schemas.microsoft.com/office/drawing/2014/main" id="{C6F7468A-A3B0-D439-2A47-0CAE6A00D147}"/>
               </a:ext>
             </a:extLst>
           </p:cNvPr>
@@ -11753,12 +13142,121 @@
           </a:p>
         </p:txBody>
       </p:sp>
+      <p:sp>
+        <p:nvSpPr>
+          <p:cNvPr id="2" name="CaixaDeTexto 1">
+            <a:extLst>
+              <a:ext uri="{FF2B5EF4-FFF2-40B4-BE49-F238E27FC236}">
+                <a16:creationId xmlns:a16="http://schemas.microsoft.com/office/drawing/2014/main" id="{1172495D-68A9-0B29-37DB-143837ED31CD}"/>
+              </a:ext>
+            </a:extLst>
+          </p:cNvPr>
+          <p:cNvSpPr txBox="1"/>
+          <p:nvPr/>
+        </p:nvSpPr>
+        <p:spPr>
+          <a:xfrm>
+            <a:off x="1299871" y="746427"/>
+            <a:ext cx="2747868" cy="461665"/>
+          </a:xfrm>
+          <a:prstGeom prst="rect">
+            <a:avLst/>
+          </a:prstGeom>
+          <a:noFill/>
+        </p:spPr>
+        <p:txBody>
+          <a:bodyPr wrap="none" rtlCol="0">
+            <a:spAutoFit/>
+          </a:bodyPr>
+          <a:lstStyle/>
+          <a:p>
+            <a:r>
+              <a:rPr lang="pt-BR" sz="2400" dirty="0">
+                <a:solidFill>
+                  <a:schemeClr val="tx1">
+                    <a:lumMod val="65000"/>
+                    <a:lumOff val="35000"/>
+                  </a:schemeClr>
+                </a:solidFill>
+                <a:latin typeface="Arial Nova" panose="020B0504020202020204" pitchFamily="34" charset="0"/>
+              </a:rPr>
+              <a:t>As funcionalidades</a:t>
+            </a:r>
+          </a:p>
+        </p:txBody>
+      </p:sp>
+      <p:sp>
+        <p:nvSpPr>
+          <p:cNvPr id="6" name="CaixaDeTexto 5">
+            <a:extLst>
+              <a:ext uri="{FF2B5EF4-FFF2-40B4-BE49-F238E27FC236}">
+                <a16:creationId xmlns:a16="http://schemas.microsoft.com/office/drawing/2014/main" id="{A659B7DB-F09F-D65E-C845-75C4453BC5A1}"/>
+              </a:ext>
+            </a:extLst>
+          </p:cNvPr>
+          <p:cNvSpPr txBox="1"/>
+          <p:nvPr/>
+        </p:nvSpPr>
+        <p:spPr>
+          <a:xfrm>
+            <a:off x="212770" y="1336831"/>
+            <a:ext cx="4995453" cy="1477328"/>
+          </a:xfrm>
+          <a:prstGeom prst="rect">
+            <a:avLst/>
+          </a:prstGeom>
+          <a:solidFill>
+            <a:srgbClr val="006600">
+              <a:alpha val="30196"/>
+            </a:srgbClr>
+          </a:solidFill>
+          <a:ln w="19050">
+            <a:solidFill>
+              <a:schemeClr val="bg1">
+                <a:lumMod val="65000"/>
+              </a:schemeClr>
+            </a:solidFill>
+          </a:ln>
+        </p:spPr>
+        <p:txBody>
+          <a:bodyPr wrap="square" rtlCol="0">
+            <a:spAutoFit/>
+          </a:bodyPr>
+          <a:lstStyle/>
+          <a:p>
+            <a:r>
+              <a:rPr lang="pt-BR" dirty="0">
+                <a:solidFill>
+                  <a:schemeClr val="bg1"/>
+                </a:solidFill>
+              </a:rPr>
+              <a:t>Na página principal, o usuário pode ver todas as vagas divulgadas com </a:t>
+            </a:r>
+            <a:r>
+              <a:rPr lang="pt-BR" dirty="0" err="1">
+                <a:solidFill>
+                  <a:schemeClr val="bg1"/>
+                </a:solidFill>
+              </a:rPr>
+              <a:t>qtde</a:t>
+            </a:r>
+            <a:r>
+              <a:rPr lang="pt-BR" dirty="0">
+                <a:solidFill>
+                  <a:schemeClr val="bg1"/>
+                </a:solidFill>
+              </a:rPr>
+              <a:t> de inscritos, tempo de divulgação, status (ativa, inativa, suspensa, cancelada ou preenchida) e filtra-las por área, ou entrar na vaga. </a:t>
+            </a:r>
+          </a:p>
+        </p:txBody>
+      </p:sp>
       <p:pic>
         <p:nvPicPr>
-          <p:cNvPr id="10" name="Imagem 9" descr="Interface gráfica do usuário, Aplicativo&#10;&#10;O conteúdo gerado por IA pode estar incorreto.">
-            <a:extLst>
-              <a:ext uri="{FF2B5EF4-FFF2-40B4-BE49-F238E27FC236}">
-                <a16:creationId xmlns:a16="http://schemas.microsoft.com/office/drawing/2014/main" id="{0D0F57B5-0008-0372-FEF1-69C0F46260A4}"/>
+          <p:cNvPr id="3" name="Imagem 2" descr="Interface gráfica do usuário, Aplicativo&#10;&#10;O conteúdo gerado por IA pode estar incorreto.">
+            <a:extLst>
+              <a:ext uri="{FF2B5EF4-FFF2-40B4-BE49-F238E27FC236}">
+                <a16:creationId xmlns:a16="http://schemas.microsoft.com/office/drawing/2014/main" id="{EE5DBE06-25BE-EE92-4DAB-B50E9E7A05C2}"/>
               </a:ext>
             </a:extLst>
           </p:cNvPr>
@@ -11775,8 +13273,8 @@
         </p:blipFill>
         <p:spPr>
           <a:xfrm>
-            <a:off x="1627178" y="1434364"/>
-            <a:ext cx="3313272" cy="2712489"/>
+            <a:off x="254386" y="3011132"/>
+            <a:ext cx="4953837" cy="3710343"/>
           </a:xfrm>
           <a:prstGeom prst="rect">
             <a:avLst/>
@@ -11799,10 +13297,10 @@
       </p:pic>
       <p:pic>
         <p:nvPicPr>
-          <p:cNvPr id="16" name="Imagem 15" descr="Interface gráfica do usuário, Aplicativo&#10;&#10;O conteúdo gerado por IA pode estar incorreto.">
-            <a:extLst>
-              <a:ext uri="{FF2B5EF4-FFF2-40B4-BE49-F238E27FC236}">
-                <a16:creationId xmlns:a16="http://schemas.microsoft.com/office/drawing/2014/main" id="{36B0F01C-A562-3583-92B4-EC311CBD4D1C}"/>
+          <p:cNvPr id="8" name="Imagem 7" descr="Interface gráfica do usuário, Aplicativo&#10;&#10;O conteúdo gerado por IA pode estar incorreto.">
+            <a:extLst>
+              <a:ext uri="{FF2B5EF4-FFF2-40B4-BE49-F238E27FC236}">
+                <a16:creationId xmlns:a16="http://schemas.microsoft.com/office/drawing/2014/main" id="{28B80230-385C-0F87-B5A0-96A2FFB8716E}"/>
               </a:ext>
             </a:extLst>
           </p:cNvPr>
@@ -11819,8 +13317,8 @@
         </p:blipFill>
         <p:spPr>
           <a:xfrm>
-            <a:off x="2673805" y="3844762"/>
-            <a:ext cx="3550168" cy="2890221"/>
+            <a:off x="5302893" y="3011132"/>
+            <a:ext cx="6537653" cy="3739982"/>
           </a:xfrm>
           <a:prstGeom prst="rect">
             <a:avLst/>
@@ -11841,141 +13339,220 @@
           </a:effectLst>
         </p:spPr>
       </p:pic>
+      <p:sp>
+        <p:nvSpPr>
+          <p:cNvPr id="9" name="CaixaDeTexto 8">
+            <a:extLst>
+              <a:ext uri="{FF2B5EF4-FFF2-40B4-BE49-F238E27FC236}">
+                <a16:creationId xmlns:a16="http://schemas.microsoft.com/office/drawing/2014/main" id="{E5794747-726A-B83B-6246-CAA17F2196B4}"/>
+              </a:ext>
+            </a:extLst>
+          </p:cNvPr>
+          <p:cNvSpPr txBox="1"/>
+          <p:nvPr/>
+        </p:nvSpPr>
+        <p:spPr>
+          <a:xfrm>
+            <a:off x="5302893" y="1336831"/>
+            <a:ext cx="2292225" cy="1477328"/>
+          </a:xfrm>
+          <a:prstGeom prst="rect">
+            <a:avLst/>
+          </a:prstGeom>
+          <a:solidFill>
+            <a:srgbClr val="006600">
+              <a:alpha val="30196"/>
+            </a:srgbClr>
+          </a:solidFill>
+          <a:ln w="19050">
+            <a:solidFill>
+              <a:schemeClr val="bg1">
+                <a:lumMod val="65000"/>
+              </a:schemeClr>
+            </a:solidFill>
+          </a:ln>
+        </p:spPr>
+        <p:txBody>
+          <a:bodyPr wrap="square" rtlCol="0">
+            <a:spAutoFit/>
+          </a:bodyPr>
+          <a:lstStyle/>
+          <a:p>
+            <a:r>
+              <a:rPr lang="pt-BR" dirty="0">
+                <a:solidFill>
+                  <a:schemeClr val="bg1"/>
+                </a:solidFill>
+              </a:rPr>
+              <a:t>Clicando na vaga, tem acesso aos candidatos e suas notas gerais ponderadas.</a:t>
+            </a:r>
+            <a:br>
+              <a:rPr lang="pt-BR" dirty="0">
+                <a:solidFill>
+                  <a:schemeClr val="bg1"/>
+                </a:solidFill>
+              </a:rPr>
+            </a:br>
+            <a:endParaRPr lang="pt-BR" dirty="0">
+              <a:solidFill>
+                <a:schemeClr val="bg1"/>
+              </a:solidFill>
+            </a:endParaRPr>
+          </a:p>
+        </p:txBody>
+      </p:sp>
+      <p:sp>
+        <p:nvSpPr>
+          <p:cNvPr id="10" name="CaixaDeTexto 9">
+            <a:extLst>
+              <a:ext uri="{FF2B5EF4-FFF2-40B4-BE49-F238E27FC236}">
+                <a16:creationId xmlns:a16="http://schemas.microsoft.com/office/drawing/2014/main" id="{0E6B37C1-718F-9200-DD2D-24C369783139}"/>
+              </a:ext>
+            </a:extLst>
+          </p:cNvPr>
+          <p:cNvSpPr txBox="1"/>
+          <p:nvPr/>
+        </p:nvSpPr>
+        <p:spPr>
+          <a:xfrm>
+            <a:off x="8450425" y="1345195"/>
+            <a:ext cx="3063550" cy="923330"/>
+          </a:xfrm>
+          <a:prstGeom prst="rect">
+            <a:avLst/>
+          </a:prstGeom>
+          <a:solidFill>
+            <a:srgbClr val="006600">
+              <a:alpha val="30196"/>
+            </a:srgbClr>
+          </a:solidFill>
+          <a:ln w="19050">
+            <a:solidFill>
+              <a:schemeClr val="bg1">
+                <a:lumMod val="65000"/>
+              </a:schemeClr>
+            </a:solidFill>
+          </a:ln>
+        </p:spPr>
+        <p:txBody>
+          <a:bodyPr wrap="square" rtlCol="0">
+            <a:spAutoFit/>
+          </a:bodyPr>
+          <a:lstStyle/>
+          <a:p>
+            <a:r>
+              <a:rPr lang="pt-BR" dirty="0">
+                <a:solidFill>
+                  <a:schemeClr val="bg1"/>
+                </a:solidFill>
+              </a:rPr>
+              <a:t>Este botão permite acessar o link do formulário para envio aos candidatos.</a:t>
+            </a:r>
+          </a:p>
+        </p:txBody>
+      </p:sp>
+      <mc:AlternateContent xmlns:mc="http://schemas.openxmlformats.org/markup-compatibility/2006">
+        <mc:Choice xmlns:p14="http://schemas.microsoft.com/office/powerpoint/2010/main" Requires="p14">
+          <p:contentPart p14:bwMode="auto" r:id="rId4">
+            <p14:nvContentPartPr>
+              <p14:cNvPr id="12" name="Tinta 11">
+                <a:extLst>
+                  <a:ext uri="{FF2B5EF4-FFF2-40B4-BE49-F238E27FC236}">
+                    <a16:creationId xmlns:a16="http://schemas.microsoft.com/office/drawing/2014/main" id="{F5B5E0D0-A78E-C1A7-CF59-8896AE40F54B}"/>
+                  </a:ext>
+                </a:extLst>
+              </p14:cNvPr>
+              <p14:cNvContentPartPr/>
+              <p14:nvPr/>
+            </p14:nvContentPartPr>
+            <p14:xfrm>
+              <a:off x="10311616" y="3085084"/>
+              <a:ext cx="1623600" cy="387000"/>
+            </p14:xfrm>
+          </p:contentPart>
+        </mc:Choice>
+        <mc:Fallback>
+          <p:pic>
+            <p:nvPicPr>
+              <p:cNvPr id="12" name="Tinta 11">
+                <a:extLst>
+                  <a:ext uri="{FF2B5EF4-FFF2-40B4-BE49-F238E27FC236}">
+                    <a16:creationId xmlns:a16="http://schemas.microsoft.com/office/drawing/2014/main" id="{F5B5E0D0-A78E-C1A7-CF59-8896AE40F54B}"/>
+                  </a:ext>
+                </a:extLst>
+              </p:cNvPr>
+              <p:cNvPicPr/>
+              <p:nvPr/>
+            </p:nvPicPr>
+            <p:blipFill>
+              <a:blip r:embed="rId5"/>
+              <a:stretch>
+                <a:fillRect/>
+              </a:stretch>
+            </p:blipFill>
+            <p:spPr>
+              <a:xfrm>
+                <a:off x="10297576" y="3071044"/>
+                <a:ext cx="1651680" cy="415440"/>
+              </a:xfrm>
+              <a:prstGeom prst="rect">
+                <a:avLst/>
+              </a:prstGeom>
+            </p:spPr>
+          </p:pic>
+        </mc:Fallback>
+      </mc:AlternateContent>
       <p:pic>
         <p:nvPicPr>
-          <p:cNvPr id="20" name="Imagem 19" descr="Gráfico, Gráfico de barras&#10;&#10;O conteúdo gerado por IA pode estar incorreto.">
-            <a:extLst>
-              <a:ext uri="{FF2B5EF4-FFF2-40B4-BE49-F238E27FC236}">
-                <a16:creationId xmlns:a16="http://schemas.microsoft.com/office/drawing/2014/main" id="{B0AF4482-A72D-C3AE-7121-45C0D3FF31B3}"/>
+          <p:cNvPr id="14" name="Picture 2" descr="setas-png-1 (1) – Academia do Direito de Trânsito">
+            <a:extLst>
+              <a:ext uri="{FF2B5EF4-FFF2-40B4-BE49-F238E27FC236}">
+                <a16:creationId xmlns:a16="http://schemas.microsoft.com/office/drawing/2014/main" id="{047E8D26-9C07-4C22-8242-1FAACB49548B}"/>
               </a:ext>
             </a:extLst>
           </p:cNvPr>
           <p:cNvPicPr>
-            <a:picLocks noChangeAspect="1"/>
+            <a:picLocks noChangeAspect="1" noChangeArrowheads="1"/>
           </p:cNvPicPr>
           <p:nvPr/>
         </p:nvPicPr>
-        <p:blipFill>
-          <a:blip r:embed="rId4"/>
+        <p:blipFill rotWithShape="1">
+          <a:blip r:embed="rId6">
+            <a:extLst>
+              <a:ext uri="{28A0092B-C50C-407E-A947-70E740481C1C}">
+                <a14:useLocalDpi xmlns:a14="http://schemas.microsoft.com/office/drawing/2010/main" val="0"/>
+              </a:ext>
+            </a:extLst>
+          </a:blip>
+          <a:srcRect l="13298" r="60035" b="9226"/>
           <a:stretch>
             <a:fillRect/>
           </a:stretch>
         </p:blipFill>
-        <p:spPr>
-          <a:xfrm>
-            <a:off x="5627056" y="1376682"/>
-            <a:ext cx="3973316" cy="2827855"/>
-          </a:xfrm>
-          <a:prstGeom prst="rect">
-            <a:avLst/>
-          </a:prstGeom>
-          <a:ln w="38100">
-            <a:solidFill>
-              <a:schemeClr val="bg1">
-                <a:lumMod val="75000"/>
-              </a:schemeClr>
-            </a:solidFill>
-          </a:ln>
-          <a:effectLst>
-            <a:outerShdw blurRad="292100" dist="139700" dir="2700000" algn="tl" rotWithShape="0">
-              <a:srgbClr val="333333">
-                <a:alpha val="65000"/>
-              </a:srgbClr>
-            </a:outerShdw>
-          </a:effectLst>
-        </p:spPr>
-      </p:pic>
-      <p:sp>
-        <p:nvSpPr>
-          <p:cNvPr id="2" name="CaixaDeTexto 1">
-            <a:extLst>
-              <a:ext uri="{FF2B5EF4-FFF2-40B4-BE49-F238E27FC236}">
-                <a16:creationId xmlns:a16="http://schemas.microsoft.com/office/drawing/2014/main" id="{3F1F6B8F-2EFB-508A-7471-66CD7B805B68}"/>
-              </a:ext>
-            </a:extLst>
-          </p:cNvPr>
-          <p:cNvSpPr txBox="1"/>
-          <p:nvPr/>
-        </p:nvSpPr>
-        <p:spPr>
-          <a:xfrm>
-            <a:off x="1299871" y="746427"/>
-            <a:ext cx="2747868" cy="461665"/>
+        <p:spPr bwMode="auto">
+          <a:xfrm rot="17208037" flipH="1">
+            <a:off x="9431170" y="2380097"/>
+            <a:ext cx="796595" cy="1035816"/>
           </a:xfrm>
           <a:prstGeom prst="rect">
             <a:avLst/>
           </a:prstGeom>
           <a:noFill/>
-        </p:spPr>
-        <p:txBody>
-          <a:bodyPr wrap="none" rtlCol="0">
-            <a:spAutoFit/>
-          </a:bodyPr>
-          <a:lstStyle/>
-          <a:p>
-            <a:r>
-              <a:rPr lang="pt-BR" sz="2400" dirty="0">
+          <a:extLst>
+            <a:ext uri="{909E8E84-426E-40DD-AFC4-6F175D3DCCD1}">
+              <a14:hiddenFill xmlns:a14="http://schemas.microsoft.com/office/drawing/2010/main">
                 <a:solidFill>
-                  <a:schemeClr val="tx1">
-                    <a:lumMod val="65000"/>
-                    <a:lumOff val="35000"/>
-                  </a:schemeClr>
+                  <a:srgbClr val="FFFFFF"/>
                 </a:solidFill>
-                <a:latin typeface="Arial Nova" panose="020B0504020202020204" pitchFamily="34" charset="0"/>
-              </a:rPr>
-              <a:t>As funcionalidades</a:t>
-            </a:r>
-          </a:p>
-        </p:txBody>
-      </p:sp>
-      <p:pic>
-        <p:nvPicPr>
-          <p:cNvPr id="5" name="Imagem 4" descr="Interface gráfica do usuário&#10;&#10;O conteúdo gerado por IA pode estar incorreto.">
-            <a:extLst>
-              <a:ext uri="{FF2B5EF4-FFF2-40B4-BE49-F238E27FC236}">
-                <a16:creationId xmlns:a16="http://schemas.microsoft.com/office/drawing/2014/main" id="{C052FFDC-40E1-3F94-604C-7E60153A45BF}"/>
-              </a:ext>
-            </a:extLst>
-          </p:cNvPr>
-          <p:cNvPicPr>
-            <a:picLocks noChangeAspect="1"/>
-          </p:cNvPicPr>
-          <p:nvPr/>
-        </p:nvPicPr>
-        <p:blipFill>
-          <a:blip r:embed="rId5"/>
-          <a:stretch>
-            <a:fillRect/>
-          </a:stretch>
-        </p:blipFill>
-        <p:spPr>
-          <a:xfrm>
-            <a:off x="8967021" y="2992970"/>
-            <a:ext cx="2639913" cy="3742013"/>
-          </a:xfrm>
-          <a:prstGeom prst="rect">
-            <a:avLst/>
-          </a:prstGeom>
-          <a:ln w="38100">
-            <a:solidFill>
-              <a:schemeClr val="bg1">
-                <a:lumMod val="75000"/>
-              </a:schemeClr>
-            </a:solidFill>
-          </a:ln>
-          <a:effectLst>
-            <a:outerShdw blurRad="292100" dist="139700" dir="2700000" algn="tl" rotWithShape="0">
-              <a:srgbClr val="333333">
-                <a:alpha val="65000"/>
-              </a:srgbClr>
-            </a:outerShdw>
-          </a:effectLst>
+              </a14:hiddenFill>
+            </a:ext>
+          </a:extLst>
         </p:spPr>
       </p:pic>
     </p:spTree>
     <p:extLst>
       <p:ext uri="{BB962C8B-B14F-4D97-AF65-F5344CB8AC3E}">
-        <p14:creationId xmlns:p14="http://schemas.microsoft.com/office/powerpoint/2010/main" val="3289289253"/>
+        <p14:creationId xmlns:p14="http://schemas.microsoft.com/office/powerpoint/2010/main" val="3153563606"/>
       </p:ext>
     </p:extLst>
   </p:cSld>
@@ -11993,7 +13570,7 @@
         <p:cNvPr id="1" name="">
           <a:extLst>
             <a:ext uri="{FF2B5EF4-FFF2-40B4-BE49-F238E27FC236}">
-              <a16:creationId xmlns:a16="http://schemas.microsoft.com/office/drawing/2014/main" id="{83A285C9-7B58-05A9-7F29-4ACDB5AFB70B}"/>
+              <a16:creationId xmlns:a16="http://schemas.microsoft.com/office/drawing/2014/main" id="{684DE1F8-91AB-15F7-E13F-CED060018401}"/>
             </a:ext>
           </a:extLst>
         </p:cNvPr>
@@ -12013,7 +13590,7 @@
           <p:cNvPr id="7" name="Retângulo 6">
             <a:extLst>
               <a:ext uri="{FF2B5EF4-FFF2-40B4-BE49-F238E27FC236}">
-                <a16:creationId xmlns:a16="http://schemas.microsoft.com/office/drawing/2014/main" id="{1A52EF7B-13AA-F2BD-0DCA-D525F0AD6180}"/>
+                <a16:creationId xmlns:a16="http://schemas.microsoft.com/office/drawing/2014/main" id="{50456A46-2371-4D95-8B36-85777F4DEFE8}"/>
               </a:ext>
             </a:extLst>
           </p:cNvPr>
@@ -12065,7 +13642,7 @@
           <p:cNvPr id="13" name="Espaço Reservado para Número de Slide 12">
             <a:extLst>
               <a:ext uri="{FF2B5EF4-FFF2-40B4-BE49-F238E27FC236}">
-                <a16:creationId xmlns:a16="http://schemas.microsoft.com/office/drawing/2014/main" id="{81D20513-1A8E-B79B-0C15-9DAAD298C0F5}"/>
+                <a16:creationId xmlns:a16="http://schemas.microsoft.com/office/drawing/2014/main" id="{C6029644-C099-6E33-64D3-39B5DD670DE4}"/>
               </a:ext>
             </a:extLst>
           </p:cNvPr>
@@ -12094,7 +13671,7 @@
           <p:cNvPr id="11" name="CaixaDeTexto 10">
             <a:extLst>
               <a:ext uri="{FF2B5EF4-FFF2-40B4-BE49-F238E27FC236}">
-                <a16:creationId xmlns:a16="http://schemas.microsoft.com/office/drawing/2014/main" id="{CEB38247-437C-5861-D146-9EC5F02BF867}"/>
+                <a16:creationId xmlns:a16="http://schemas.microsoft.com/office/drawing/2014/main" id="{A8423B39-9349-F305-741C-72E8CA0EBA85}"/>
               </a:ext>
             </a:extLst>
           </p:cNvPr>
@@ -12132,144 +13709,12 @@
           </a:p>
         </p:txBody>
       </p:sp>
-      <p:pic>
-        <p:nvPicPr>
-          <p:cNvPr id="10" name="Imagem 9" descr="Interface gráfica do usuário, Aplicativo&#10;&#10;O conteúdo gerado por IA pode estar incorreto.">
-            <a:extLst>
-              <a:ext uri="{FF2B5EF4-FFF2-40B4-BE49-F238E27FC236}">
-                <a16:creationId xmlns:a16="http://schemas.microsoft.com/office/drawing/2014/main" id="{C2A9C702-1E73-EE2F-2BD5-CEB55C96D1E4}"/>
-              </a:ext>
-            </a:extLst>
-          </p:cNvPr>
-          <p:cNvPicPr>
-            <a:picLocks noChangeAspect="1"/>
-          </p:cNvPicPr>
-          <p:nvPr/>
-        </p:nvPicPr>
-        <p:blipFill>
-          <a:blip r:embed="rId2"/>
-          <a:stretch>
-            <a:fillRect/>
-          </a:stretch>
-        </p:blipFill>
-        <p:spPr>
-          <a:xfrm>
-            <a:off x="1627178" y="1434364"/>
-            <a:ext cx="3313272" cy="2712489"/>
-          </a:xfrm>
-          <a:prstGeom prst="rect">
-            <a:avLst/>
-          </a:prstGeom>
-          <a:ln w="38100">
-            <a:solidFill>
-              <a:schemeClr val="bg1">
-                <a:lumMod val="75000"/>
-              </a:schemeClr>
-            </a:solidFill>
-          </a:ln>
-          <a:effectLst>
-            <a:outerShdw blurRad="292100" dist="139700" dir="2700000" algn="tl" rotWithShape="0">
-              <a:srgbClr val="333333">
-                <a:alpha val="65000"/>
-              </a:srgbClr>
-            </a:outerShdw>
-          </a:effectLst>
-        </p:spPr>
-      </p:pic>
-      <p:pic>
-        <p:nvPicPr>
-          <p:cNvPr id="16" name="Imagem 15" descr="Interface gráfica do usuário, Aplicativo&#10;&#10;O conteúdo gerado por IA pode estar incorreto.">
-            <a:extLst>
-              <a:ext uri="{FF2B5EF4-FFF2-40B4-BE49-F238E27FC236}">
-                <a16:creationId xmlns:a16="http://schemas.microsoft.com/office/drawing/2014/main" id="{D2C29180-D159-1C0D-92BB-981EA2B5354F}"/>
-              </a:ext>
-            </a:extLst>
-          </p:cNvPr>
-          <p:cNvPicPr>
-            <a:picLocks noChangeAspect="1"/>
-          </p:cNvPicPr>
-          <p:nvPr/>
-        </p:nvPicPr>
-        <p:blipFill>
-          <a:blip r:embed="rId3"/>
-          <a:stretch>
-            <a:fillRect/>
-          </a:stretch>
-        </p:blipFill>
-        <p:spPr>
-          <a:xfrm>
-            <a:off x="2673805" y="3844762"/>
-            <a:ext cx="3550168" cy="2890221"/>
-          </a:xfrm>
-          <a:prstGeom prst="rect">
-            <a:avLst/>
-          </a:prstGeom>
-          <a:ln w="38100">
-            <a:solidFill>
-              <a:schemeClr val="bg1">
-                <a:lumMod val="75000"/>
-              </a:schemeClr>
-            </a:solidFill>
-          </a:ln>
-          <a:effectLst>
-            <a:outerShdw blurRad="292100" dist="139700" dir="2700000" algn="tl" rotWithShape="0">
-              <a:srgbClr val="333333">
-                <a:alpha val="65000"/>
-              </a:srgbClr>
-            </a:outerShdw>
-          </a:effectLst>
-        </p:spPr>
-      </p:pic>
-      <p:pic>
-        <p:nvPicPr>
-          <p:cNvPr id="20" name="Imagem 19" descr="Gráfico, Gráfico de barras&#10;&#10;O conteúdo gerado por IA pode estar incorreto.">
-            <a:extLst>
-              <a:ext uri="{FF2B5EF4-FFF2-40B4-BE49-F238E27FC236}">
-                <a16:creationId xmlns:a16="http://schemas.microsoft.com/office/drawing/2014/main" id="{A8E1F8AD-56A3-E977-C06C-AD8DD29E771D}"/>
-              </a:ext>
-            </a:extLst>
-          </p:cNvPr>
-          <p:cNvPicPr>
-            <a:picLocks noChangeAspect="1"/>
-          </p:cNvPicPr>
-          <p:nvPr/>
-        </p:nvPicPr>
-        <p:blipFill>
-          <a:blip r:embed="rId4"/>
-          <a:stretch>
-            <a:fillRect/>
-          </a:stretch>
-        </p:blipFill>
-        <p:spPr>
-          <a:xfrm>
-            <a:off x="5627056" y="1376682"/>
-            <a:ext cx="3973316" cy="2827855"/>
-          </a:xfrm>
-          <a:prstGeom prst="rect">
-            <a:avLst/>
-          </a:prstGeom>
-          <a:ln w="38100">
-            <a:solidFill>
-              <a:schemeClr val="bg1">
-                <a:lumMod val="75000"/>
-              </a:schemeClr>
-            </a:solidFill>
-          </a:ln>
-          <a:effectLst>
-            <a:outerShdw blurRad="292100" dist="139700" dir="2700000" algn="tl" rotWithShape="0">
-              <a:srgbClr val="333333">
-                <a:alpha val="65000"/>
-              </a:srgbClr>
-            </a:outerShdw>
-          </a:effectLst>
-        </p:spPr>
-      </p:pic>
       <p:sp>
         <p:nvSpPr>
           <p:cNvPr id="2" name="CaixaDeTexto 1">
             <a:extLst>
               <a:ext uri="{FF2B5EF4-FFF2-40B4-BE49-F238E27FC236}">
-                <a16:creationId xmlns:a16="http://schemas.microsoft.com/office/drawing/2014/main" id="{DFF9D908-F030-C99B-6FA6-40B3FB24611B}"/>
+                <a16:creationId xmlns:a16="http://schemas.microsoft.com/office/drawing/2014/main" id="{7E92CA2A-AABF-1EFF-5DBD-FA07C2B258CD}"/>
               </a:ext>
             </a:extLst>
           </p:cNvPr>
@@ -12307,12 +13752,205 @@
           </a:p>
         </p:txBody>
       </p:sp>
+      <p:sp>
+        <p:nvSpPr>
+          <p:cNvPr id="6" name="CaixaDeTexto 5">
+            <a:extLst>
+              <a:ext uri="{FF2B5EF4-FFF2-40B4-BE49-F238E27FC236}">
+                <a16:creationId xmlns:a16="http://schemas.microsoft.com/office/drawing/2014/main" id="{6CEBF8DF-D6EE-589A-27BD-F82366E56F6D}"/>
+              </a:ext>
+            </a:extLst>
+          </p:cNvPr>
+          <p:cNvSpPr txBox="1"/>
+          <p:nvPr/>
+        </p:nvSpPr>
+        <p:spPr>
+          <a:xfrm>
+            <a:off x="212770" y="1336831"/>
+            <a:ext cx="11889034" cy="1200329"/>
+          </a:xfrm>
+          <a:prstGeom prst="rect">
+            <a:avLst/>
+          </a:prstGeom>
+          <a:solidFill>
+            <a:srgbClr val="006600">
+              <a:alpha val="30196"/>
+            </a:srgbClr>
+          </a:solidFill>
+          <a:ln w="19050">
+            <a:solidFill>
+              <a:schemeClr val="bg1">
+                <a:lumMod val="65000"/>
+              </a:schemeClr>
+            </a:solidFill>
+          </a:ln>
+        </p:spPr>
+        <p:txBody>
+          <a:bodyPr wrap="square" rtlCol="0">
+            <a:spAutoFit/>
+          </a:bodyPr>
+          <a:lstStyle/>
+          <a:p>
+            <a:r>
+              <a:rPr lang="pt-BR" dirty="0">
+                <a:solidFill>
+                  <a:schemeClr val="bg1"/>
+                </a:solidFill>
+              </a:rPr>
+              <a:t>Quando a vaga é criada pelo demandante, ou pelo profissional do RH, o sistema permite que o usuário copie as configurações de uma outra vaga existente, ou crie do zero. Existem 3 pilares: Triagem, Fit Cultural e Teste Técnico. Os critérios são totalmente customizáveis e possuem um peso associado que corresponde ao grau de importância relativa dentro de cada pilar. Portanto, a soma dos pesos dos critérios precisa ser 100% dentro do pilar.</a:t>
+            </a:r>
+          </a:p>
+        </p:txBody>
+      </p:sp>
       <p:pic>
         <p:nvPicPr>
-          <p:cNvPr id="5" name="Imagem 4" descr="Interface gráfica do usuário&#10;&#10;O conteúdo gerado por IA pode estar incorreto.">
-            <a:extLst>
-              <a:ext uri="{FF2B5EF4-FFF2-40B4-BE49-F238E27FC236}">
-                <a16:creationId xmlns:a16="http://schemas.microsoft.com/office/drawing/2014/main" id="{34AF15BA-4C16-B42E-C709-CFECDCCEE986}"/>
+          <p:cNvPr id="16" name="Imagem 15" descr="Interface gráfica do usuário, Aplicativo&#10;&#10;O conteúdo gerado por IA pode estar incorreto.">
+            <a:extLst>
+              <a:ext uri="{FF2B5EF4-FFF2-40B4-BE49-F238E27FC236}">
+                <a16:creationId xmlns:a16="http://schemas.microsoft.com/office/drawing/2014/main" id="{0D246518-4B0A-5E75-ED60-AEC1DEE9628B}"/>
+              </a:ext>
+            </a:extLst>
+          </p:cNvPr>
+          <p:cNvPicPr>
+            <a:picLocks noChangeAspect="1"/>
+          </p:cNvPicPr>
+          <p:nvPr/>
+        </p:nvPicPr>
+        <p:blipFill>
+          <a:blip r:embed="rId2"/>
+          <a:srcRect l="6793" t="24975" r="3905"/>
+          <a:stretch>
+            <a:fillRect/>
+          </a:stretch>
+        </p:blipFill>
+        <p:spPr>
+          <a:xfrm>
+            <a:off x="212770" y="2665899"/>
+            <a:ext cx="3662204" cy="2954120"/>
+          </a:xfrm>
+          <a:prstGeom prst="rect">
+            <a:avLst/>
+          </a:prstGeom>
+        </p:spPr>
+      </p:pic>
+      <p:pic>
+        <p:nvPicPr>
+          <p:cNvPr id="18" name="Imagem 17" descr="Interface gráfica do usuário, Aplicativo&#10;&#10;O conteúdo gerado por IA pode estar incorreto.">
+            <a:extLst>
+              <a:ext uri="{FF2B5EF4-FFF2-40B4-BE49-F238E27FC236}">
+                <a16:creationId xmlns:a16="http://schemas.microsoft.com/office/drawing/2014/main" id="{D636C590-3F54-362B-82E5-2419F4EF1CD0}"/>
+              </a:ext>
+            </a:extLst>
+          </p:cNvPr>
+          <p:cNvPicPr>
+            <a:picLocks noChangeAspect="1"/>
+          </p:cNvPicPr>
+          <p:nvPr/>
+        </p:nvPicPr>
+        <p:blipFill>
+          <a:blip r:embed="rId3"/>
+          <a:srcRect l="3170" r="4209"/>
+          <a:stretch>
+            <a:fillRect/>
+          </a:stretch>
+        </p:blipFill>
+        <p:spPr>
+          <a:xfrm>
+            <a:off x="3944951" y="2665899"/>
+            <a:ext cx="3732244" cy="2308145"/>
+          </a:xfrm>
+          <a:prstGeom prst="rect">
+            <a:avLst/>
+          </a:prstGeom>
+        </p:spPr>
+      </p:pic>
+      <p:pic>
+        <p:nvPicPr>
+          <p:cNvPr id="20" name="Imagem 19" descr="Interface gráfica do usuário, Aplicativo&#10;&#10;O conteúdo gerado por IA pode estar incorreto.">
+            <a:extLst>
+              <a:ext uri="{FF2B5EF4-FFF2-40B4-BE49-F238E27FC236}">
+                <a16:creationId xmlns:a16="http://schemas.microsoft.com/office/drawing/2014/main" id="{3BA5D677-CE6F-B1D5-AA9F-9071A702D902}"/>
+              </a:ext>
+            </a:extLst>
+          </p:cNvPr>
+          <p:cNvPicPr>
+            <a:picLocks noChangeAspect="1"/>
+          </p:cNvPicPr>
+          <p:nvPr/>
+        </p:nvPicPr>
+        <p:blipFill>
+          <a:blip r:embed="rId4"/>
+          <a:srcRect l="3723" r="3878"/>
+          <a:stretch>
+            <a:fillRect/>
+          </a:stretch>
+        </p:blipFill>
+        <p:spPr>
+          <a:xfrm>
+            <a:off x="7747172" y="2673678"/>
+            <a:ext cx="3732244" cy="2308145"/>
+          </a:xfrm>
+          <a:prstGeom prst="rect">
+            <a:avLst/>
+          </a:prstGeom>
+        </p:spPr>
+      </p:pic>
+      <p:sp>
+        <p:nvSpPr>
+          <p:cNvPr id="21" name="CaixaDeTexto 20">
+            <a:extLst>
+              <a:ext uri="{FF2B5EF4-FFF2-40B4-BE49-F238E27FC236}">
+                <a16:creationId xmlns:a16="http://schemas.microsoft.com/office/drawing/2014/main" id="{1334A8D8-2235-227C-4525-E2D82BE3E207}"/>
+              </a:ext>
+            </a:extLst>
+          </p:cNvPr>
+          <p:cNvSpPr txBox="1"/>
+          <p:nvPr/>
+        </p:nvSpPr>
+        <p:spPr>
+          <a:xfrm>
+            <a:off x="8012227" y="5244147"/>
+            <a:ext cx="4066594" cy="1477328"/>
+          </a:xfrm>
+          <a:prstGeom prst="rect">
+            <a:avLst/>
+          </a:prstGeom>
+          <a:solidFill>
+            <a:srgbClr val="006600">
+              <a:alpha val="30196"/>
+            </a:srgbClr>
+          </a:solidFill>
+          <a:ln w="19050">
+            <a:solidFill>
+              <a:schemeClr val="bg1">
+                <a:lumMod val="65000"/>
+              </a:schemeClr>
+            </a:solidFill>
+          </a:ln>
+        </p:spPr>
+        <p:txBody>
+          <a:bodyPr wrap="square" rtlCol="0">
+            <a:spAutoFit/>
+          </a:bodyPr>
+          <a:lstStyle/>
+          <a:p>
+            <a:r>
+              <a:rPr lang="pt-BR" dirty="0">
+                <a:solidFill>
+                  <a:schemeClr val="bg1"/>
+                </a:solidFill>
+              </a:rPr>
+              <a:t>Para avaliar o candidato, o avaliador dá uma nota correspondente ao desempenho para cada critério. Essas notas são customizáveis na régua de notas, como mostra a imagem.</a:t>
+            </a:r>
+          </a:p>
+        </p:txBody>
+      </p:sp>
+      <p:pic>
+        <p:nvPicPr>
+          <p:cNvPr id="23" name="Imagem 22" descr="Interface gráfica do usuário&#10;&#10;O conteúdo gerado por IA pode estar incorreto.">
+            <a:extLst>
+              <a:ext uri="{FF2B5EF4-FFF2-40B4-BE49-F238E27FC236}">
+                <a16:creationId xmlns:a16="http://schemas.microsoft.com/office/drawing/2014/main" id="{32CE39AA-9BC7-2466-2392-293C5F856F31}"/>
               </a:ext>
             </a:extLst>
           </p:cNvPr>
@@ -12323,38 +13961,75 @@
         </p:nvPicPr>
         <p:blipFill>
           <a:blip r:embed="rId5"/>
+          <a:srcRect l="3178" t="7401" r="2000" b="5673"/>
           <a:stretch>
             <a:fillRect/>
           </a:stretch>
         </p:blipFill>
         <p:spPr>
           <a:xfrm>
-            <a:off x="8967021" y="2992970"/>
-            <a:ext cx="2639913" cy="3742013"/>
+            <a:off x="4473347" y="5228577"/>
+            <a:ext cx="3472543" cy="1492898"/>
           </a:xfrm>
           <a:prstGeom prst="rect">
             <a:avLst/>
           </a:prstGeom>
-          <a:ln w="38100">
+        </p:spPr>
+      </p:pic>
+      <p:sp>
+        <p:nvSpPr>
+          <p:cNvPr id="24" name="CaixaDeTexto 23">
+            <a:extLst>
+              <a:ext uri="{FF2B5EF4-FFF2-40B4-BE49-F238E27FC236}">
+                <a16:creationId xmlns:a16="http://schemas.microsoft.com/office/drawing/2014/main" id="{DF72010B-6F5B-08E7-B8F0-BCB76167FED3}"/>
+              </a:ext>
+            </a:extLst>
+          </p:cNvPr>
+          <p:cNvSpPr txBox="1"/>
+          <p:nvPr/>
+        </p:nvSpPr>
+        <p:spPr>
+          <a:xfrm>
+            <a:off x="113179" y="5670926"/>
+            <a:ext cx="4160241" cy="1169551"/>
+          </a:xfrm>
+          <a:prstGeom prst="rect">
+            <a:avLst/>
+          </a:prstGeom>
+          <a:solidFill>
+            <a:srgbClr val="006600">
+              <a:alpha val="30196"/>
+            </a:srgbClr>
+          </a:solidFill>
+          <a:ln w="19050">
             <a:solidFill>
               <a:schemeClr val="bg1">
-                <a:lumMod val="75000"/>
+                <a:lumMod val="65000"/>
               </a:schemeClr>
             </a:solidFill>
           </a:ln>
-          <a:effectLst>
-            <a:outerShdw blurRad="292100" dist="139700" dir="2700000" algn="tl" rotWithShape="0">
-              <a:srgbClr val="333333">
-                <a:alpha val="65000"/>
-              </a:srgbClr>
-            </a:outerShdw>
-          </a:effectLst>
         </p:spPr>
-      </p:pic>
+        <p:txBody>
+          <a:bodyPr wrap="square" rtlCol="0">
+            <a:spAutoFit/>
+          </a:bodyPr>
+          <a:lstStyle/>
+          <a:p>
+            <a:r>
+              <a:rPr lang="pt-BR" sz="1400" dirty="0">
+                <a:solidFill>
+                  <a:schemeClr val="bg1"/>
+                </a:solidFill>
+              </a:rPr>
+              <a:t>Por exemplo, uma vaga para assistente financeiro deveria ter um peso para Habilidades Soft muito maior do que para Experiência Geral (talvez, esse critério nem precisasse existir para a vaga). Também não precisasse de um pilar de Teste Técnico.</a:t>
+            </a:r>
+          </a:p>
+        </p:txBody>
+      </p:sp>
     </p:spTree>
     <p:extLst>
       <p:ext uri="{BB962C8B-B14F-4D97-AF65-F5344CB8AC3E}">
-        <p14:creationId xmlns:p14="http://schemas.microsoft.com/office/powerpoint/2010/main" val="2164991741"/>
+        <p14:creationId xmlns:p14="http://schemas.microsoft.com/office/powerpoint/2010/main" val="758475657"/>
       </p:ext>
     </p:extLst>
   </p:cSld>

</xml_diff>